<commit_message>
Started revision of UI - aim is to have just one main display and incorporate opening existing data and creating new ones ('simulated') in one window
</commit_message>
<xml_diff>
--- a/Resources/Other/Icons.pptx
+++ b/Resources/Other/Icons.pptx
@@ -8,6 +8,7 @@
     <p:sldId id="256" r:id="rId2"/>
     <p:sldId id="257" r:id="rId3"/>
     <p:sldId id="258" r:id="rId4"/>
+    <p:sldId id="259" r:id="rId5"/>
   </p:sldIdLst>
   <p:sldSz cx="12192000" cy="6858000"/>
   <p:notesSz cx="6858000" cy="9144000"/>
@@ -245,7 +246,7 @@
           <a:p>
             <a:fld id="{D8455722-239A-4E54-8AF4-0299CA751C05}" type="datetimeFigureOut">
               <a:rPr lang="en-GB" smtClean="0"/>
-              <a:t>07/06/2017</a:t>
+              <a:t>09/01/2018</a:t>
             </a:fld>
             <a:endParaRPr lang="en-GB"/>
           </a:p>
@@ -415,7 +416,7 @@
           <a:p>
             <a:fld id="{D8455722-239A-4E54-8AF4-0299CA751C05}" type="datetimeFigureOut">
               <a:rPr lang="en-GB" smtClean="0"/>
-              <a:t>07/06/2017</a:t>
+              <a:t>09/01/2018</a:t>
             </a:fld>
             <a:endParaRPr lang="en-GB"/>
           </a:p>
@@ -595,7 +596,7 @@
           <a:p>
             <a:fld id="{D8455722-239A-4E54-8AF4-0299CA751C05}" type="datetimeFigureOut">
               <a:rPr lang="en-GB" smtClean="0"/>
-              <a:t>07/06/2017</a:t>
+              <a:t>09/01/2018</a:t>
             </a:fld>
             <a:endParaRPr lang="en-GB"/>
           </a:p>
@@ -765,7 +766,7 @@
           <a:p>
             <a:fld id="{D8455722-239A-4E54-8AF4-0299CA751C05}" type="datetimeFigureOut">
               <a:rPr lang="en-GB" smtClean="0"/>
-              <a:t>07/06/2017</a:t>
+              <a:t>09/01/2018</a:t>
             </a:fld>
             <a:endParaRPr lang="en-GB"/>
           </a:p>
@@ -1011,7 +1012,7 @@
           <a:p>
             <a:fld id="{D8455722-239A-4E54-8AF4-0299CA751C05}" type="datetimeFigureOut">
               <a:rPr lang="en-GB" smtClean="0"/>
-              <a:t>07/06/2017</a:t>
+              <a:t>09/01/2018</a:t>
             </a:fld>
             <a:endParaRPr lang="en-GB"/>
           </a:p>
@@ -1243,7 +1244,7 @@
           <a:p>
             <a:fld id="{D8455722-239A-4E54-8AF4-0299CA751C05}" type="datetimeFigureOut">
               <a:rPr lang="en-GB" smtClean="0"/>
-              <a:t>07/06/2017</a:t>
+              <a:t>09/01/2018</a:t>
             </a:fld>
             <a:endParaRPr lang="en-GB"/>
           </a:p>
@@ -1610,7 +1611,7 @@
           <a:p>
             <a:fld id="{D8455722-239A-4E54-8AF4-0299CA751C05}" type="datetimeFigureOut">
               <a:rPr lang="en-GB" smtClean="0"/>
-              <a:t>07/06/2017</a:t>
+              <a:t>09/01/2018</a:t>
             </a:fld>
             <a:endParaRPr lang="en-GB"/>
           </a:p>
@@ -1728,7 +1729,7 @@
           <a:p>
             <a:fld id="{D8455722-239A-4E54-8AF4-0299CA751C05}" type="datetimeFigureOut">
               <a:rPr lang="en-GB" smtClean="0"/>
-              <a:t>07/06/2017</a:t>
+              <a:t>09/01/2018</a:t>
             </a:fld>
             <a:endParaRPr lang="en-GB"/>
           </a:p>
@@ -1823,7 +1824,7 @@
           <a:p>
             <a:fld id="{D8455722-239A-4E54-8AF4-0299CA751C05}" type="datetimeFigureOut">
               <a:rPr lang="en-GB" smtClean="0"/>
-              <a:t>07/06/2017</a:t>
+              <a:t>09/01/2018</a:t>
             </a:fld>
             <a:endParaRPr lang="en-GB"/>
           </a:p>
@@ -2100,7 +2101,7 @@
           <a:p>
             <a:fld id="{D8455722-239A-4E54-8AF4-0299CA751C05}" type="datetimeFigureOut">
               <a:rPr lang="en-GB" smtClean="0"/>
-              <a:t>07/06/2017</a:t>
+              <a:t>09/01/2018</a:t>
             </a:fld>
             <a:endParaRPr lang="en-GB"/>
           </a:p>
@@ -2353,7 +2354,7 @@
           <a:p>
             <a:fld id="{D8455722-239A-4E54-8AF4-0299CA751C05}" type="datetimeFigureOut">
               <a:rPr lang="en-GB" smtClean="0"/>
-              <a:t>07/06/2017</a:t>
+              <a:t>09/01/2018</a:t>
             </a:fld>
             <a:endParaRPr lang="en-GB"/>
           </a:p>
@@ -2566,7 +2567,7 @@
           <a:p>
             <a:fld id="{D8455722-239A-4E54-8AF4-0299CA751C05}" type="datetimeFigureOut">
               <a:rPr lang="en-GB" smtClean="0"/>
-              <a:t>07/06/2017</a:t>
+              <a:t>09/01/2018</a:t>
             </a:fld>
             <a:endParaRPr lang="en-GB"/>
           </a:p>
@@ -3929,7 +3930,7 @@
         </p:nvGrpSpPr>
         <p:grpSpPr>
           <a:xfrm>
-            <a:off x="740151" y="3146942"/>
+            <a:off x="740150" y="3713538"/>
             <a:ext cx="2745851" cy="2543938"/>
             <a:chOff x="740151" y="3146942"/>
             <a:chExt cx="2745851" cy="2543938"/>
@@ -4192,7 +4193,7 @@
         </p:nvGrpSpPr>
         <p:grpSpPr>
           <a:xfrm>
-            <a:off x="3454310" y="3291709"/>
+            <a:off x="3685893" y="3802891"/>
             <a:ext cx="2745851" cy="2543938"/>
             <a:chOff x="3454310" y="3291709"/>
             <a:chExt cx="2745851" cy="2543938"/>
@@ -4560,7 +4561,7 @@
         </p:nvGrpSpPr>
         <p:grpSpPr>
           <a:xfrm>
-            <a:off x="6266810" y="3366363"/>
+            <a:off x="6380313" y="3892244"/>
             <a:ext cx="2745851" cy="2543938"/>
             <a:chOff x="6538525" y="3351965"/>
             <a:chExt cx="2745851" cy="2543938"/>
@@ -4908,7 +4909,7 @@
         </p:nvGrpSpPr>
         <p:grpSpPr>
           <a:xfrm>
-            <a:off x="9198240" y="3441318"/>
+            <a:off x="9186202" y="3892244"/>
             <a:ext cx="2745851" cy="2543938"/>
             <a:chOff x="9198240" y="3441318"/>
             <a:chExt cx="2745851" cy="2543938"/>
@@ -5366,6 +5367,119 @@
             </a:fillRef>
             <a:effectRef idx="3">
               <a:schemeClr val="dk1"/>
+            </a:effectRef>
+            <a:fontRef idx="minor">
+              <a:schemeClr val="lt1"/>
+            </a:fontRef>
+          </p:style>
+          <p:txBody>
+            <a:bodyPr rtlCol="0" anchor="ctr"/>
+            <a:lstStyle/>
+            <a:p>
+              <a:pPr algn="ctr"/>
+              <a:endParaRPr lang="en-GB"/>
+            </a:p>
+          </p:txBody>
+        </p:sp>
+      </p:grpSp>
+      <p:grpSp>
+        <p:nvGrpSpPr>
+          <p:cNvPr id="64" name="Group 63"/>
+          <p:cNvGrpSpPr/>
+          <p:nvPr/>
+        </p:nvGrpSpPr>
+        <p:grpSpPr>
+          <a:xfrm>
+            <a:off x="764124" y="2274872"/>
+            <a:ext cx="988437" cy="1027904"/>
+            <a:chOff x="740151" y="823053"/>
+            <a:chExt cx="988437" cy="1027904"/>
+          </a:xfrm>
+        </p:grpSpPr>
+        <p:sp>
+          <p:nvSpPr>
+            <p:cNvPr id="65" name="Flowchart: Document 64"/>
+            <p:cNvSpPr/>
+            <p:nvPr/>
+          </p:nvSpPr>
+          <p:spPr>
+            <a:xfrm flipV="1">
+              <a:off x="740151" y="823053"/>
+              <a:ext cx="988437" cy="1018572"/>
+            </a:xfrm>
+            <a:prstGeom prst="flowChartDocument">
+              <a:avLst/>
+            </a:prstGeom>
+            <a:solidFill>
+              <a:schemeClr val="accent4">
+                <a:lumMod val="75000"/>
+              </a:schemeClr>
+            </a:solidFill>
+            <a:ln w="76200">
+              <a:solidFill>
+                <a:schemeClr val="tx1"/>
+              </a:solidFill>
+            </a:ln>
+          </p:spPr>
+          <p:style>
+            <a:lnRef idx="2">
+              <a:schemeClr val="accent1">
+                <a:shade val="50000"/>
+              </a:schemeClr>
+            </a:lnRef>
+            <a:fillRef idx="1">
+              <a:schemeClr val="accent1"/>
+            </a:fillRef>
+            <a:effectRef idx="0">
+              <a:schemeClr val="accent1"/>
+            </a:effectRef>
+            <a:fontRef idx="minor">
+              <a:schemeClr val="lt1"/>
+            </a:fontRef>
+          </p:style>
+          <p:txBody>
+            <a:bodyPr rtlCol="0" anchor="ctr"/>
+            <a:lstStyle/>
+            <a:p>
+              <a:pPr algn="ctr"/>
+              <a:endParaRPr lang="en-GB"/>
+            </a:p>
+          </p:txBody>
+        </p:sp>
+        <p:sp>
+          <p:nvSpPr>
+            <p:cNvPr id="81" name="Parallelogram 59"/>
+            <p:cNvSpPr/>
+            <p:nvPr/>
+          </p:nvSpPr>
+          <p:spPr>
+            <a:xfrm>
+              <a:off x="740151" y="1104343"/>
+              <a:ext cx="988437" cy="746614"/>
+            </a:xfrm>
+            <a:prstGeom prst="rect">
+              <a:avLst/>
+            </a:prstGeom>
+            <a:solidFill>
+              <a:schemeClr val="accent4"/>
+            </a:solidFill>
+            <a:ln w="76200">
+              <a:solidFill>
+                <a:schemeClr val="tx1"/>
+              </a:solidFill>
+            </a:ln>
+          </p:spPr>
+          <p:style>
+            <a:lnRef idx="2">
+              <a:schemeClr val="accent1">
+                <a:shade val="50000"/>
+              </a:schemeClr>
+            </a:lnRef>
+            <a:fillRef idx="1">
+              <a:schemeClr val="accent1"/>
+            </a:fillRef>
+            <a:effectRef idx="0">
+              <a:schemeClr val="accent1"/>
             </a:effectRef>
             <a:fontRef idx="minor">
               <a:schemeClr val="lt1"/>
@@ -9188,6 +9302,2100 @@
 </p:sld>
 </file>
 
+<file path=ppt/slides/slide4.xml><?xml version="1.0" encoding="utf-8"?>
+<p:sld xmlns:a="http://schemas.openxmlformats.org/drawingml/2006/main" xmlns:r="http://schemas.openxmlformats.org/officeDocument/2006/relationships" xmlns:p="http://schemas.openxmlformats.org/presentationml/2006/main">
+  <p:cSld>
+    <p:spTree>
+      <p:nvGrpSpPr>
+        <p:cNvPr id="1" name=""/>
+        <p:cNvGrpSpPr/>
+        <p:nvPr/>
+      </p:nvGrpSpPr>
+      <p:grpSpPr>
+        <a:xfrm>
+          <a:off x="0" y="0"/>
+          <a:ext cx="0" cy="0"/>
+          <a:chOff x="0" y="0"/>
+          <a:chExt cx="0" cy="0"/>
+        </a:xfrm>
+      </p:grpSpPr>
+      <p:grpSp>
+        <p:nvGrpSpPr>
+          <p:cNvPr id="2" name="Group 1"/>
+          <p:cNvGrpSpPr/>
+          <p:nvPr/>
+        </p:nvGrpSpPr>
+        <p:grpSpPr>
+          <a:xfrm>
+            <a:off x="740149" y="2119037"/>
+            <a:ext cx="1116000" cy="1044000"/>
+            <a:chOff x="740150" y="2119038"/>
+            <a:chExt cx="1099497" cy="1027903"/>
+          </a:xfrm>
+        </p:grpSpPr>
+        <p:grpSp>
+          <p:nvGrpSpPr>
+            <p:cNvPr id="3" name="Group 2"/>
+            <p:cNvGrpSpPr/>
+            <p:nvPr/>
+          </p:nvGrpSpPr>
+          <p:grpSpPr>
+            <a:xfrm>
+              <a:off x="740150" y="2119038"/>
+              <a:ext cx="1099497" cy="1027903"/>
+              <a:chOff x="740151" y="823053"/>
+              <a:chExt cx="1099497" cy="1027903"/>
+            </a:xfrm>
+          </p:grpSpPr>
+          <p:sp>
+            <p:nvSpPr>
+              <p:cNvPr id="5" name="Flowchart: Document 4"/>
+              <p:cNvSpPr/>
+              <p:nvPr/>
+            </p:nvSpPr>
+            <p:spPr>
+              <a:xfrm flipV="1">
+                <a:off x="740151" y="823053"/>
+                <a:ext cx="988437" cy="1018572"/>
+              </a:xfrm>
+              <a:prstGeom prst="flowChartDocument">
+                <a:avLst/>
+              </a:prstGeom>
+              <a:solidFill>
+                <a:schemeClr val="accent4">
+                  <a:lumMod val="75000"/>
+                </a:schemeClr>
+              </a:solidFill>
+              <a:ln w="76200">
+                <a:solidFill>
+                  <a:schemeClr val="tx1"/>
+                </a:solidFill>
+              </a:ln>
+            </p:spPr>
+            <p:style>
+              <a:lnRef idx="2">
+                <a:schemeClr val="accent1">
+                  <a:shade val="50000"/>
+                </a:schemeClr>
+              </a:lnRef>
+              <a:fillRef idx="1">
+                <a:schemeClr val="accent1"/>
+              </a:fillRef>
+              <a:effectRef idx="0">
+                <a:schemeClr val="accent1"/>
+              </a:effectRef>
+              <a:fontRef idx="minor">
+                <a:schemeClr val="lt1"/>
+              </a:fontRef>
+            </p:style>
+            <p:txBody>
+              <a:bodyPr rtlCol="0" anchor="ctr"/>
+              <a:lstStyle/>
+              <a:p>
+                <a:pPr algn="ctr"/>
+                <a:endParaRPr lang="en-GB"/>
+              </a:p>
+            </p:txBody>
+          </p:sp>
+          <p:sp>
+            <p:nvSpPr>
+              <p:cNvPr id="6" name="Parallelogram 59"/>
+              <p:cNvSpPr/>
+              <p:nvPr/>
+            </p:nvSpPr>
+            <p:spPr>
+              <a:xfrm>
+                <a:off x="740151" y="1464951"/>
+                <a:ext cx="1099497" cy="386005"/>
+              </a:xfrm>
+              <a:custGeom>
+                <a:avLst/>
+                <a:gdLst>
+                  <a:gd name="connsiteX0" fmla="*/ 0 w 1405392"/>
+                  <a:gd name="connsiteY0" fmla="*/ 565949 h 565949"/>
+                  <a:gd name="connsiteX1" fmla="*/ 141487 w 1405392"/>
+                  <a:gd name="connsiteY1" fmla="*/ 0 h 565949"/>
+                  <a:gd name="connsiteX2" fmla="*/ 1405392 w 1405392"/>
+                  <a:gd name="connsiteY2" fmla="*/ 0 h 565949"/>
+                  <a:gd name="connsiteX3" fmla="*/ 1263905 w 1405392"/>
+                  <a:gd name="connsiteY3" fmla="*/ 565949 h 565949"/>
+                  <a:gd name="connsiteX4" fmla="*/ 0 w 1405392"/>
+                  <a:gd name="connsiteY4" fmla="*/ 565949 h 565949"/>
+                  <a:gd name="connsiteX0" fmla="*/ 0 w 1405392"/>
+                  <a:gd name="connsiteY0" fmla="*/ 577524 h 577524"/>
+                  <a:gd name="connsiteX1" fmla="*/ 361406 w 1405392"/>
+                  <a:gd name="connsiteY1" fmla="*/ 0 h 577524"/>
+                  <a:gd name="connsiteX2" fmla="*/ 1405392 w 1405392"/>
+                  <a:gd name="connsiteY2" fmla="*/ 11575 h 577524"/>
+                  <a:gd name="connsiteX3" fmla="*/ 1263905 w 1405392"/>
+                  <a:gd name="connsiteY3" fmla="*/ 577524 h 577524"/>
+                  <a:gd name="connsiteX4" fmla="*/ 0 w 1405392"/>
+                  <a:gd name="connsiteY4" fmla="*/ 577524 h 577524"/>
+                  <a:gd name="connsiteX0" fmla="*/ 0 w 1660035"/>
+                  <a:gd name="connsiteY0" fmla="*/ 589099 h 589099"/>
+                  <a:gd name="connsiteX1" fmla="*/ 361406 w 1660035"/>
+                  <a:gd name="connsiteY1" fmla="*/ 11575 h 589099"/>
+                  <a:gd name="connsiteX2" fmla="*/ 1660035 w 1660035"/>
+                  <a:gd name="connsiteY2" fmla="*/ 0 h 589099"/>
+                  <a:gd name="connsiteX3" fmla="*/ 1263905 w 1660035"/>
+                  <a:gd name="connsiteY3" fmla="*/ 589099 h 589099"/>
+                  <a:gd name="connsiteX4" fmla="*/ 0 w 1660035"/>
+                  <a:gd name="connsiteY4" fmla="*/ 589099 h 589099"/>
+                  <a:gd name="connsiteX0" fmla="*/ 0 w 1660035"/>
+                  <a:gd name="connsiteY0" fmla="*/ 589099 h 589099"/>
+                  <a:gd name="connsiteX1" fmla="*/ 361406 w 1660035"/>
+                  <a:gd name="connsiteY1" fmla="*/ 11575 h 589099"/>
+                  <a:gd name="connsiteX2" fmla="*/ 1660035 w 1660035"/>
+                  <a:gd name="connsiteY2" fmla="*/ 0 h 589099"/>
+                  <a:gd name="connsiteX3" fmla="*/ 1171308 w 1660035"/>
+                  <a:gd name="connsiteY3" fmla="*/ 589099 h 589099"/>
+                  <a:gd name="connsiteX4" fmla="*/ 0 w 1660035"/>
+                  <a:gd name="connsiteY4" fmla="*/ 589099 h 589099"/>
+                  <a:gd name="connsiteX0" fmla="*/ 0 w 1660035"/>
+                  <a:gd name="connsiteY0" fmla="*/ 589099 h 589099"/>
+                  <a:gd name="connsiteX1" fmla="*/ 234084 w 1660035"/>
+                  <a:gd name="connsiteY1" fmla="*/ 0 h 589099"/>
+                  <a:gd name="connsiteX2" fmla="*/ 1660035 w 1660035"/>
+                  <a:gd name="connsiteY2" fmla="*/ 0 h 589099"/>
+                  <a:gd name="connsiteX3" fmla="*/ 1171308 w 1660035"/>
+                  <a:gd name="connsiteY3" fmla="*/ 589099 h 589099"/>
+                  <a:gd name="connsiteX4" fmla="*/ 0 w 1660035"/>
+                  <a:gd name="connsiteY4" fmla="*/ 589099 h 589099"/>
+                  <a:gd name="connsiteX0" fmla="*/ 0 w 1660035"/>
+                  <a:gd name="connsiteY0" fmla="*/ 589099 h 598430"/>
+                  <a:gd name="connsiteX1" fmla="*/ 234084 w 1660035"/>
+                  <a:gd name="connsiteY1" fmla="*/ 0 h 598430"/>
+                  <a:gd name="connsiteX2" fmla="*/ 1660035 w 1660035"/>
+                  <a:gd name="connsiteY2" fmla="*/ 0 h 598430"/>
+                  <a:gd name="connsiteX3" fmla="*/ 1495320 w 1660035"/>
+                  <a:gd name="connsiteY3" fmla="*/ 598430 h 598430"/>
+                  <a:gd name="connsiteX4" fmla="*/ 0 w 1660035"/>
+                  <a:gd name="connsiteY4" fmla="*/ 589099 h 598430"/>
+                  <a:gd name="connsiteX0" fmla="*/ 0 w 1660035"/>
+                  <a:gd name="connsiteY0" fmla="*/ 589099 h 598430"/>
+                  <a:gd name="connsiteX1" fmla="*/ 234084 w 1660035"/>
+                  <a:gd name="connsiteY1" fmla="*/ 0 h 598430"/>
+                  <a:gd name="connsiteX2" fmla="*/ 1660035 w 1660035"/>
+                  <a:gd name="connsiteY2" fmla="*/ 0 h 598430"/>
+                  <a:gd name="connsiteX3" fmla="*/ 1453058 w 1660035"/>
+                  <a:gd name="connsiteY3" fmla="*/ 598430 h 598430"/>
+                  <a:gd name="connsiteX4" fmla="*/ 0 w 1660035"/>
+                  <a:gd name="connsiteY4" fmla="*/ 589099 h 598430"/>
+                </a:gdLst>
+                <a:ahLst/>
+                <a:cxnLst>
+                  <a:cxn ang="0">
+                    <a:pos x="connsiteX0" y="connsiteY0"/>
+                  </a:cxn>
+                  <a:cxn ang="0">
+                    <a:pos x="connsiteX1" y="connsiteY1"/>
+                  </a:cxn>
+                  <a:cxn ang="0">
+                    <a:pos x="connsiteX2" y="connsiteY2"/>
+                  </a:cxn>
+                  <a:cxn ang="0">
+                    <a:pos x="connsiteX3" y="connsiteY3"/>
+                  </a:cxn>
+                  <a:cxn ang="0">
+                    <a:pos x="connsiteX4" y="connsiteY4"/>
+                  </a:cxn>
+                </a:cxnLst>
+                <a:rect l="l" t="t" r="r" b="b"/>
+                <a:pathLst>
+                  <a:path w="1660035" h="598430">
+                    <a:moveTo>
+                      <a:pt x="0" y="589099"/>
+                    </a:moveTo>
+                    <a:lnTo>
+                      <a:pt x="234084" y="0"/>
+                    </a:lnTo>
+                    <a:lnTo>
+                      <a:pt x="1660035" y="0"/>
+                    </a:lnTo>
+                    <a:lnTo>
+                      <a:pt x="1453058" y="598430"/>
+                    </a:lnTo>
+                    <a:lnTo>
+                      <a:pt x="0" y="589099"/>
+                    </a:lnTo>
+                    <a:close/>
+                  </a:path>
+                </a:pathLst>
+              </a:custGeom>
+              <a:solidFill>
+                <a:schemeClr val="accent4"/>
+              </a:solidFill>
+              <a:ln w="76200">
+                <a:solidFill>
+                  <a:schemeClr val="tx1"/>
+                </a:solidFill>
+              </a:ln>
+            </p:spPr>
+            <p:style>
+              <a:lnRef idx="2">
+                <a:schemeClr val="accent1">
+                  <a:shade val="50000"/>
+                </a:schemeClr>
+              </a:lnRef>
+              <a:fillRef idx="1">
+                <a:schemeClr val="accent1"/>
+              </a:fillRef>
+              <a:effectRef idx="0">
+                <a:schemeClr val="accent1"/>
+              </a:effectRef>
+              <a:fontRef idx="minor">
+                <a:schemeClr val="lt1"/>
+              </a:fontRef>
+            </p:style>
+            <p:txBody>
+              <a:bodyPr rtlCol="0" anchor="ctr"/>
+              <a:lstStyle/>
+              <a:p>
+                <a:pPr algn="ctr"/>
+                <a:endParaRPr lang="en-GB"/>
+              </a:p>
+            </p:txBody>
+          </p:sp>
+        </p:grpSp>
+        <p:sp>
+          <p:nvSpPr>
+            <p:cNvPr id="4" name="Cross 3"/>
+            <p:cNvSpPr/>
+            <p:nvPr/>
+          </p:nvSpPr>
+          <p:spPr>
+            <a:xfrm>
+              <a:off x="874368" y="2280431"/>
+              <a:ext cx="360000" cy="360000"/>
+            </a:xfrm>
+            <a:prstGeom prst="plus">
+              <a:avLst>
+                <a:gd name="adj" fmla="val 30755"/>
+              </a:avLst>
+            </a:prstGeom>
+            <a:solidFill>
+              <a:schemeClr val="accent4"/>
+            </a:solidFill>
+            <a:ln>
+              <a:solidFill>
+                <a:schemeClr val="tx1"/>
+              </a:solidFill>
+            </a:ln>
+          </p:spPr>
+          <p:style>
+            <a:lnRef idx="2">
+              <a:schemeClr val="accent1">
+                <a:shade val="50000"/>
+              </a:schemeClr>
+            </a:lnRef>
+            <a:fillRef idx="1">
+              <a:schemeClr val="accent1"/>
+            </a:fillRef>
+            <a:effectRef idx="0">
+              <a:schemeClr val="accent1"/>
+            </a:effectRef>
+            <a:fontRef idx="minor">
+              <a:schemeClr val="lt1"/>
+            </a:fontRef>
+          </p:style>
+          <p:txBody>
+            <a:bodyPr rtlCol="0" anchor="ctr"/>
+            <a:lstStyle/>
+            <a:p>
+              <a:pPr algn="ctr"/>
+              <a:endParaRPr lang="en-GB">
+                <a:ln>
+                  <a:solidFill>
+                    <a:sysClr val="windowText" lastClr="000000"/>
+                  </a:solidFill>
+                </a:ln>
+              </a:endParaRPr>
+            </a:p>
+          </p:txBody>
+        </p:sp>
+      </p:grpSp>
+      <p:grpSp>
+        <p:nvGrpSpPr>
+          <p:cNvPr id="7" name="Group 6"/>
+          <p:cNvGrpSpPr/>
+          <p:nvPr/>
+        </p:nvGrpSpPr>
+        <p:grpSpPr>
+          <a:xfrm>
+            <a:off x="2109662" y="2114371"/>
+            <a:ext cx="1116000" cy="1044000"/>
+            <a:chOff x="740150" y="2119038"/>
+            <a:chExt cx="1099497" cy="1027903"/>
+          </a:xfrm>
+        </p:grpSpPr>
+        <p:grpSp>
+          <p:nvGrpSpPr>
+            <p:cNvPr id="8" name="Group 7"/>
+            <p:cNvGrpSpPr/>
+            <p:nvPr/>
+          </p:nvGrpSpPr>
+          <p:grpSpPr>
+            <a:xfrm>
+              <a:off x="740150" y="2119038"/>
+              <a:ext cx="1099497" cy="1027903"/>
+              <a:chOff x="740151" y="823053"/>
+              <a:chExt cx="1099497" cy="1027903"/>
+            </a:xfrm>
+          </p:grpSpPr>
+          <p:sp>
+            <p:nvSpPr>
+              <p:cNvPr id="10" name="Flowchart: Document 9"/>
+              <p:cNvSpPr/>
+              <p:nvPr/>
+            </p:nvSpPr>
+            <p:spPr>
+              <a:xfrm flipV="1">
+                <a:off x="740151" y="823053"/>
+                <a:ext cx="988437" cy="1018572"/>
+              </a:xfrm>
+              <a:prstGeom prst="flowChartDocument">
+                <a:avLst/>
+              </a:prstGeom>
+              <a:solidFill>
+                <a:schemeClr val="accent4">
+                  <a:lumMod val="75000"/>
+                </a:schemeClr>
+              </a:solidFill>
+              <a:ln w="76200">
+                <a:solidFill>
+                  <a:schemeClr val="tx1"/>
+                </a:solidFill>
+              </a:ln>
+            </p:spPr>
+            <p:style>
+              <a:lnRef idx="2">
+                <a:schemeClr val="accent1">
+                  <a:shade val="50000"/>
+                </a:schemeClr>
+              </a:lnRef>
+              <a:fillRef idx="1">
+                <a:schemeClr val="accent1"/>
+              </a:fillRef>
+              <a:effectRef idx="0">
+                <a:schemeClr val="accent1"/>
+              </a:effectRef>
+              <a:fontRef idx="minor">
+                <a:schemeClr val="lt1"/>
+              </a:fontRef>
+            </p:style>
+            <p:txBody>
+              <a:bodyPr rtlCol="0" anchor="ctr"/>
+              <a:lstStyle/>
+              <a:p>
+                <a:pPr algn="ctr"/>
+                <a:endParaRPr lang="en-GB"/>
+              </a:p>
+            </p:txBody>
+          </p:sp>
+          <p:sp>
+            <p:nvSpPr>
+              <p:cNvPr id="11" name="Parallelogram 59"/>
+              <p:cNvSpPr/>
+              <p:nvPr/>
+            </p:nvSpPr>
+            <p:spPr>
+              <a:xfrm>
+                <a:off x="740151" y="1464951"/>
+                <a:ext cx="1099497" cy="386005"/>
+              </a:xfrm>
+              <a:custGeom>
+                <a:avLst/>
+                <a:gdLst>
+                  <a:gd name="connsiteX0" fmla="*/ 0 w 1405392"/>
+                  <a:gd name="connsiteY0" fmla="*/ 565949 h 565949"/>
+                  <a:gd name="connsiteX1" fmla="*/ 141487 w 1405392"/>
+                  <a:gd name="connsiteY1" fmla="*/ 0 h 565949"/>
+                  <a:gd name="connsiteX2" fmla="*/ 1405392 w 1405392"/>
+                  <a:gd name="connsiteY2" fmla="*/ 0 h 565949"/>
+                  <a:gd name="connsiteX3" fmla="*/ 1263905 w 1405392"/>
+                  <a:gd name="connsiteY3" fmla="*/ 565949 h 565949"/>
+                  <a:gd name="connsiteX4" fmla="*/ 0 w 1405392"/>
+                  <a:gd name="connsiteY4" fmla="*/ 565949 h 565949"/>
+                  <a:gd name="connsiteX0" fmla="*/ 0 w 1405392"/>
+                  <a:gd name="connsiteY0" fmla="*/ 577524 h 577524"/>
+                  <a:gd name="connsiteX1" fmla="*/ 361406 w 1405392"/>
+                  <a:gd name="connsiteY1" fmla="*/ 0 h 577524"/>
+                  <a:gd name="connsiteX2" fmla="*/ 1405392 w 1405392"/>
+                  <a:gd name="connsiteY2" fmla="*/ 11575 h 577524"/>
+                  <a:gd name="connsiteX3" fmla="*/ 1263905 w 1405392"/>
+                  <a:gd name="connsiteY3" fmla="*/ 577524 h 577524"/>
+                  <a:gd name="connsiteX4" fmla="*/ 0 w 1405392"/>
+                  <a:gd name="connsiteY4" fmla="*/ 577524 h 577524"/>
+                  <a:gd name="connsiteX0" fmla="*/ 0 w 1660035"/>
+                  <a:gd name="connsiteY0" fmla="*/ 589099 h 589099"/>
+                  <a:gd name="connsiteX1" fmla="*/ 361406 w 1660035"/>
+                  <a:gd name="connsiteY1" fmla="*/ 11575 h 589099"/>
+                  <a:gd name="connsiteX2" fmla="*/ 1660035 w 1660035"/>
+                  <a:gd name="connsiteY2" fmla="*/ 0 h 589099"/>
+                  <a:gd name="connsiteX3" fmla="*/ 1263905 w 1660035"/>
+                  <a:gd name="connsiteY3" fmla="*/ 589099 h 589099"/>
+                  <a:gd name="connsiteX4" fmla="*/ 0 w 1660035"/>
+                  <a:gd name="connsiteY4" fmla="*/ 589099 h 589099"/>
+                  <a:gd name="connsiteX0" fmla="*/ 0 w 1660035"/>
+                  <a:gd name="connsiteY0" fmla="*/ 589099 h 589099"/>
+                  <a:gd name="connsiteX1" fmla="*/ 361406 w 1660035"/>
+                  <a:gd name="connsiteY1" fmla="*/ 11575 h 589099"/>
+                  <a:gd name="connsiteX2" fmla="*/ 1660035 w 1660035"/>
+                  <a:gd name="connsiteY2" fmla="*/ 0 h 589099"/>
+                  <a:gd name="connsiteX3" fmla="*/ 1171308 w 1660035"/>
+                  <a:gd name="connsiteY3" fmla="*/ 589099 h 589099"/>
+                  <a:gd name="connsiteX4" fmla="*/ 0 w 1660035"/>
+                  <a:gd name="connsiteY4" fmla="*/ 589099 h 589099"/>
+                  <a:gd name="connsiteX0" fmla="*/ 0 w 1660035"/>
+                  <a:gd name="connsiteY0" fmla="*/ 589099 h 589099"/>
+                  <a:gd name="connsiteX1" fmla="*/ 234084 w 1660035"/>
+                  <a:gd name="connsiteY1" fmla="*/ 0 h 589099"/>
+                  <a:gd name="connsiteX2" fmla="*/ 1660035 w 1660035"/>
+                  <a:gd name="connsiteY2" fmla="*/ 0 h 589099"/>
+                  <a:gd name="connsiteX3" fmla="*/ 1171308 w 1660035"/>
+                  <a:gd name="connsiteY3" fmla="*/ 589099 h 589099"/>
+                  <a:gd name="connsiteX4" fmla="*/ 0 w 1660035"/>
+                  <a:gd name="connsiteY4" fmla="*/ 589099 h 589099"/>
+                  <a:gd name="connsiteX0" fmla="*/ 0 w 1660035"/>
+                  <a:gd name="connsiteY0" fmla="*/ 589099 h 598430"/>
+                  <a:gd name="connsiteX1" fmla="*/ 234084 w 1660035"/>
+                  <a:gd name="connsiteY1" fmla="*/ 0 h 598430"/>
+                  <a:gd name="connsiteX2" fmla="*/ 1660035 w 1660035"/>
+                  <a:gd name="connsiteY2" fmla="*/ 0 h 598430"/>
+                  <a:gd name="connsiteX3" fmla="*/ 1495320 w 1660035"/>
+                  <a:gd name="connsiteY3" fmla="*/ 598430 h 598430"/>
+                  <a:gd name="connsiteX4" fmla="*/ 0 w 1660035"/>
+                  <a:gd name="connsiteY4" fmla="*/ 589099 h 598430"/>
+                  <a:gd name="connsiteX0" fmla="*/ 0 w 1660035"/>
+                  <a:gd name="connsiteY0" fmla="*/ 589099 h 598430"/>
+                  <a:gd name="connsiteX1" fmla="*/ 234084 w 1660035"/>
+                  <a:gd name="connsiteY1" fmla="*/ 0 h 598430"/>
+                  <a:gd name="connsiteX2" fmla="*/ 1660035 w 1660035"/>
+                  <a:gd name="connsiteY2" fmla="*/ 0 h 598430"/>
+                  <a:gd name="connsiteX3" fmla="*/ 1453058 w 1660035"/>
+                  <a:gd name="connsiteY3" fmla="*/ 598430 h 598430"/>
+                  <a:gd name="connsiteX4" fmla="*/ 0 w 1660035"/>
+                  <a:gd name="connsiteY4" fmla="*/ 589099 h 598430"/>
+                </a:gdLst>
+                <a:ahLst/>
+                <a:cxnLst>
+                  <a:cxn ang="0">
+                    <a:pos x="connsiteX0" y="connsiteY0"/>
+                  </a:cxn>
+                  <a:cxn ang="0">
+                    <a:pos x="connsiteX1" y="connsiteY1"/>
+                  </a:cxn>
+                  <a:cxn ang="0">
+                    <a:pos x="connsiteX2" y="connsiteY2"/>
+                  </a:cxn>
+                  <a:cxn ang="0">
+                    <a:pos x="connsiteX3" y="connsiteY3"/>
+                  </a:cxn>
+                  <a:cxn ang="0">
+                    <a:pos x="connsiteX4" y="connsiteY4"/>
+                  </a:cxn>
+                </a:cxnLst>
+                <a:rect l="l" t="t" r="r" b="b"/>
+                <a:pathLst>
+                  <a:path w="1660035" h="598430">
+                    <a:moveTo>
+                      <a:pt x="0" y="589099"/>
+                    </a:moveTo>
+                    <a:lnTo>
+                      <a:pt x="234084" y="0"/>
+                    </a:lnTo>
+                    <a:lnTo>
+                      <a:pt x="1660035" y="0"/>
+                    </a:lnTo>
+                    <a:lnTo>
+                      <a:pt x="1453058" y="598430"/>
+                    </a:lnTo>
+                    <a:lnTo>
+                      <a:pt x="0" y="589099"/>
+                    </a:lnTo>
+                    <a:close/>
+                  </a:path>
+                </a:pathLst>
+              </a:custGeom>
+              <a:solidFill>
+                <a:schemeClr val="accent4"/>
+              </a:solidFill>
+              <a:ln w="76200">
+                <a:solidFill>
+                  <a:schemeClr val="tx1"/>
+                </a:solidFill>
+              </a:ln>
+            </p:spPr>
+            <p:style>
+              <a:lnRef idx="2">
+                <a:schemeClr val="accent1">
+                  <a:shade val="50000"/>
+                </a:schemeClr>
+              </a:lnRef>
+              <a:fillRef idx="1">
+                <a:schemeClr val="accent1"/>
+              </a:fillRef>
+              <a:effectRef idx="0">
+                <a:schemeClr val="accent1"/>
+              </a:effectRef>
+              <a:fontRef idx="minor">
+                <a:schemeClr val="lt1"/>
+              </a:fontRef>
+            </p:style>
+            <p:txBody>
+              <a:bodyPr rtlCol="0" anchor="ctr"/>
+              <a:lstStyle/>
+              <a:p>
+                <a:pPr algn="ctr"/>
+                <a:endParaRPr lang="en-GB"/>
+              </a:p>
+            </p:txBody>
+          </p:sp>
+        </p:grpSp>
+        <p:sp>
+          <p:nvSpPr>
+            <p:cNvPr id="9" name="Curved Down Arrow 8"/>
+            <p:cNvSpPr/>
+            <p:nvPr/>
+          </p:nvSpPr>
+          <p:spPr>
+            <a:xfrm flipV="1">
+              <a:off x="874368" y="2280431"/>
+              <a:ext cx="360000" cy="360000"/>
+            </a:xfrm>
+            <a:prstGeom prst="curvedDownArrow">
+              <a:avLst>
+                <a:gd name="adj1" fmla="val 37679"/>
+                <a:gd name="adj2" fmla="val 50000"/>
+                <a:gd name="adj3" fmla="val 25709"/>
+              </a:avLst>
+            </a:prstGeom>
+            <a:solidFill>
+              <a:schemeClr val="accent4"/>
+            </a:solidFill>
+            <a:ln>
+              <a:solidFill>
+                <a:schemeClr val="tx1"/>
+              </a:solidFill>
+            </a:ln>
+          </p:spPr>
+          <p:style>
+            <a:lnRef idx="2">
+              <a:schemeClr val="accent1">
+                <a:shade val="50000"/>
+              </a:schemeClr>
+            </a:lnRef>
+            <a:fillRef idx="1">
+              <a:schemeClr val="accent1"/>
+            </a:fillRef>
+            <a:effectRef idx="0">
+              <a:schemeClr val="accent1"/>
+            </a:effectRef>
+            <a:fontRef idx="minor">
+              <a:schemeClr val="lt1"/>
+            </a:fontRef>
+          </p:style>
+          <p:txBody>
+            <a:bodyPr rtlCol="0" anchor="ctr"/>
+            <a:lstStyle/>
+            <a:p>
+              <a:pPr algn="ctr"/>
+              <a:endParaRPr lang="en-GB">
+                <a:ln>
+                  <a:solidFill>
+                    <a:sysClr val="windowText" lastClr="000000"/>
+                  </a:solidFill>
+                </a:ln>
+              </a:endParaRPr>
+            </a:p>
+          </p:txBody>
+        </p:sp>
+      </p:grpSp>
+      <p:grpSp>
+        <p:nvGrpSpPr>
+          <p:cNvPr id="51" name="Group 50"/>
+          <p:cNvGrpSpPr/>
+          <p:nvPr/>
+        </p:nvGrpSpPr>
+        <p:grpSpPr>
+          <a:xfrm>
+            <a:off x="6793358" y="2132060"/>
+            <a:ext cx="1116000" cy="1044000"/>
+            <a:chOff x="6363434" y="2133408"/>
+            <a:chExt cx="1101005" cy="1023738"/>
+          </a:xfrm>
+        </p:grpSpPr>
+        <p:sp>
+          <p:nvSpPr>
+            <p:cNvPr id="15" name="Oval 14"/>
+            <p:cNvSpPr/>
+            <p:nvPr/>
+          </p:nvSpPr>
+          <p:spPr>
+            <a:xfrm rot="19309238">
+              <a:off x="6363434" y="2900158"/>
+              <a:ext cx="257622" cy="256988"/>
+            </a:xfrm>
+            <a:prstGeom prst="ellipse">
+              <a:avLst/>
+            </a:prstGeom>
+            <a:gradFill flip="none" rotWithShape="1">
+              <a:gsLst>
+                <a:gs pos="0">
+                  <a:schemeClr val="bg1">
+                    <a:lumMod val="75000"/>
+                  </a:schemeClr>
+                </a:gs>
+                <a:gs pos="50000">
+                  <a:schemeClr val="dk1">
+                    <a:satMod val="110000"/>
+                    <a:lumMod val="100000"/>
+                    <a:shade val="100000"/>
+                  </a:schemeClr>
+                </a:gs>
+                <a:gs pos="100000">
+                  <a:schemeClr val="dk1">
+                    <a:lumMod val="99000"/>
+                    <a:satMod val="120000"/>
+                    <a:shade val="78000"/>
+                  </a:schemeClr>
+                </a:gs>
+              </a:gsLst>
+              <a:lin ang="2700000" scaled="1"/>
+              <a:tileRect/>
+            </a:gradFill>
+            <a:ln>
+              <a:solidFill>
+                <a:schemeClr val="tx1"/>
+              </a:solidFill>
+            </a:ln>
+          </p:spPr>
+          <p:style>
+            <a:lnRef idx="2">
+              <a:schemeClr val="accent1">
+                <a:shade val="50000"/>
+              </a:schemeClr>
+            </a:lnRef>
+            <a:fillRef idx="1">
+              <a:schemeClr val="accent1"/>
+            </a:fillRef>
+            <a:effectRef idx="0">
+              <a:schemeClr val="accent1"/>
+            </a:effectRef>
+            <a:fontRef idx="minor">
+              <a:schemeClr val="lt1"/>
+            </a:fontRef>
+          </p:style>
+          <p:txBody>
+            <a:bodyPr rtlCol="0" anchor="ctr"/>
+            <a:lstStyle/>
+            <a:p>
+              <a:pPr algn="ctr"/>
+              <a:endParaRPr lang="en-GB"/>
+            </a:p>
+          </p:txBody>
+        </p:sp>
+        <p:sp>
+          <p:nvSpPr>
+            <p:cNvPr id="16" name="Trapezoid 15"/>
+            <p:cNvSpPr/>
+            <p:nvPr/>
+          </p:nvSpPr>
+          <p:spPr>
+            <a:xfrm rot="2970445">
+              <a:off x="6514281" y="2656323"/>
+              <a:ext cx="268417" cy="480490"/>
+            </a:xfrm>
+            <a:prstGeom prst="trapezoid">
+              <a:avLst/>
+            </a:prstGeom>
+            <a:solidFill>
+              <a:schemeClr val="tx1"/>
+            </a:solidFill>
+            <a:ln>
+              <a:noFill/>
+            </a:ln>
+          </p:spPr>
+          <p:style>
+            <a:lnRef idx="2">
+              <a:schemeClr val="accent1">
+                <a:shade val="50000"/>
+              </a:schemeClr>
+            </a:lnRef>
+            <a:fillRef idx="1">
+              <a:schemeClr val="accent1"/>
+            </a:fillRef>
+            <a:effectRef idx="0">
+              <a:schemeClr val="accent1"/>
+            </a:effectRef>
+            <a:fontRef idx="minor">
+              <a:schemeClr val="lt1"/>
+            </a:fontRef>
+          </p:style>
+          <p:txBody>
+            <a:bodyPr rtlCol="0" anchor="ctr"/>
+            <a:lstStyle/>
+            <a:p>
+              <a:pPr algn="ctr"/>
+              <a:endParaRPr lang="en-GB"/>
+            </a:p>
+          </p:txBody>
+        </p:sp>
+        <p:cxnSp>
+          <p:nvCxnSpPr>
+            <p:cNvPr id="17" name="Straight Connector 16"/>
+            <p:cNvCxnSpPr>
+              <a:stCxn id="16" idx="2"/>
+              <a:endCxn id="16" idx="0"/>
+            </p:cNvCxnSpPr>
+            <p:nvPr/>
+          </p:nvCxnSpPr>
+          <p:spPr>
+            <a:xfrm flipV="1">
+              <a:off x="6465786" y="2745802"/>
+              <a:ext cx="365408" cy="301531"/>
+            </a:xfrm>
+            <a:prstGeom prst="line">
+              <a:avLst/>
+            </a:prstGeom>
+            <a:ln w="25400">
+              <a:solidFill>
+                <a:schemeClr val="accent4"/>
+              </a:solidFill>
+            </a:ln>
+          </p:spPr>
+          <p:style>
+            <a:lnRef idx="1">
+              <a:schemeClr val="accent1"/>
+            </a:lnRef>
+            <a:fillRef idx="0">
+              <a:schemeClr val="accent1"/>
+            </a:fillRef>
+            <a:effectRef idx="0">
+              <a:schemeClr val="accent1"/>
+            </a:effectRef>
+            <a:fontRef idx="minor">
+              <a:schemeClr val="tx1"/>
+            </a:fontRef>
+          </p:style>
+        </p:cxnSp>
+        <p:sp>
+          <p:nvSpPr>
+            <p:cNvPr id="13" name="Oval 12"/>
+            <p:cNvSpPr/>
+            <p:nvPr/>
+          </p:nvSpPr>
+          <p:spPr>
+            <a:xfrm>
+              <a:off x="6733070" y="2133408"/>
+              <a:ext cx="731369" cy="719645"/>
+            </a:xfrm>
+            <a:prstGeom prst="ellipse">
+              <a:avLst/>
+            </a:prstGeom>
+            <a:gradFill flip="none" rotWithShape="1">
+              <a:gsLst>
+                <a:gs pos="0">
+                  <a:schemeClr val="accent4">
+                    <a:tint val="66000"/>
+                    <a:satMod val="160000"/>
+                  </a:schemeClr>
+                </a:gs>
+                <a:gs pos="50000">
+                  <a:schemeClr val="accent4">
+                    <a:tint val="44500"/>
+                    <a:satMod val="160000"/>
+                  </a:schemeClr>
+                </a:gs>
+                <a:gs pos="100000">
+                  <a:schemeClr val="accent4">
+                    <a:tint val="23500"/>
+                    <a:satMod val="160000"/>
+                  </a:schemeClr>
+                </a:gs>
+              </a:gsLst>
+              <a:lin ang="18900000" scaled="1"/>
+              <a:tileRect/>
+            </a:gradFill>
+            <a:ln w="76200" cmpd="thinThick">
+              <a:solidFill>
+                <a:schemeClr val="tx1"/>
+              </a:solidFill>
+            </a:ln>
+          </p:spPr>
+          <p:style>
+            <a:lnRef idx="0">
+              <a:schemeClr val="dk1"/>
+            </a:lnRef>
+            <a:fillRef idx="3">
+              <a:schemeClr val="dk1"/>
+            </a:fillRef>
+            <a:effectRef idx="3">
+              <a:schemeClr val="dk1"/>
+            </a:effectRef>
+            <a:fontRef idx="minor">
+              <a:schemeClr val="lt1"/>
+            </a:fontRef>
+          </p:style>
+          <p:txBody>
+            <a:bodyPr rtlCol="0" anchor="ctr"/>
+            <a:lstStyle/>
+            <a:p>
+              <a:pPr algn="ctr"/>
+              <a:endParaRPr lang="en-GB"/>
+            </a:p>
+          </p:txBody>
+        </p:sp>
+        <p:sp>
+          <p:nvSpPr>
+            <p:cNvPr id="20" name="Half Frame 19"/>
+            <p:cNvSpPr/>
+            <p:nvPr/>
+          </p:nvSpPr>
+          <p:spPr>
+            <a:xfrm flipV="1">
+              <a:off x="6918342" y="2331918"/>
+              <a:ext cx="354433" cy="322883"/>
+            </a:xfrm>
+            <a:prstGeom prst="halfFrame">
+              <a:avLst>
+                <a:gd name="adj1" fmla="val 5680"/>
+                <a:gd name="adj2" fmla="val 5680"/>
+              </a:avLst>
+            </a:prstGeom>
+            <a:solidFill>
+              <a:schemeClr val="accent4"/>
+            </a:solidFill>
+            <a:ln w="28575">
+              <a:solidFill>
+                <a:schemeClr val="tx1"/>
+              </a:solidFill>
+            </a:ln>
+          </p:spPr>
+          <p:style>
+            <a:lnRef idx="2">
+              <a:schemeClr val="accent1">
+                <a:shade val="50000"/>
+              </a:schemeClr>
+            </a:lnRef>
+            <a:fillRef idx="1">
+              <a:schemeClr val="accent1"/>
+            </a:fillRef>
+            <a:effectRef idx="0">
+              <a:schemeClr val="accent1"/>
+            </a:effectRef>
+            <a:fontRef idx="minor">
+              <a:schemeClr val="lt1"/>
+            </a:fontRef>
+          </p:style>
+          <p:txBody>
+            <a:bodyPr rtlCol="0" anchor="ctr"/>
+            <a:lstStyle/>
+            <a:p>
+              <a:pPr algn="ctr"/>
+              <a:endParaRPr lang="en-GB">
+                <a:solidFill>
+                  <a:schemeClr val="tx1"/>
+                </a:solidFill>
+              </a:endParaRPr>
+            </a:p>
+          </p:txBody>
+        </p:sp>
+        <p:cxnSp>
+          <p:nvCxnSpPr>
+            <p:cNvPr id="22" name="Curved Connector 21"/>
+            <p:cNvCxnSpPr/>
+            <p:nvPr/>
+          </p:nvCxnSpPr>
+          <p:spPr>
+            <a:xfrm flipV="1">
+              <a:off x="6955104" y="2371355"/>
+              <a:ext cx="280792" cy="239928"/>
+            </a:xfrm>
+            <a:prstGeom prst="curvedConnector3">
+              <a:avLst>
+                <a:gd name="adj1" fmla="val 50000"/>
+              </a:avLst>
+            </a:prstGeom>
+            <a:ln w="19050">
+              <a:solidFill>
+                <a:schemeClr val="accent4"/>
+              </a:solidFill>
+            </a:ln>
+          </p:spPr>
+          <p:style>
+            <a:lnRef idx="1">
+              <a:schemeClr val="accent1"/>
+            </a:lnRef>
+            <a:fillRef idx="0">
+              <a:schemeClr val="accent1"/>
+            </a:fillRef>
+            <a:effectRef idx="0">
+              <a:schemeClr val="accent1"/>
+            </a:effectRef>
+            <a:fontRef idx="minor">
+              <a:schemeClr val="tx1"/>
+            </a:fontRef>
+          </p:style>
+        </p:cxnSp>
+        <p:sp>
+          <p:nvSpPr>
+            <p:cNvPr id="25" name="Oval 24"/>
+            <p:cNvSpPr/>
+            <p:nvPr/>
+          </p:nvSpPr>
+          <p:spPr>
+            <a:xfrm>
+              <a:off x="6971392" y="2578095"/>
+              <a:ext cx="24076" cy="23057"/>
+            </a:xfrm>
+            <a:prstGeom prst="ellipse">
+              <a:avLst/>
+            </a:prstGeom>
+            <a:solidFill>
+              <a:schemeClr val="accent4"/>
+            </a:solidFill>
+            <a:ln>
+              <a:solidFill>
+                <a:schemeClr val="accent4">
+                  <a:lumMod val="50000"/>
+                </a:schemeClr>
+              </a:solidFill>
+            </a:ln>
+          </p:spPr>
+          <p:style>
+            <a:lnRef idx="2">
+              <a:schemeClr val="accent1">
+                <a:shade val="50000"/>
+              </a:schemeClr>
+            </a:lnRef>
+            <a:fillRef idx="1">
+              <a:schemeClr val="accent1"/>
+            </a:fillRef>
+            <a:effectRef idx="0">
+              <a:schemeClr val="accent1"/>
+            </a:effectRef>
+            <a:fontRef idx="minor">
+              <a:schemeClr val="lt1"/>
+            </a:fontRef>
+          </p:style>
+          <p:txBody>
+            <a:bodyPr rtlCol="0" anchor="ctr"/>
+            <a:lstStyle/>
+            <a:p>
+              <a:pPr algn="ctr"/>
+              <a:endParaRPr lang="en-GB"/>
+            </a:p>
+          </p:txBody>
+        </p:sp>
+        <p:sp>
+          <p:nvSpPr>
+            <p:cNvPr id="26" name="Oval 25"/>
+            <p:cNvSpPr/>
+            <p:nvPr/>
+          </p:nvSpPr>
+          <p:spPr>
+            <a:xfrm>
+              <a:off x="7031463" y="2596577"/>
+              <a:ext cx="24076" cy="23057"/>
+            </a:xfrm>
+            <a:prstGeom prst="ellipse">
+              <a:avLst/>
+            </a:prstGeom>
+            <a:solidFill>
+              <a:schemeClr val="accent4"/>
+            </a:solidFill>
+            <a:ln>
+              <a:solidFill>
+                <a:schemeClr val="accent4">
+                  <a:lumMod val="50000"/>
+                </a:schemeClr>
+              </a:solidFill>
+            </a:ln>
+          </p:spPr>
+          <p:style>
+            <a:lnRef idx="2">
+              <a:schemeClr val="accent1">
+                <a:shade val="50000"/>
+              </a:schemeClr>
+            </a:lnRef>
+            <a:fillRef idx="1">
+              <a:schemeClr val="accent1"/>
+            </a:fillRef>
+            <a:effectRef idx="0">
+              <a:schemeClr val="accent1"/>
+            </a:effectRef>
+            <a:fontRef idx="minor">
+              <a:schemeClr val="lt1"/>
+            </a:fontRef>
+          </p:style>
+          <p:txBody>
+            <a:bodyPr rtlCol="0" anchor="ctr"/>
+            <a:lstStyle/>
+            <a:p>
+              <a:pPr algn="ctr"/>
+              <a:endParaRPr lang="en-GB"/>
+            </a:p>
+          </p:txBody>
+        </p:sp>
+        <p:sp>
+          <p:nvSpPr>
+            <p:cNvPr id="27" name="Oval 26"/>
+            <p:cNvSpPr/>
+            <p:nvPr/>
+          </p:nvSpPr>
+          <p:spPr>
+            <a:xfrm>
+              <a:off x="7071183" y="2541256"/>
+              <a:ext cx="24076" cy="23057"/>
+            </a:xfrm>
+            <a:prstGeom prst="ellipse">
+              <a:avLst/>
+            </a:prstGeom>
+            <a:solidFill>
+              <a:schemeClr val="accent4"/>
+            </a:solidFill>
+            <a:ln>
+              <a:solidFill>
+                <a:schemeClr val="accent4">
+                  <a:lumMod val="50000"/>
+                </a:schemeClr>
+              </a:solidFill>
+            </a:ln>
+          </p:spPr>
+          <p:style>
+            <a:lnRef idx="2">
+              <a:schemeClr val="accent1">
+                <a:shade val="50000"/>
+              </a:schemeClr>
+            </a:lnRef>
+            <a:fillRef idx="1">
+              <a:schemeClr val="accent1"/>
+            </a:fillRef>
+            <a:effectRef idx="0">
+              <a:schemeClr val="accent1"/>
+            </a:effectRef>
+            <a:fontRef idx="minor">
+              <a:schemeClr val="lt1"/>
+            </a:fontRef>
+          </p:style>
+          <p:txBody>
+            <a:bodyPr rtlCol="0" anchor="ctr"/>
+            <a:lstStyle/>
+            <a:p>
+              <a:pPr algn="ctr"/>
+              <a:endParaRPr lang="en-GB"/>
+            </a:p>
+          </p:txBody>
+        </p:sp>
+        <p:sp>
+          <p:nvSpPr>
+            <p:cNvPr id="28" name="Oval 27"/>
+            <p:cNvSpPr/>
+            <p:nvPr/>
+          </p:nvSpPr>
+          <p:spPr>
+            <a:xfrm>
+              <a:off x="7103362" y="2458542"/>
+              <a:ext cx="24076" cy="23057"/>
+            </a:xfrm>
+            <a:prstGeom prst="ellipse">
+              <a:avLst/>
+            </a:prstGeom>
+            <a:solidFill>
+              <a:schemeClr val="accent4"/>
+            </a:solidFill>
+            <a:ln>
+              <a:solidFill>
+                <a:schemeClr val="accent4">
+                  <a:lumMod val="50000"/>
+                </a:schemeClr>
+              </a:solidFill>
+            </a:ln>
+          </p:spPr>
+          <p:style>
+            <a:lnRef idx="2">
+              <a:schemeClr val="accent1">
+                <a:shade val="50000"/>
+              </a:schemeClr>
+            </a:lnRef>
+            <a:fillRef idx="1">
+              <a:schemeClr val="accent1"/>
+            </a:fillRef>
+            <a:effectRef idx="0">
+              <a:schemeClr val="accent1"/>
+            </a:effectRef>
+            <a:fontRef idx="minor">
+              <a:schemeClr val="lt1"/>
+            </a:fontRef>
+          </p:style>
+          <p:txBody>
+            <a:bodyPr rtlCol="0" anchor="ctr"/>
+            <a:lstStyle/>
+            <a:p>
+              <a:pPr algn="ctr"/>
+              <a:endParaRPr lang="en-GB"/>
+            </a:p>
+          </p:txBody>
+        </p:sp>
+        <p:sp>
+          <p:nvSpPr>
+            <p:cNvPr id="29" name="Oval 28"/>
+            <p:cNvSpPr/>
+            <p:nvPr/>
+          </p:nvSpPr>
+          <p:spPr>
+            <a:xfrm>
+              <a:off x="7124059" y="2383628"/>
+              <a:ext cx="24076" cy="23057"/>
+            </a:xfrm>
+            <a:prstGeom prst="ellipse">
+              <a:avLst/>
+            </a:prstGeom>
+            <a:solidFill>
+              <a:schemeClr val="accent4"/>
+            </a:solidFill>
+            <a:ln>
+              <a:solidFill>
+                <a:schemeClr val="accent4">
+                  <a:lumMod val="50000"/>
+                </a:schemeClr>
+              </a:solidFill>
+            </a:ln>
+          </p:spPr>
+          <p:style>
+            <a:lnRef idx="2">
+              <a:schemeClr val="accent1">
+                <a:shade val="50000"/>
+              </a:schemeClr>
+            </a:lnRef>
+            <a:fillRef idx="1">
+              <a:schemeClr val="accent1"/>
+            </a:fillRef>
+            <a:effectRef idx="0">
+              <a:schemeClr val="accent1"/>
+            </a:effectRef>
+            <a:fontRef idx="minor">
+              <a:schemeClr val="lt1"/>
+            </a:fontRef>
+          </p:style>
+          <p:txBody>
+            <a:bodyPr rtlCol="0" anchor="ctr"/>
+            <a:lstStyle/>
+            <a:p>
+              <a:pPr algn="ctr"/>
+              <a:endParaRPr lang="en-GB"/>
+            </a:p>
+          </p:txBody>
+        </p:sp>
+        <p:sp>
+          <p:nvSpPr>
+            <p:cNvPr id="30" name="Oval 29"/>
+            <p:cNvSpPr/>
+            <p:nvPr/>
+          </p:nvSpPr>
+          <p:spPr>
+            <a:xfrm>
+              <a:off x="7211820" y="2383079"/>
+              <a:ext cx="24076" cy="23057"/>
+            </a:xfrm>
+            <a:prstGeom prst="ellipse">
+              <a:avLst/>
+            </a:prstGeom>
+            <a:solidFill>
+              <a:schemeClr val="accent4"/>
+            </a:solidFill>
+            <a:ln>
+              <a:solidFill>
+                <a:schemeClr val="accent4">
+                  <a:lumMod val="50000"/>
+                </a:schemeClr>
+              </a:solidFill>
+            </a:ln>
+          </p:spPr>
+          <p:style>
+            <a:lnRef idx="2">
+              <a:schemeClr val="accent1">
+                <a:shade val="50000"/>
+              </a:schemeClr>
+            </a:lnRef>
+            <a:fillRef idx="1">
+              <a:schemeClr val="accent1"/>
+            </a:fillRef>
+            <a:effectRef idx="0">
+              <a:schemeClr val="accent1"/>
+            </a:effectRef>
+            <a:fontRef idx="minor">
+              <a:schemeClr val="lt1"/>
+            </a:fontRef>
+          </p:style>
+          <p:txBody>
+            <a:bodyPr rtlCol="0" anchor="ctr"/>
+            <a:lstStyle/>
+            <a:p>
+              <a:pPr algn="ctr"/>
+              <a:endParaRPr lang="en-GB"/>
+            </a:p>
+          </p:txBody>
+        </p:sp>
+      </p:grpSp>
+      <p:sp>
+        <p:nvSpPr>
+          <p:cNvPr id="33" name="Rectangle 32"/>
+          <p:cNvSpPr/>
+          <p:nvPr/>
+        </p:nvSpPr>
+        <p:spPr>
+          <a:xfrm>
+            <a:off x="3510941" y="2141841"/>
+            <a:ext cx="1116000" cy="1044000"/>
+          </a:xfrm>
+          <a:prstGeom prst="rect">
+            <a:avLst/>
+          </a:prstGeom>
+          <a:solidFill>
+            <a:schemeClr val="accent4">
+              <a:lumMod val="40000"/>
+              <a:lumOff val="60000"/>
+            </a:schemeClr>
+          </a:solidFill>
+          <a:ln w="76200">
+            <a:solidFill>
+              <a:schemeClr val="tx1"/>
+            </a:solidFill>
+          </a:ln>
+        </p:spPr>
+        <p:txBody>
+          <a:bodyPr wrap="square" lIns="91440" tIns="45720" rIns="91440" bIns="45720">
+            <a:spAutoFit/>
+          </a:bodyPr>
+          <a:lstStyle/>
+          <a:p>
+            <a:pPr algn="ctr"/>
+            <a:r>
+              <a:rPr lang="en-US" sz="5400" i="1" dirty="0" err="1">
+                <a:ln w="0"/>
+                <a:effectLst>
+                  <a:outerShdw blurRad="38100" dist="19050" dir="2700000" algn="tl" rotWithShape="0">
+                    <a:schemeClr val="dk1">
+                      <a:alpha val="40000"/>
+                    </a:schemeClr>
+                  </a:outerShdw>
+                </a:effectLst>
+              </a:rPr>
+              <a:t>f</a:t>
+            </a:r>
+            <a:r>
+              <a:rPr lang="en-US" sz="5400" i="1" dirty="0" err="1" smtClean="0">
+                <a:ln w="0"/>
+                <a:effectLst>
+                  <a:outerShdw blurRad="38100" dist="19050" dir="2700000" algn="tl" rotWithShape="0">
+                    <a:schemeClr val="dk1">
+                      <a:alpha val="40000"/>
+                    </a:schemeClr>
+                  </a:outerShdw>
+                </a:effectLst>
+              </a:rPr>
+              <a:t>n</a:t>
+            </a:r>
+            <a:endParaRPr lang="en-US" sz="5400" i="1" dirty="0">
+              <a:ln w="0"/>
+              <a:effectLst>
+                <a:outerShdw blurRad="38100" dist="19050" dir="2700000" algn="tl" rotWithShape="0">
+                  <a:schemeClr val="dk1">
+                    <a:alpha val="40000"/>
+                  </a:schemeClr>
+                </a:outerShdw>
+              </a:effectLst>
+            </a:endParaRPr>
+          </a:p>
+        </p:txBody>
+      </p:sp>
+      <p:grpSp>
+        <p:nvGrpSpPr>
+          <p:cNvPr id="14" name="Group 13"/>
+          <p:cNvGrpSpPr/>
+          <p:nvPr/>
+        </p:nvGrpSpPr>
+        <p:grpSpPr>
+          <a:xfrm>
+            <a:off x="740770" y="3636081"/>
+            <a:ext cx="988437" cy="1027904"/>
+            <a:chOff x="740770" y="3636081"/>
+            <a:chExt cx="988437" cy="1027904"/>
+          </a:xfrm>
+        </p:grpSpPr>
+        <p:sp>
+          <p:nvSpPr>
+            <p:cNvPr id="41" name="Flowchart: Document 40"/>
+            <p:cNvSpPr/>
+            <p:nvPr/>
+          </p:nvSpPr>
+          <p:spPr>
+            <a:xfrm flipV="1">
+              <a:off x="740770" y="3636081"/>
+              <a:ext cx="988437" cy="1018572"/>
+            </a:xfrm>
+            <a:prstGeom prst="flowChartDocument">
+              <a:avLst/>
+            </a:prstGeom>
+            <a:solidFill>
+              <a:schemeClr val="accent4">
+                <a:lumMod val="75000"/>
+              </a:schemeClr>
+            </a:solidFill>
+            <a:ln w="76200">
+              <a:solidFill>
+                <a:schemeClr val="tx1"/>
+              </a:solidFill>
+            </a:ln>
+          </p:spPr>
+          <p:style>
+            <a:lnRef idx="2">
+              <a:schemeClr val="accent1">
+                <a:shade val="50000"/>
+              </a:schemeClr>
+            </a:lnRef>
+            <a:fillRef idx="1">
+              <a:schemeClr val="accent1"/>
+            </a:fillRef>
+            <a:effectRef idx="0">
+              <a:schemeClr val="accent1"/>
+            </a:effectRef>
+            <a:fontRef idx="minor">
+              <a:schemeClr val="lt1"/>
+            </a:fontRef>
+          </p:style>
+          <p:txBody>
+            <a:bodyPr rtlCol="0" anchor="ctr"/>
+            <a:lstStyle/>
+            <a:p>
+              <a:pPr algn="ctr"/>
+              <a:endParaRPr lang="en-GB"/>
+            </a:p>
+          </p:txBody>
+        </p:sp>
+        <p:sp>
+          <p:nvSpPr>
+            <p:cNvPr id="43" name="Parallelogram 59"/>
+            <p:cNvSpPr/>
+            <p:nvPr/>
+          </p:nvSpPr>
+          <p:spPr>
+            <a:xfrm>
+              <a:off x="740770" y="3917371"/>
+              <a:ext cx="988437" cy="746614"/>
+            </a:xfrm>
+            <a:prstGeom prst="rect">
+              <a:avLst/>
+            </a:prstGeom>
+            <a:solidFill>
+              <a:schemeClr val="accent4"/>
+            </a:solidFill>
+            <a:ln w="76200">
+              <a:solidFill>
+                <a:schemeClr val="tx1"/>
+              </a:solidFill>
+            </a:ln>
+          </p:spPr>
+          <p:style>
+            <a:lnRef idx="2">
+              <a:schemeClr val="accent1">
+                <a:shade val="50000"/>
+              </a:schemeClr>
+            </a:lnRef>
+            <a:fillRef idx="1">
+              <a:schemeClr val="accent1"/>
+            </a:fillRef>
+            <a:effectRef idx="0">
+              <a:schemeClr val="accent1"/>
+            </a:effectRef>
+            <a:fontRef idx="minor">
+              <a:schemeClr val="lt1"/>
+            </a:fontRef>
+          </p:style>
+          <p:txBody>
+            <a:bodyPr rtlCol="0" anchor="ctr"/>
+            <a:lstStyle/>
+            <a:p>
+              <a:pPr algn="ctr"/>
+              <a:endParaRPr lang="en-GB"/>
+            </a:p>
+          </p:txBody>
+        </p:sp>
+        <p:sp>
+          <p:nvSpPr>
+            <p:cNvPr id="50" name="Curved Down Arrow 49"/>
+            <p:cNvSpPr/>
+            <p:nvPr/>
+          </p:nvSpPr>
+          <p:spPr>
+            <a:xfrm>
+              <a:off x="880360" y="4145367"/>
+              <a:ext cx="365403" cy="365638"/>
+            </a:xfrm>
+            <a:prstGeom prst="curvedDownArrow">
+              <a:avLst>
+                <a:gd name="adj1" fmla="val 37679"/>
+                <a:gd name="adj2" fmla="val 50000"/>
+                <a:gd name="adj3" fmla="val 25709"/>
+              </a:avLst>
+            </a:prstGeom>
+            <a:solidFill>
+              <a:schemeClr val="accent4"/>
+            </a:solidFill>
+            <a:ln>
+              <a:solidFill>
+                <a:schemeClr val="tx1"/>
+              </a:solidFill>
+            </a:ln>
+          </p:spPr>
+          <p:style>
+            <a:lnRef idx="2">
+              <a:schemeClr val="accent1">
+                <a:shade val="50000"/>
+              </a:schemeClr>
+            </a:lnRef>
+            <a:fillRef idx="1">
+              <a:schemeClr val="accent1"/>
+            </a:fillRef>
+            <a:effectRef idx="0">
+              <a:schemeClr val="accent1"/>
+            </a:effectRef>
+            <a:fontRef idx="minor">
+              <a:schemeClr val="lt1"/>
+            </a:fontRef>
+          </p:style>
+          <p:txBody>
+            <a:bodyPr rtlCol="0" anchor="ctr"/>
+            <a:lstStyle/>
+            <a:p>
+              <a:pPr algn="ctr"/>
+              <a:endParaRPr lang="en-GB">
+                <a:ln>
+                  <a:solidFill>
+                    <a:sysClr val="windowText" lastClr="000000"/>
+                  </a:solidFill>
+                </a:ln>
+              </a:endParaRPr>
+            </a:p>
+          </p:txBody>
+        </p:sp>
+      </p:grpSp>
+      <p:grpSp>
+        <p:nvGrpSpPr>
+          <p:cNvPr id="19" name="Group 18"/>
+          <p:cNvGrpSpPr/>
+          <p:nvPr/>
+        </p:nvGrpSpPr>
+        <p:grpSpPr>
+          <a:xfrm>
+            <a:off x="4879402" y="2115486"/>
+            <a:ext cx="1368000" cy="1163288"/>
+            <a:chOff x="4879402" y="2115486"/>
+            <a:chExt cx="1368000" cy="1163288"/>
+          </a:xfrm>
+        </p:grpSpPr>
+        <p:sp>
+          <p:nvSpPr>
+            <p:cNvPr id="55" name="Rectangle 54"/>
+            <p:cNvSpPr/>
+            <p:nvPr/>
+          </p:nvSpPr>
+          <p:spPr>
+            <a:xfrm>
+              <a:off x="5315546" y="2115486"/>
+              <a:ext cx="782030" cy="1150761"/>
+            </a:xfrm>
+            <a:prstGeom prst="rect">
+              <a:avLst/>
+            </a:prstGeom>
+            <a:solidFill>
+              <a:schemeClr val="accent4">
+                <a:lumMod val="20000"/>
+                <a:lumOff val="80000"/>
+              </a:schemeClr>
+            </a:solidFill>
+            <a:ln>
+              <a:noFill/>
+            </a:ln>
+          </p:spPr>
+          <p:style>
+            <a:lnRef idx="2">
+              <a:schemeClr val="accent1">
+                <a:shade val="50000"/>
+              </a:schemeClr>
+            </a:lnRef>
+            <a:fillRef idx="1">
+              <a:schemeClr val="accent1"/>
+            </a:fillRef>
+            <a:effectRef idx="0">
+              <a:schemeClr val="accent1"/>
+            </a:effectRef>
+            <a:fontRef idx="minor">
+              <a:schemeClr val="lt1"/>
+            </a:fontRef>
+          </p:style>
+          <p:txBody>
+            <a:bodyPr rtlCol="0" anchor="ctr"/>
+            <a:lstStyle/>
+            <a:p>
+              <a:pPr algn="ctr"/>
+              <a:endParaRPr lang="en-GB"/>
+            </a:p>
+          </p:txBody>
+        </p:sp>
+        <p:sp>
+          <p:nvSpPr>
+            <p:cNvPr id="42" name="Half Frame 41"/>
+            <p:cNvSpPr/>
+            <p:nvPr/>
+          </p:nvSpPr>
+          <p:spPr>
+            <a:xfrm flipV="1">
+              <a:off x="4879402" y="2115486"/>
+              <a:ext cx="1368000" cy="1163288"/>
+            </a:xfrm>
+            <a:prstGeom prst="halfFrame">
+              <a:avLst>
+                <a:gd name="adj1" fmla="val 2042"/>
+                <a:gd name="adj2" fmla="val 2418"/>
+              </a:avLst>
+            </a:prstGeom>
+            <a:solidFill>
+              <a:schemeClr val="accent4"/>
+            </a:solidFill>
+            <a:ln w="76200">
+              <a:solidFill>
+                <a:schemeClr val="tx1"/>
+              </a:solidFill>
+            </a:ln>
+          </p:spPr>
+          <p:style>
+            <a:lnRef idx="2">
+              <a:schemeClr val="accent1">
+                <a:shade val="50000"/>
+              </a:schemeClr>
+            </a:lnRef>
+            <a:fillRef idx="1">
+              <a:schemeClr val="accent1"/>
+            </a:fillRef>
+            <a:effectRef idx="0">
+              <a:schemeClr val="accent1"/>
+            </a:effectRef>
+            <a:fontRef idx="minor">
+              <a:schemeClr val="lt1"/>
+            </a:fontRef>
+          </p:style>
+          <p:txBody>
+            <a:bodyPr rtlCol="0" anchor="ctr"/>
+            <a:lstStyle/>
+            <a:p>
+              <a:pPr algn="ctr"/>
+              <a:endParaRPr lang="en-GB">
+                <a:solidFill>
+                  <a:schemeClr val="tx1"/>
+                </a:solidFill>
+              </a:endParaRPr>
+            </a:p>
+          </p:txBody>
+        </p:sp>
+        <p:sp>
+          <p:nvSpPr>
+            <p:cNvPr id="44" name="Oval 43"/>
+            <p:cNvSpPr/>
+            <p:nvPr/>
+          </p:nvSpPr>
+          <p:spPr>
+            <a:xfrm>
+              <a:off x="5363685" y="3040603"/>
+              <a:ext cx="61064" cy="83070"/>
+            </a:xfrm>
+            <a:prstGeom prst="ellipse">
+              <a:avLst/>
+            </a:prstGeom>
+            <a:solidFill>
+              <a:schemeClr val="tx1"/>
+            </a:solidFill>
+            <a:ln>
+              <a:solidFill>
+                <a:schemeClr val="tx1"/>
+              </a:solidFill>
+            </a:ln>
+          </p:spPr>
+          <p:style>
+            <a:lnRef idx="2">
+              <a:schemeClr val="accent1">
+                <a:shade val="50000"/>
+              </a:schemeClr>
+            </a:lnRef>
+            <a:fillRef idx="1">
+              <a:schemeClr val="accent1"/>
+            </a:fillRef>
+            <a:effectRef idx="0">
+              <a:schemeClr val="accent1"/>
+            </a:effectRef>
+            <a:fontRef idx="minor">
+              <a:schemeClr val="lt1"/>
+            </a:fontRef>
+          </p:style>
+          <p:txBody>
+            <a:bodyPr rtlCol="0" anchor="ctr"/>
+            <a:lstStyle/>
+            <a:p>
+              <a:pPr algn="ctr"/>
+              <a:endParaRPr lang="en-GB"/>
+            </a:p>
+          </p:txBody>
+        </p:sp>
+        <p:sp>
+          <p:nvSpPr>
+            <p:cNvPr id="45" name="Oval 44"/>
+            <p:cNvSpPr/>
+            <p:nvPr/>
+          </p:nvSpPr>
+          <p:spPr>
+            <a:xfrm>
+              <a:off x="5516046" y="3107189"/>
+              <a:ext cx="61064" cy="83070"/>
+            </a:xfrm>
+            <a:prstGeom prst="ellipse">
+              <a:avLst/>
+            </a:prstGeom>
+            <a:solidFill>
+              <a:schemeClr val="tx1"/>
+            </a:solidFill>
+            <a:ln>
+              <a:solidFill>
+                <a:schemeClr val="tx1"/>
+              </a:solidFill>
+            </a:ln>
+          </p:spPr>
+          <p:style>
+            <a:lnRef idx="2">
+              <a:schemeClr val="accent1">
+                <a:shade val="50000"/>
+              </a:schemeClr>
+            </a:lnRef>
+            <a:fillRef idx="1">
+              <a:schemeClr val="accent1"/>
+            </a:fillRef>
+            <a:effectRef idx="0">
+              <a:schemeClr val="accent1"/>
+            </a:effectRef>
+            <a:fontRef idx="minor">
+              <a:schemeClr val="lt1"/>
+            </a:fontRef>
+          </p:style>
+          <p:txBody>
+            <a:bodyPr rtlCol="0" anchor="ctr"/>
+            <a:lstStyle/>
+            <a:p>
+              <a:pPr algn="ctr"/>
+              <a:endParaRPr lang="en-GB"/>
+            </a:p>
+          </p:txBody>
+        </p:sp>
+        <p:sp>
+          <p:nvSpPr>
+            <p:cNvPr id="46" name="Oval 45"/>
+            <p:cNvSpPr/>
+            <p:nvPr/>
+          </p:nvSpPr>
+          <p:spPr>
+            <a:xfrm>
+              <a:off x="5616789" y="2907878"/>
+              <a:ext cx="61064" cy="83070"/>
+            </a:xfrm>
+            <a:prstGeom prst="ellipse">
+              <a:avLst/>
+            </a:prstGeom>
+            <a:solidFill>
+              <a:schemeClr val="tx1"/>
+            </a:solidFill>
+            <a:ln>
+              <a:solidFill>
+                <a:schemeClr val="tx1"/>
+              </a:solidFill>
+            </a:ln>
+          </p:spPr>
+          <p:style>
+            <a:lnRef idx="2">
+              <a:schemeClr val="accent1">
+                <a:shade val="50000"/>
+              </a:schemeClr>
+            </a:lnRef>
+            <a:fillRef idx="1">
+              <a:schemeClr val="accent1"/>
+            </a:fillRef>
+            <a:effectRef idx="0">
+              <a:schemeClr val="accent1"/>
+            </a:effectRef>
+            <a:fontRef idx="minor">
+              <a:schemeClr val="lt1"/>
+            </a:fontRef>
+          </p:style>
+          <p:txBody>
+            <a:bodyPr rtlCol="0" anchor="ctr"/>
+            <a:lstStyle/>
+            <a:p>
+              <a:pPr algn="ctr"/>
+              <a:endParaRPr lang="en-GB"/>
+            </a:p>
+          </p:txBody>
+        </p:sp>
+        <p:sp>
+          <p:nvSpPr>
+            <p:cNvPr id="47" name="Oval 46"/>
+            <p:cNvSpPr/>
+            <p:nvPr/>
+          </p:nvSpPr>
+          <p:spPr>
+            <a:xfrm>
+              <a:off x="5698406" y="2609876"/>
+              <a:ext cx="61064" cy="83070"/>
+            </a:xfrm>
+            <a:prstGeom prst="ellipse">
+              <a:avLst/>
+            </a:prstGeom>
+            <a:solidFill>
+              <a:schemeClr val="tx1"/>
+            </a:solidFill>
+            <a:ln>
+              <a:solidFill>
+                <a:schemeClr val="tx1"/>
+              </a:solidFill>
+            </a:ln>
+          </p:spPr>
+          <p:style>
+            <a:lnRef idx="2">
+              <a:schemeClr val="accent1">
+                <a:shade val="50000"/>
+              </a:schemeClr>
+            </a:lnRef>
+            <a:fillRef idx="1">
+              <a:schemeClr val="accent1"/>
+            </a:fillRef>
+            <a:effectRef idx="0">
+              <a:schemeClr val="accent1"/>
+            </a:effectRef>
+            <a:fontRef idx="minor">
+              <a:schemeClr val="lt1"/>
+            </a:fontRef>
+          </p:style>
+          <p:txBody>
+            <a:bodyPr rtlCol="0" anchor="ctr"/>
+            <a:lstStyle/>
+            <a:p>
+              <a:pPr algn="ctr"/>
+              <a:endParaRPr lang="en-GB"/>
+            </a:p>
+          </p:txBody>
+        </p:sp>
+        <p:sp>
+          <p:nvSpPr>
+            <p:cNvPr id="48" name="Oval 47"/>
+            <p:cNvSpPr/>
+            <p:nvPr/>
+          </p:nvSpPr>
+          <p:spPr>
+            <a:xfrm>
+              <a:off x="5750901" y="2339974"/>
+              <a:ext cx="61064" cy="83070"/>
+            </a:xfrm>
+            <a:prstGeom prst="ellipse">
+              <a:avLst/>
+            </a:prstGeom>
+            <a:solidFill>
+              <a:schemeClr val="tx1"/>
+            </a:solidFill>
+            <a:ln>
+              <a:solidFill>
+                <a:schemeClr val="tx1"/>
+              </a:solidFill>
+            </a:ln>
+          </p:spPr>
+          <p:style>
+            <a:lnRef idx="2">
+              <a:schemeClr val="accent1">
+                <a:shade val="50000"/>
+              </a:schemeClr>
+            </a:lnRef>
+            <a:fillRef idx="1">
+              <a:schemeClr val="accent1"/>
+            </a:fillRef>
+            <a:effectRef idx="0">
+              <a:schemeClr val="accent1"/>
+            </a:effectRef>
+            <a:fontRef idx="minor">
+              <a:schemeClr val="lt1"/>
+            </a:fontRef>
+          </p:style>
+          <p:txBody>
+            <a:bodyPr rtlCol="0" anchor="ctr"/>
+            <a:lstStyle/>
+            <a:p>
+              <a:pPr algn="ctr"/>
+              <a:endParaRPr lang="en-GB"/>
+            </a:p>
+          </p:txBody>
+        </p:sp>
+        <p:sp>
+          <p:nvSpPr>
+            <p:cNvPr id="49" name="Oval 48"/>
+            <p:cNvSpPr/>
+            <p:nvPr/>
+          </p:nvSpPr>
+          <p:spPr>
+            <a:xfrm>
+              <a:off x="5973493" y="2337996"/>
+              <a:ext cx="61064" cy="83070"/>
+            </a:xfrm>
+            <a:prstGeom prst="ellipse">
+              <a:avLst/>
+            </a:prstGeom>
+            <a:solidFill>
+              <a:schemeClr val="tx1"/>
+            </a:solidFill>
+            <a:ln>
+              <a:solidFill>
+                <a:schemeClr val="tx1"/>
+              </a:solidFill>
+            </a:ln>
+          </p:spPr>
+          <p:style>
+            <a:lnRef idx="2">
+              <a:schemeClr val="accent1">
+                <a:shade val="50000"/>
+              </a:schemeClr>
+            </a:lnRef>
+            <a:fillRef idx="1">
+              <a:schemeClr val="accent1"/>
+            </a:fillRef>
+            <a:effectRef idx="0">
+              <a:schemeClr val="accent1"/>
+            </a:effectRef>
+            <a:fontRef idx="minor">
+              <a:schemeClr val="lt1"/>
+            </a:fontRef>
+          </p:style>
+          <p:txBody>
+            <a:bodyPr rtlCol="0" anchor="ctr"/>
+            <a:lstStyle/>
+            <a:p>
+              <a:pPr algn="ctr"/>
+              <a:endParaRPr lang="en-GB"/>
+            </a:p>
+          </p:txBody>
+        </p:sp>
+        <p:sp>
+          <p:nvSpPr>
+            <p:cNvPr id="52" name="Oval 51"/>
+            <p:cNvSpPr/>
+            <p:nvPr/>
+          </p:nvSpPr>
+          <p:spPr>
+            <a:xfrm>
+              <a:off x="5224711" y="3082795"/>
+              <a:ext cx="61064" cy="83070"/>
+            </a:xfrm>
+            <a:prstGeom prst="ellipse">
+              <a:avLst/>
+            </a:prstGeom>
+            <a:solidFill>
+              <a:schemeClr val="tx1"/>
+            </a:solidFill>
+            <a:ln>
+              <a:solidFill>
+                <a:schemeClr val="tx1"/>
+              </a:solidFill>
+            </a:ln>
+          </p:spPr>
+          <p:style>
+            <a:lnRef idx="2">
+              <a:schemeClr val="accent1">
+                <a:shade val="50000"/>
+              </a:schemeClr>
+            </a:lnRef>
+            <a:fillRef idx="1">
+              <a:schemeClr val="accent1"/>
+            </a:fillRef>
+            <a:effectRef idx="0">
+              <a:schemeClr val="accent1"/>
+            </a:effectRef>
+            <a:fontRef idx="minor">
+              <a:schemeClr val="lt1"/>
+            </a:fontRef>
+          </p:style>
+          <p:txBody>
+            <a:bodyPr rtlCol="0" anchor="ctr"/>
+            <a:lstStyle/>
+            <a:p>
+              <a:pPr algn="ctr"/>
+              <a:endParaRPr lang="en-GB"/>
+            </a:p>
+          </p:txBody>
+        </p:sp>
+        <p:sp>
+          <p:nvSpPr>
+            <p:cNvPr id="53" name="Oval 52"/>
+            <p:cNvSpPr/>
+            <p:nvPr/>
+          </p:nvSpPr>
+          <p:spPr>
+            <a:xfrm>
+              <a:off x="5066942" y="3046338"/>
+              <a:ext cx="61064" cy="83070"/>
+            </a:xfrm>
+            <a:prstGeom prst="ellipse">
+              <a:avLst/>
+            </a:prstGeom>
+            <a:solidFill>
+              <a:schemeClr val="tx1"/>
+            </a:solidFill>
+            <a:ln>
+              <a:solidFill>
+                <a:schemeClr val="tx1"/>
+              </a:solidFill>
+            </a:ln>
+          </p:spPr>
+          <p:style>
+            <a:lnRef idx="2">
+              <a:schemeClr val="accent1">
+                <a:shade val="50000"/>
+              </a:schemeClr>
+            </a:lnRef>
+            <a:fillRef idx="1">
+              <a:schemeClr val="accent1"/>
+            </a:fillRef>
+            <a:effectRef idx="0">
+              <a:schemeClr val="accent1"/>
+            </a:effectRef>
+            <a:fontRef idx="minor">
+              <a:schemeClr val="lt1"/>
+            </a:fontRef>
+          </p:style>
+          <p:txBody>
+            <a:bodyPr rtlCol="0" anchor="ctr"/>
+            <a:lstStyle/>
+            <a:p>
+              <a:pPr algn="ctr"/>
+              <a:endParaRPr lang="en-GB"/>
+            </a:p>
+          </p:txBody>
+        </p:sp>
+        <p:sp>
+          <p:nvSpPr>
+            <p:cNvPr id="54" name="Oval 53"/>
+            <p:cNvSpPr/>
+            <p:nvPr/>
+          </p:nvSpPr>
+          <p:spPr>
+            <a:xfrm>
+              <a:off x="6124180" y="2259555"/>
+              <a:ext cx="61064" cy="83070"/>
+            </a:xfrm>
+            <a:prstGeom prst="ellipse">
+              <a:avLst/>
+            </a:prstGeom>
+            <a:solidFill>
+              <a:schemeClr val="tx1"/>
+            </a:solidFill>
+            <a:ln>
+              <a:solidFill>
+                <a:schemeClr val="tx1"/>
+              </a:solidFill>
+            </a:ln>
+          </p:spPr>
+          <p:style>
+            <a:lnRef idx="2">
+              <a:schemeClr val="accent1">
+                <a:shade val="50000"/>
+              </a:schemeClr>
+            </a:lnRef>
+            <a:fillRef idx="1">
+              <a:schemeClr val="accent1"/>
+            </a:fillRef>
+            <a:effectRef idx="0">
+              <a:schemeClr val="accent1"/>
+            </a:effectRef>
+            <a:fontRef idx="minor">
+              <a:schemeClr val="lt1"/>
+            </a:fontRef>
+          </p:style>
+          <p:txBody>
+            <a:bodyPr rtlCol="0" anchor="ctr"/>
+            <a:lstStyle/>
+            <a:p>
+              <a:pPr algn="ctr"/>
+              <a:endParaRPr lang="en-GB"/>
+            </a:p>
+          </p:txBody>
+        </p:sp>
+        <p:sp>
+          <p:nvSpPr>
+            <p:cNvPr id="18" name="Left-Right Arrow 17"/>
+            <p:cNvSpPr/>
+            <p:nvPr/>
+          </p:nvSpPr>
+          <p:spPr>
+            <a:xfrm>
+              <a:off x="5326306" y="2734510"/>
+              <a:ext cx="760510" cy="137649"/>
+            </a:xfrm>
+            <a:prstGeom prst="leftRightArrow">
+              <a:avLst/>
+            </a:prstGeom>
+            <a:solidFill>
+              <a:schemeClr val="tx1"/>
+            </a:solidFill>
+            <a:ln>
+              <a:solidFill>
+                <a:schemeClr val="accent4">
+                  <a:lumMod val="75000"/>
+                </a:schemeClr>
+              </a:solidFill>
+            </a:ln>
+          </p:spPr>
+          <p:style>
+            <a:lnRef idx="2">
+              <a:schemeClr val="accent1">
+                <a:shade val="50000"/>
+              </a:schemeClr>
+            </a:lnRef>
+            <a:fillRef idx="1">
+              <a:schemeClr val="accent1"/>
+            </a:fillRef>
+            <a:effectRef idx="0">
+              <a:schemeClr val="accent1"/>
+            </a:effectRef>
+            <a:fontRef idx="minor">
+              <a:schemeClr val="lt1"/>
+            </a:fontRef>
+          </p:style>
+          <p:txBody>
+            <a:bodyPr rtlCol="0" anchor="ctr"/>
+            <a:lstStyle/>
+            <a:p>
+              <a:pPr algn="ctr"/>
+              <a:endParaRPr lang="en-GB"/>
+            </a:p>
+          </p:txBody>
+        </p:sp>
+      </p:grpSp>
+    </p:spTree>
+    <p:extLst>
+      <p:ext uri="{BB962C8B-B14F-4D97-AF65-F5344CB8AC3E}">
+        <p14:creationId xmlns:p14="http://schemas.microsoft.com/office/powerpoint/2010/main" val="1136330313"/>
+      </p:ext>
+    </p:extLst>
+  </p:cSld>
+  <p:clrMapOvr>
+    <a:masterClrMapping/>
+  </p:clrMapOvr>
+</p:sld>
+</file>
+
 <file path=ppt/theme/theme1.xml><?xml version="1.0" encoding="utf-8"?>
 <a:theme xmlns:a="http://schemas.openxmlformats.org/drawingml/2006/main" name="Office Theme">
   <a:themeElements>

</xml_diff>

<commit_message>
Continuing with update GUI; selecting function from library
transferring selected func to main doesn't work yet
</commit_message>
<xml_diff>
--- a/Resources/Other/Icons.pptx
+++ b/Resources/Other/Icons.pptx
@@ -246,7 +246,7 @@
           <a:p>
             <a:fld id="{D8455722-239A-4E54-8AF4-0299CA751C05}" type="datetimeFigureOut">
               <a:rPr lang="en-GB" smtClean="0"/>
-              <a:t>09/01/2018</a:t>
+              <a:t>10/01/2018</a:t>
             </a:fld>
             <a:endParaRPr lang="en-GB"/>
           </a:p>
@@ -416,7 +416,7 @@
           <a:p>
             <a:fld id="{D8455722-239A-4E54-8AF4-0299CA751C05}" type="datetimeFigureOut">
               <a:rPr lang="en-GB" smtClean="0"/>
-              <a:t>09/01/2018</a:t>
+              <a:t>10/01/2018</a:t>
             </a:fld>
             <a:endParaRPr lang="en-GB"/>
           </a:p>
@@ -596,7 +596,7 @@
           <a:p>
             <a:fld id="{D8455722-239A-4E54-8AF4-0299CA751C05}" type="datetimeFigureOut">
               <a:rPr lang="en-GB" smtClean="0"/>
-              <a:t>09/01/2018</a:t>
+              <a:t>10/01/2018</a:t>
             </a:fld>
             <a:endParaRPr lang="en-GB"/>
           </a:p>
@@ -766,7 +766,7 @@
           <a:p>
             <a:fld id="{D8455722-239A-4E54-8AF4-0299CA751C05}" type="datetimeFigureOut">
               <a:rPr lang="en-GB" smtClean="0"/>
-              <a:t>09/01/2018</a:t>
+              <a:t>10/01/2018</a:t>
             </a:fld>
             <a:endParaRPr lang="en-GB"/>
           </a:p>
@@ -1012,7 +1012,7 @@
           <a:p>
             <a:fld id="{D8455722-239A-4E54-8AF4-0299CA751C05}" type="datetimeFigureOut">
               <a:rPr lang="en-GB" smtClean="0"/>
-              <a:t>09/01/2018</a:t>
+              <a:t>10/01/2018</a:t>
             </a:fld>
             <a:endParaRPr lang="en-GB"/>
           </a:p>
@@ -1244,7 +1244,7 @@
           <a:p>
             <a:fld id="{D8455722-239A-4E54-8AF4-0299CA751C05}" type="datetimeFigureOut">
               <a:rPr lang="en-GB" smtClean="0"/>
-              <a:t>09/01/2018</a:t>
+              <a:t>10/01/2018</a:t>
             </a:fld>
             <a:endParaRPr lang="en-GB"/>
           </a:p>
@@ -1611,7 +1611,7 @@
           <a:p>
             <a:fld id="{D8455722-239A-4E54-8AF4-0299CA751C05}" type="datetimeFigureOut">
               <a:rPr lang="en-GB" smtClean="0"/>
-              <a:t>09/01/2018</a:t>
+              <a:t>10/01/2018</a:t>
             </a:fld>
             <a:endParaRPr lang="en-GB"/>
           </a:p>
@@ -1729,7 +1729,7 @@
           <a:p>
             <a:fld id="{D8455722-239A-4E54-8AF4-0299CA751C05}" type="datetimeFigureOut">
               <a:rPr lang="en-GB" smtClean="0"/>
-              <a:t>09/01/2018</a:t>
+              <a:t>10/01/2018</a:t>
             </a:fld>
             <a:endParaRPr lang="en-GB"/>
           </a:p>
@@ -1824,7 +1824,7 @@
           <a:p>
             <a:fld id="{D8455722-239A-4E54-8AF4-0299CA751C05}" type="datetimeFigureOut">
               <a:rPr lang="en-GB" smtClean="0"/>
-              <a:t>09/01/2018</a:t>
+              <a:t>10/01/2018</a:t>
             </a:fld>
             <a:endParaRPr lang="en-GB"/>
           </a:p>
@@ -2101,7 +2101,7 @@
           <a:p>
             <a:fld id="{D8455722-239A-4E54-8AF4-0299CA751C05}" type="datetimeFigureOut">
               <a:rPr lang="en-GB" smtClean="0"/>
-              <a:t>09/01/2018</a:t>
+              <a:t>10/01/2018</a:t>
             </a:fld>
             <a:endParaRPr lang="en-GB"/>
           </a:p>
@@ -2354,7 +2354,7 @@
           <a:p>
             <a:fld id="{D8455722-239A-4E54-8AF4-0299CA751C05}" type="datetimeFigureOut">
               <a:rPr lang="en-GB" smtClean="0"/>
-              <a:t>09/01/2018</a:t>
+              <a:t>10/01/2018</a:t>
             </a:fld>
             <a:endParaRPr lang="en-GB"/>
           </a:p>
@@ -2567,7 +2567,7 @@
           <a:p>
             <a:fld id="{D8455722-239A-4E54-8AF4-0299CA751C05}" type="datetimeFigureOut">
               <a:rPr lang="en-GB" smtClean="0"/>
-              <a:t>09/01/2018</a:t>
+              <a:t>10/01/2018</a:t>
             </a:fld>
             <a:endParaRPr lang="en-GB"/>
           </a:p>
@@ -8109,6 +8109,607 @@
                 <a:schemeClr val="tx1"/>
               </a:solidFill>
               <a:prstDash val="dash"/>
+            </a:ln>
+          </p:spPr>
+          <p:style>
+            <a:lnRef idx="2">
+              <a:schemeClr val="accent1">
+                <a:shade val="50000"/>
+              </a:schemeClr>
+            </a:lnRef>
+            <a:fillRef idx="1">
+              <a:schemeClr val="accent1"/>
+            </a:fillRef>
+            <a:effectRef idx="0">
+              <a:schemeClr val="accent1"/>
+            </a:effectRef>
+            <a:fontRef idx="minor">
+              <a:schemeClr val="lt1"/>
+            </a:fontRef>
+          </p:style>
+          <p:txBody>
+            <a:bodyPr rtlCol="0" anchor="ctr"/>
+            <a:lstStyle/>
+            <a:p>
+              <a:pPr algn="ctr"/>
+              <a:endParaRPr lang="en-GB"/>
+            </a:p>
+          </p:txBody>
+        </p:sp>
+      </p:grpSp>
+      <p:grpSp>
+        <p:nvGrpSpPr>
+          <p:cNvPr id="70" name="Group 69"/>
+          <p:cNvGrpSpPr/>
+          <p:nvPr/>
+        </p:nvGrpSpPr>
+        <p:grpSpPr>
+          <a:xfrm>
+            <a:off x="7040353" y="4656975"/>
+            <a:ext cx="1368000" cy="1163288"/>
+            <a:chOff x="4879402" y="2115486"/>
+            <a:chExt cx="1368000" cy="1163288"/>
+          </a:xfrm>
+        </p:grpSpPr>
+        <p:sp>
+          <p:nvSpPr>
+            <p:cNvPr id="71" name="Rectangle 70"/>
+            <p:cNvSpPr/>
+            <p:nvPr/>
+          </p:nvSpPr>
+          <p:spPr>
+            <a:xfrm>
+              <a:off x="5315546" y="2115486"/>
+              <a:ext cx="782030" cy="1150761"/>
+            </a:xfrm>
+            <a:prstGeom prst="rect">
+              <a:avLst/>
+            </a:prstGeom>
+            <a:solidFill>
+              <a:schemeClr val="accent4">
+                <a:lumMod val="20000"/>
+                <a:lumOff val="80000"/>
+              </a:schemeClr>
+            </a:solidFill>
+            <a:ln>
+              <a:noFill/>
+            </a:ln>
+          </p:spPr>
+          <p:style>
+            <a:lnRef idx="2">
+              <a:schemeClr val="accent1">
+                <a:shade val="50000"/>
+              </a:schemeClr>
+            </a:lnRef>
+            <a:fillRef idx="1">
+              <a:schemeClr val="accent1"/>
+            </a:fillRef>
+            <a:effectRef idx="0">
+              <a:schemeClr val="accent1"/>
+            </a:effectRef>
+            <a:fontRef idx="minor">
+              <a:schemeClr val="lt1"/>
+            </a:fontRef>
+          </p:style>
+          <p:txBody>
+            <a:bodyPr rtlCol="0" anchor="ctr"/>
+            <a:lstStyle/>
+            <a:p>
+              <a:pPr algn="ctr"/>
+              <a:endParaRPr lang="en-GB"/>
+            </a:p>
+          </p:txBody>
+        </p:sp>
+        <p:sp>
+          <p:nvSpPr>
+            <p:cNvPr id="72" name="Half Frame 71"/>
+            <p:cNvSpPr/>
+            <p:nvPr/>
+          </p:nvSpPr>
+          <p:spPr>
+            <a:xfrm flipV="1">
+              <a:off x="4879402" y="2115486"/>
+              <a:ext cx="1368000" cy="1163288"/>
+            </a:xfrm>
+            <a:prstGeom prst="halfFrame">
+              <a:avLst>
+                <a:gd name="adj1" fmla="val 2042"/>
+                <a:gd name="adj2" fmla="val 2418"/>
+              </a:avLst>
+            </a:prstGeom>
+            <a:solidFill>
+              <a:schemeClr val="accent4"/>
+            </a:solidFill>
+            <a:ln w="76200">
+              <a:solidFill>
+                <a:schemeClr val="tx1"/>
+              </a:solidFill>
+            </a:ln>
+          </p:spPr>
+          <p:style>
+            <a:lnRef idx="2">
+              <a:schemeClr val="accent1">
+                <a:shade val="50000"/>
+              </a:schemeClr>
+            </a:lnRef>
+            <a:fillRef idx="1">
+              <a:schemeClr val="accent1"/>
+            </a:fillRef>
+            <a:effectRef idx="0">
+              <a:schemeClr val="accent1"/>
+            </a:effectRef>
+            <a:fontRef idx="minor">
+              <a:schemeClr val="lt1"/>
+            </a:fontRef>
+          </p:style>
+          <p:txBody>
+            <a:bodyPr rtlCol="0" anchor="ctr"/>
+            <a:lstStyle/>
+            <a:p>
+              <a:pPr algn="ctr"/>
+              <a:endParaRPr lang="en-GB">
+                <a:solidFill>
+                  <a:schemeClr val="tx1"/>
+                </a:solidFill>
+              </a:endParaRPr>
+            </a:p>
+          </p:txBody>
+        </p:sp>
+        <p:sp>
+          <p:nvSpPr>
+            <p:cNvPr id="73" name="Oval 72"/>
+            <p:cNvSpPr/>
+            <p:nvPr/>
+          </p:nvSpPr>
+          <p:spPr>
+            <a:xfrm>
+              <a:off x="5363685" y="3040603"/>
+              <a:ext cx="61064" cy="83070"/>
+            </a:xfrm>
+            <a:prstGeom prst="ellipse">
+              <a:avLst/>
+            </a:prstGeom>
+            <a:solidFill>
+              <a:schemeClr val="tx1"/>
+            </a:solidFill>
+            <a:ln>
+              <a:solidFill>
+                <a:schemeClr val="tx1"/>
+              </a:solidFill>
+            </a:ln>
+          </p:spPr>
+          <p:style>
+            <a:lnRef idx="2">
+              <a:schemeClr val="accent1">
+                <a:shade val="50000"/>
+              </a:schemeClr>
+            </a:lnRef>
+            <a:fillRef idx="1">
+              <a:schemeClr val="accent1"/>
+            </a:fillRef>
+            <a:effectRef idx="0">
+              <a:schemeClr val="accent1"/>
+            </a:effectRef>
+            <a:fontRef idx="minor">
+              <a:schemeClr val="lt1"/>
+            </a:fontRef>
+          </p:style>
+          <p:txBody>
+            <a:bodyPr rtlCol="0" anchor="ctr"/>
+            <a:lstStyle/>
+            <a:p>
+              <a:pPr algn="ctr"/>
+              <a:endParaRPr lang="en-GB"/>
+            </a:p>
+          </p:txBody>
+        </p:sp>
+        <p:sp>
+          <p:nvSpPr>
+            <p:cNvPr id="74" name="Oval 73"/>
+            <p:cNvSpPr/>
+            <p:nvPr/>
+          </p:nvSpPr>
+          <p:spPr>
+            <a:xfrm>
+              <a:off x="5516046" y="3107189"/>
+              <a:ext cx="61064" cy="83070"/>
+            </a:xfrm>
+            <a:prstGeom prst="ellipse">
+              <a:avLst/>
+            </a:prstGeom>
+            <a:solidFill>
+              <a:schemeClr val="tx1"/>
+            </a:solidFill>
+            <a:ln>
+              <a:solidFill>
+                <a:schemeClr val="tx1"/>
+              </a:solidFill>
+            </a:ln>
+          </p:spPr>
+          <p:style>
+            <a:lnRef idx="2">
+              <a:schemeClr val="accent1">
+                <a:shade val="50000"/>
+              </a:schemeClr>
+            </a:lnRef>
+            <a:fillRef idx="1">
+              <a:schemeClr val="accent1"/>
+            </a:fillRef>
+            <a:effectRef idx="0">
+              <a:schemeClr val="accent1"/>
+            </a:effectRef>
+            <a:fontRef idx="minor">
+              <a:schemeClr val="lt1"/>
+            </a:fontRef>
+          </p:style>
+          <p:txBody>
+            <a:bodyPr rtlCol="0" anchor="ctr"/>
+            <a:lstStyle/>
+            <a:p>
+              <a:pPr algn="ctr"/>
+              <a:endParaRPr lang="en-GB"/>
+            </a:p>
+          </p:txBody>
+        </p:sp>
+        <p:sp>
+          <p:nvSpPr>
+            <p:cNvPr id="75" name="Oval 74"/>
+            <p:cNvSpPr/>
+            <p:nvPr/>
+          </p:nvSpPr>
+          <p:spPr>
+            <a:xfrm>
+              <a:off x="5616789" y="2907878"/>
+              <a:ext cx="61064" cy="83070"/>
+            </a:xfrm>
+            <a:prstGeom prst="ellipse">
+              <a:avLst/>
+            </a:prstGeom>
+            <a:solidFill>
+              <a:schemeClr val="tx1"/>
+            </a:solidFill>
+            <a:ln>
+              <a:solidFill>
+                <a:schemeClr val="tx1"/>
+              </a:solidFill>
+            </a:ln>
+          </p:spPr>
+          <p:style>
+            <a:lnRef idx="2">
+              <a:schemeClr val="accent1">
+                <a:shade val="50000"/>
+              </a:schemeClr>
+            </a:lnRef>
+            <a:fillRef idx="1">
+              <a:schemeClr val="accent1"/>
+            </a:fillRef>
+            <a:effectRef idx="0">
+              <a:schemeClr val="accent1"/>
+            </a:effectRef>
+            <a:fontRef idx="minor">
+              <a:schemeClr val="lt1"/>
+            </a:fontRef>
+          </p:style>
+          <p:txBody>
+            <a:bodyPr rtlCol="0" anchor="ctr"/>
+            <a:lstStyle/>
+            <a:p>
+              <a:pPr algn="ctr"/>
+              <a:endParaRPr lang="en-GB"/>
+            </a:p>
+          </p:txBody>
+        </p:sp>
+        <p:sp>
+          <p:nvSpPr>
+            <p:cNvPr id="76" name="Oval 75"/>
+            <p:cNvSpPr/>
+            <p:nvPr/>
+          </p:nvSpPr>
+          <p:spPr>
+            <a:xfrm>
+              <a:off x="5698406" y="2609876"/>
+              <a:ext cx="61064" cy="83070"/>
+            </a:xfrm>
+            <a:prstGeom prst="ellipse">
+              <a:avLst/>
+            </a:prstGeom>
+            <a:solidFill>
+              <a:schemeClr val="tx1"/>
+            </a:solidFill>
+            <a:ln>
+              <a:solidFill>
+                <a:schemeClr val="tx1"/>
+              </a:solidFill>
+            </a:ln>
+          </p:spPr>
+          <p:style>
+            <a:lnRef idx="2">
+              <a:schemeClr val="accent1">
+                <a:shade val="50000"/>
+              </a:schemeClr>
+            </a:lnRef>
+            <a:fillRef idx="1">
+              <a:schemeClr val="accent1"/>
+            </a:fillRef>
+            <a:effectRef idx="0">
+              <a:schemeClr val="accent1"/>
+            </a:effectRef>
+            <a:fontRef idx="minor">
+              <a:schemeClr val="lt1"/>
+            </a:fontRef>
+          </p:style>
+          <p:txBody>
+            <a:bodyPr rtlCol="0" anchor="ctr"/>
+            <a:lstStyle/>
+            <a:p>
+              <a:pPr algn="ctr"/>
+              <a:endParaRPr lang="en-GB"/>
+            </a:p>
+          </p:txBody>
+        </p:sp>
+        <p:sp>
+          <p:nvSpPr>
+            <p:cNvPr id="77" name="Oval 76"/>
+            <p:cNvSpPr/>
+            <p:nvPr/>
+          </p:nvSpPr>
+          <p:spPr>
+            <a:xfrm>
+              <a:off x="5750901" y="2339974"/>
+              <a:ext cx="61064" cy="83070"/>
+            </a:xfrm>
+            <a:prstGeom prst="ellipse">
+              <a:avLst/>
+            </a:prstGeom>
+            <a:solidFill>
+              <a:schemeClr val="tx1"/>
+            </a:solidFill>
+            <a:ln>
+              <a:solidFill>
+                <a:schemeClr val="tx1"/>
+              </a:solidFill>
+            </a:ln>
+          </p:spPr>
+          <p:style>
+            <a:lnRef idx="2">
+              <a:schemeClr val="accent1">
+                <a:shade val="50000"/>
+              </a:schemeClr>
+            </a:lnRef>
+            <a:fillRef idx="1">
+              <a:schemeClr val="accent1"/>
+            </a:fillRef>
+            <a:effectRef idx="0">
+              <a:schemeClr val="accent1"/>
+            </a:effectRef>
+            <a:fontRef idx="minor">
+              <a:schemeClr val="lt1"/>
+            </a:fontRef>
+          </p:style>
+          <p:txBody>
+            <a:bodyPr rtlCol="0" anchor="ctr"/>
+            <a:lstStyle/>
+            <a:p>
+              <a:pPr algn="ctr"/>
+              <a:endParaRPr lang="en-GB"/>
+            </a:p>
+          </p:txBody>
+        </p:sp>
+        <p:sp>
+          <p:nvSpPr>
+            <p:cNvPr id="78" name="Oval 77"/>
+            <p:cNvSpPr/>
+            <p:nvPr/>
+          </p:nvSpPr>
+          <p:spPr>
+            <a:xfrm>
+              <a:off x="5973493" y="2337996"/>
+              <a:ext cx="61064" cy="83070"/>
+            </a:xfrm>
+            <a:prstGeom prst="ellipse">
+              <a:avLst/>
+            </a:prstGeom>
+            <a:solidFill>
+              <a:schemeClr val="tx1"/>
+            </a:solidFill>
+            <a:ln>
+              <a:solidFill>
+                <a:schemeClr val="tx1"/>
+              </a:solidFill>
+            </a:ln>
+          </p:spPr>
+          <p:style>
+            <a:lnRef idx="2">
+              <a:schemeClr val="accent1">
+                <a:shade val="50000"/>
+              </a:schemeClr>
+            </a:lnRef>
+            <a:fillRef idx="1">
+              <a:schemeClr val="accent1"/>
+            </a:fillRef>
+            <a:effectRef idx="0">
+              <a:schemeClr val="accent1"/>
+            </a:effectRef>
+            <a:fontRef idx="minor">
+              <a:schemeClr val="lt1"/>
+            </a:fontRef>
+          </p:style>
+          <p:txBody>
+            <a:bodyPr rtlCol="0" anchor="ctr"/>
+            <a:lstStyle/>
+            <a:p>
+              <a:pPr algn="ctr"/>
+              <a:endParaRPr lang="en-GB"/>
+            </a:p>
+          </p:txBody>
+        </p:sp>
+        <p:sp>
+          <p:nvSpPr>
+            <p:cNvPr id="79" name="Oval 78"/>
+            <p:cNvSpPr/>
+            <p:nvPr/>
+          </p:nvSpPr>
+          <p:spPr>
+            <a:xfrm>
+              <a:off x="5224711" y="3082795"/>
+              <a:ext cx="61064" cy="83070"/>
+            </a:xfrm>
+            <a:prstGeom prst="ellipse">
+              <a:avLst/>
+            </a:prstGeom>
+            <a:solidFill>
+              <a:schemeClr val="tx1"/>
+            </a:solidFill>
+            <a:ln>
+              <a:solidFill>
+                <a:schemeClr val="tx1"/>
+              </a:solidFill>
+            </a:ln>
+          </p:spPr>
+          <p:style>
+            <a:lnRef idx="2">
+              <a:schemeClr val="accent1">
+                <a:shade val="50000"/>
+              </a:schemeClr>
+            </a:lnRef>
+            <a:fillRef idx="1">
+              <a:schemeClr val="accent1"/>
+            </a:fillRef>
+            <a:effectRef idx="0">
+              <a:schemeClr val="accent1"/>
+            </a:effectRef>
+            <a:fontRef idx="minor">
+              <a:schemeClr val="lt1"/>
+            </a:fontRef>
+          </p:style>
+          <p:txBody>
+            <a:bodyPr rtlCol="0" anchor="ctr"/>
+            <a:lstStyle/>
+            <a:p>
+              <a:pPr algn="ctr"/>
+              <a:endParaRPr lang="en-GB"/>
+            </a:p>
+          </p:txBody>
+        </p:sp>
+        <p:sp>
+          <p:nvSpPr>
+            <p:cNvPr id="80" name="Oval 79"/>
+            <p:cNvSpPr/>
+            <p:nvPr/>
+          </p:nvSpPr>
+          <p:spPr>
+            <a:xfrm>
+              <a:off x="5066942" y="3046338"/>
+              <a:ext cx="61064" cy="83070"/>
+            </a:xfrm>
+            <a:prstGeom prst="ellipse">
+              <a:avLst/>
+            </a:prstGeom>
+            <a:solidFill>
+              <a:schemeClr val="tx1"/>
+            </a:solidFill>
+            <a:ln>
+              <a:solidFill>
+                <a:schemeClr val="tx1"/>
+              </a:solidFill>
+            </a:ln>
+          </p:spPr>
+          <p:style>
+            <a:lnRef idx="2">
+              <a:schemeClr val="accent1">
+                <a:shade val="50000"/>
+              </a:schemeClr>
+            </a:lnRef>
+            <a:fillRef idx="1">
+              <a:schemeClr val="accent1"/>
+            </a:fillRef>
+            <a:effectRef idx="0">
+              <a:schemeClr val="accent1"/>
+            </a:effectRef>
+            <a:fontRef idx="minor">
+              <a:schemeClr val="lt1"/>
+            </a:fontRef>
+          </p:style>
+          <p:txBody>
+            <a:bodyPr rtlCol="0" anchor="ctr"/>
+            <a:lstStyle/>
+            <a:p>
+              <a:pPr algn="ctr"/>
+              <a:endParaRPr lang="en-GB"/>
+            </a:p>
+          </p:txBody>
+        </p:sp>
+        <p:sp>
+          <p:nvSpPr>
+            <p:cNvPr id="81" name="Oval 80"/>
+            <p:cNvSpPr/>
+            <p:nvPr/>
+          </p:nvSpPr>
+          <p:spPr>
+            <a:xfrm>
+              <a:off x="6124180" y="2259555"/>
+              <a:ext cx="61064" cy="83070"/>
+            </a:xfrm>
+            <a:prstGeom prst="ellipse">
+              <a:avLst/>
+            </a:prstGeom>
+            <a:solidFill>
+              <a:schemeClr val="tx1"/>
+            </a:solidFill>
+            <a:ln>
+              <a:solidFill>
+                <a:schemeClr val="tx1"/>
+              </a:solidFill>
+            </a:ln>
+          </p:spPr>
+          <p:style>
+            <a:lnRef idx="2">
+              <a:schemeClr val="accent1">
+                <a:shade val="50000"/>
+              </a:schemeClr>
+            </a:lnRef>
+            <a:fillRef idx="1">
+              <a:schemeClr val="accent1"/>
+            </a:fillRef>
+            <a:effectRef idx="0">
+              <a:schemeClr val="accent1"/>
+            </a:effectRef>
+            <a:fontRef idx="minor">
+              <a:schemeClr val="lt1"/>
+            </a:fontRef>
+          </p:style>
+          <p:txBody>
+            <a:bodyPr rtlCol="0" anchor="ctr"/>
+            <a:lstStyle/>
+            <a:p>
+              <a:pPr algn="ctr"/>
+              <a:endParaRPr lang="en-GB"/>
+            </a:p>
+          </p:txBody>
+        </p:sp>
+        <p:sp>
+          <p:nvSpPr>
+            <p:cNvPr id="82" name="Left-Right Arrow 81"/>
+            <p:cNvSpPr/>
+            <p:nvPr/>
+          </p:nvSpPr>
+          <p:spPr>
+            <a:xfrm>
+              <a:off x="5326306" y="2734510"/>
+              <a:ext cx="760510" cy="137649"/>
+            </a:xfrm>
+            <a:prstGeom prst="leftRightArrow">
+              <a:avLst/>
+            </a:prstGeom>
+            <a:solidFill>
+              <a:schemeClr val="tx1"/>
+            </a:solidFill>
+            <a:ln>
+              <a:solidFill>
+                <a:schemeClr val="accent4">
+                  <a:lumMod val="75000"/>
+                </a:schemeClr>
+              </a:solidFill>
             </a:ln>
           </p:spPr>
           <p:style>
@@ -9321,262 +9922,38 @@
       </p:grpSpPr>
       <p:grpSp>
         <p:nvGrpSpPr>
-          <p:cNvPr id="2" name="Group 1"/>
+          <p:cNvPr id="8" name="Group 7"/>
           <p:cNvGrpSpPr/>
           <p:nvPr/>
         </p:nvGrpSpPr>
         <p:grpSpPr>
           <a:xfrm>
-            <a:off x="740149" y="2119037"/>
-            <a:ext cx="1116000" cy="1044000"/>
-            <a:chOff x="740150" y="2119038"/>
-            <a:chExt cx="1099497" cy="1027903"/>
+            <a:off x="3408526" y="3605851"/>
+            <a:ext cx="1147174" cy="1044000"/>
+            <a:chOff x="740151" y="823053"/>
+            <a:chExt cx="1130209" cy="1027903"/>
           </a:xfrm>
         </p:grpSpPr>
-        <p:grpSp>
-          <p:nvGrpSpPr>
-            <p:cNvPr id="3" name="Group 2"/>
-            <p:cNvGrpSpPr/>
-            <p:nvPr/>
-          </p:nvGrpSpPr>
-          <p:grpSpPr>
-            <a:xfrm>
-              <a:off x="740150" y="2119038"/>
-              <a:ext cx="1099497" cy="1027903"/>
-              <a:chOff x="740151" y="823053"/>
-              <a:chExt cx="1099497" cy="1027903"/>
-            </a:xfrm>
-          </p:grpSpPr>
-          <p:sp>
-            <p:nvSpPr>
-              <p:cNvPr id="5" name="Flowchart: Document 4"/>
-              <p:cNvSpPr/>
-              <p:nvPr/>
-            </p:nvSpPr>
-            <p:spPr>
-              <a:xfrm flipV="1">
-                <a:off x="740151" y="823053"/>
-                <a:ext cx="988437" cy="1018572"/>
-              </a:xfrm>
-              <a:prstGeom prst="flowChartDocument">
-                <a:avLst/>
-              </a:prstGeom>
-              <a:solidFill>
-                <a:schemeClr val="accent4">
-                  <a:lumMod val="75000"/>
-                </a:schemeClr>
-              </a:solidFill>
-              <a:ln w="76200">
-                <a:solidFill>
-                  <a:schemeClr val="tx1"/>
-                </a:solidFill>
-              </a:ln>
-            </p:spPr>
-            <p:style>
-              <a:lnRef idx="2">
-                <a:schemeClr val="accent1">
-                  <a:shade val="50000"/>
-                </a:schemeClr>
-              </a:lnRef>
-              <a:fillRef idx="1">
-                <a:schemeClr val="accent1"/>
-              </a:fillRef>
-              <a:effectRef idx="0">
-                <a:schemeClr val="accent1"/>
-              </a:effectRef>
-              <a:fontRef idx="minor">
-                <a:schemeClr val="lt1"/>
-              </a:fontRef>
-            </p:style>
-            <p:txBody>
-              <a:bodyPr rtlCol="0" anchor="ctr"/>
-              <a:lstStyle/>
-              <a:p>
-                <a:pPr algn="ctr"/>
-                <a:endParaRPr lang="en-GB"/>
-              </a:p>
-            </p:txBody>
-          </p:sp>
-          <p:sp>
-            <p:nvSpPr>
-              <p:cNvPr id="6" name="Parallelogram 59"/>
-              <p:cNvSpPr/>
-              <p:nvPr/>
-            </p:nvSpPr>
-            <p:spPr>
-              <a:xfrm>
-                <a:off x="740151" y="1464951"/>
-                <a:ext cx="1099497" cy="386005"/>
-              </a:xfrm>
-              <a:custGeom>
-                <a:avLst/>
-                <a:gdLst>
-                  <a:gd name="connsiteX0" fmla="*/ 0 w 1405392"/>
-                  <a:gd name="connsiteY0" fmla="*/ 565949 h 565949"/>
-                  <a:gd name="connsiteX1" fmla="*/ 141487 w 1405392"/>
-                  <a:gd name="connsiteY1" fmla="*/ 0 h 565949"/>
-                  <a:gd name="connsiteX2" fmla="*/ 1405392 w 1405392"/>
-                  <a:gd name="connsiteY2" fmla="*/ 0 h 565949"/>
-                  <a:gd name="connsiteX3" fmla="*/ 1263905 w 1405392"/>
-                  <a:gd name="connsiteY3" fmla="*/ 565949 h 565949"/>
-                  <a:gd name="connsiteX4" fmla="*/ 0 w 1405392"/>
-                  <a:gd name="connsiteY4" fmla="*/ 565949 h 565949"/>
-                  <a:gd name="connsiteX0" fmla="*/ 0 w 1405392"/>
-                  <a:gd name="connsiteY0" fmla="*/ 577524 h 577524"/>
-                  <a:gd name="connsiteX1" fmla="*/ 361406 w 1405392"/>
-                  <a:gd name="connsiteY1" fmla="*/ 0 h 577524"/>
-                  <a:gd name="connsiteX2" fmla="*/ 1405392 w 1405392"/>
-                  <a:gd name="connsiteY2" fmla="*/ 11575 h 577524"/>
-                  <a:gd name="connsiteX3" fmla="*/ 1263905 w 1405392"/>
-                  <a:gd name="connsiteY3" fmla="*/ 577524 h 577524"/>
-                  <a:gd name="connsiteX4" fmla="*/ 0 w 1405392"/>
-                  <a:gd name="connsiteY4" fmla="*/ 577524 h 577524"/>
-                  <a:gd name="connsiteX0" fmla="*/ 0 w 1660035"/>
-                  <a:gd name="connsiteY0" fmla="*/ 589099 h 589099"/>
-                  <a:gd name="connsiteX1" fmla="*/ 361406 w 1660035"/>
-                  <a:gd name="connsiteY1" fmla="*/ 11575 h 589099"/>
-                  <a:gd name="connsiteX2" fmla="*/ 1660035 w 1660035"/>
-                  <a:gd name="connsiteY2" fmla="*/ 0 h 589099"/>
-                  <a:gd name="connsiteX3" fmla="*/ 1263905 w 1660035"/>
-                  <a:gd name="connsiteY3" fmla="*/ 589099 h 589099"/>
-                  <a:gd name="connsiteX4" fmla="*/ 0 w 1660035"/>
-                  <a:gd name="connsiteY4" fmla="*/ 589099 h 589099"/>
-                  <a:gd name="connsiteX0" fmla="*/ 0 w 1660035"/>
-                  <a:gd name="connsiteY0" fmla="*/ 589099 h 589099"/>
-                  <a:gd name="connsiteX1" fmla="*/ 361406 w 1660035"/>
-                  <a:gd name="connsiteY1" fmla="*/ 11575 h 589099"/>
-                  <a:gd name="connsiteX2" fmla="*/ 1660035 w 1660035"/>
-                  <a:gd name="connsiteY2" fmla="*/ 0 h 589099"/>
-                  <a:gd name="connsiteX3" fmla="*/ 1171308 w 1660035"/>
-                  <a:gd name="connsiteY3" fmla="*/ 589099 h 589099"/>
-                  <a:gd name="connsiteX4" fmla="*/ 0 w 1660035"/>
-                  <a:gd name="connsiteY4" fmla="*/ 589099 h 589099"/>
-                  <a:gd name="connsiteX0" fmla="*/ 0 w 1660035"/>
-                  <a:gd name="connsiteY0" fmla="*/ 589099 h 589099"/>
-                  <a:gd name="connsiteX1" fmla="*/ 234084 w 1660035"/>
-                  <a:gd name="connsiteY1" fmla="*/ 0 h 589099"/>
-                  <a:gd name="connsiteX2" fmla="*/ 1660035 w 1660035"/>
-                  <a:gd name="connsiteY2" fmla="*/ 0 h 589099"/>
-                  <a:gd name="connsiteX3" fmla="*/ 1171308 w 1660035"/>
-                  <a:gd name="connsiteY3" fmla="*/ 589099 h 589099"/>
-                  <a:gd name="connsiteX4" fmla="*/ 0 w 1660035"/>
-                  <a:gd name="connsiteY4" fmla="*/ 589099 h 589099"/>
-                  <a:gd name="connsiteX0" fmla="*/ 0 w 1660035"/>
-                  <a:gd name="connsiteY0" fmla="*/ 589099 h 598430"/>
-                  <a:gd name="connsiteX1" fmla="*/ 234084 w 1660035"/>
-                  <a:gd name="connsiteY1" fmla="*/ 0 h 598430"/>
-                  <a:gd name="connsiteX2" fmla="*/ 1660035 w 1660035"/>
-                  <a:gd name="connsiteY2" fmla="*/ 0 h 598430"/>
-                  <a:gd name="connsiteX3" fmla="*/ 1495320 w 1660035"/>
-                  <a:gd name="connsiteY3" fmla="*/ 598430 h 598430"/>
-                  <a:gd name="connsiteX4" fmla="*/ 0 w 1660035"/>
-                  <a:gd name="connsiteY4" fmla="*/ 589099 h 598430"/>
-                  <a:gd name="connsiteX0" fmla="*/ 0 w 1660035"/>
-                  <a:gd name="connsiteY0" fmla="*/ 589099 h 598430"/>
-                  <a:gd name="connsiteX1" fmla="*/ 234084 w 1660035"/>
-                  <a:gd name="connsiteY1" fmla="*/ 0 h 598430"/>
-                  <a:gd name="connsiteX2" fmla="*/ 1660035 w 1660035"/>
-                  <a:gd name="connsiteY2" fmla="*/ 0 h 598430"/>
-                  <a:gd name="connsiteX3" fmla="*/ 1453058 w 1660035"/>
-                  <a:gd name="connsiteY3" fmla="*/ 598430 h 598430"/>
-                  <a:gd name="connsiteX4" fmla="*/ 0 w 1660035"/>
-                  <a:gd name="connsiteY4" fmla="*/ 589099 h 598430"/>
-                </a:gdLst>
-                <a:ahLst/>
-                <a:cxnLst>
-                  <a:cxn ang="0">
-                    <a:pos x="connsiteX0" y="connsiteY0"/>
-                  </a:cxn>
-                  <a:cxn ang="0">
-                    <a:pos x="connsiteX1" y="connsiteY1"/>
-                  </a:cxn>
-                  <a:cxn ang="0">
-                    <a:pos x="connsiteX2" y="connsiteY2"/>
-                  </a:cxn>
-                  <a:cxn ang="0">
-                    <a:pos x="connsiteX3" y="connsiteY3"/>
-                  </a:cxn>
-                  <a:cxn ang="0">
-                    <a:pos x="connsiteX4" y="connsiteY4"/>
-                  </a:cxn>
-                </a:cxnLst>
-                <a:rect l="l" t="t" r="r" b="b"/>
-                <a:pathLst>
-                  <a:path w="1660035" h="598430">
-                    <a:moveTo>
-                      <a:pt x="0" y="589099"/>
-                    </a:moveTo>
-                    <a:lnTo>
-                      <a:pt x="234084" y="0"/>
-                    </a:lnTo>
-                    <a:lnTo>
-                      <a:pt x="1660035" y="0"/>
-                    </a:lnTo>
-                    <a:lnTo>
-                      <a:pt x="1453058" y="598430"/>
-                    </a:lnTo>
-                    <a:lnTo>
-                      <a:pt x="0" y="589099"/>
-                    </a:lnTo>
-                    <a:close/>
-                  </a:path>
-                </a:pathLst>
-              </a:custGeom>
-              <a:solidFill>
-                <a:schemeClr val="accent4"/>
-              </a:solidFill>
-              <a:ln w="76200">
-                <a:solidFill>
-                  <a:schemeClr val="tx1"/>
-                </a:solidFill>
-              </a:ln>
-            </p:spPr>
-            <p:style>
-              <a:lnRef idx="2">
-                <a:schemeClr val="accent1">
-                  <a:shade val="50000"/>
-                </a:schemeClr>
-              </a:lnRef>
-              <a:fillRef idx="1">
-                <a:schemeClr val="accent1"/>
-              </a:fillRef>
-              <a:effectRef idx="0">
-                <a:schemeClr val="accent1"/>
-              </a:effectRef>
-              <a:fontRef idx="minor">
-                <a:schemeClr val="lt1"/>
-              </a:fontRef>
-            </p:style>
-            <p:txBody>
-              <a:bodyPr rtlCol="0" anchor="ctr"/>
-              <a:lstStyle/>
-              <a:p>
-                <a:pPr algn="ctr"/>
-                <a:endParaRPr lang="en-GB"/>
-              </a:p>
-            </p:txBody>
-          </p:sp>
-        </p:grpSp>
         <p:sp>
           <p:nvSpPr>
-            <p:cNvPr id="4" name="Cross 3"/>
+            <p:cNvPr id="10" name="Flowchart: Document 9"/>
             <p:cNvSpPr/>
             <p:nvPr/>
           </p:nvSpPr>
           <p:spPr>
-            <a:xfrm>
-              <a:off x="874368" y="2280431"/>
-              <a:ext cx="360000" cy="360000"/>
+            <a:xfrm flipV="1">
+              <a:off x="740151" y="823053"/>
+              <a:ext cx="988437" cy="1018572"/>
             </a:xfrm>
-            <a:prstGeom prst="plus">
-              <a:avLst>
-                <a:gd name="adj" fmla="val 30755"/>
-              </a:avLst>
+            <a:prstGeom prst="flowChartDocument">
+              <a:avLst/>
             </a:prstGeom>
             <a:solidFill>
-              <a:schemeClr val="accent4"/>
+              <a:schemeClr val="accent4">
+                <a:lumMod val="75000"/>
+              </a:schemeClr>
             </a:solidFill>
-            <a:ln>
+            <a:ln w="76200">
               <a:solidFill>
                 <a:schemeClr val="tx1"/>
               </a:solidFill>
@@ -9603,277 +9980,139 @@
             <a:lstStyle/>
             <a:p>
               <a:pPr algn="ctr"/>
-              <a:endParaRPr lang="en-GB">
-                <a:ln>
-                  <a:solidFill>
-                    <a:sysClr val="windowText" lastClr="000000"/>
-                  </a:solidFill>
-                </a:ln>
-              </a:endParaRPr>
+              <a:endParaRPr lang="en-GB"/>
             </a:p>
           </p:txBody>
         </p:sp>
-      </p:grpSp>
-      <p:grpSp>
-        <p:nvGrpSpPr>
-          <p:cNvPr id="7" name="Group 6"/>
-          <p:cNvGrpSpPr/>
-          <p:nvPr/>
-        </p:nvGrpSpPr>
-        <p:grpSpPr>
-          <a:xfrm>
-            <a:off x="2109662" y="2114371"/>
-            <a:ext cx="1116000" cy="1044000"/>
-            <a:chOff x="740150" y="2119038"/>
-            <a:chExt cx="1099497" cy="1027903"/>
-          </a:xfrm>
-        </p:grpSpPr>
-        <p:grpSp>
-          <p:nvGrpSpPr>
-            <p:cNvPr id="8" name="Group 7"/>
-            <p:cNvGrpSpPr/>
-            <p:nvPr/>
-          </p:nvGrpSpPr>
-          <p:grpSpPr>
-            <a:xfrm>
-              <a:off x="740150" y="2119038"/>
-              <a:ext cx="1099497" cy="1027903"/>
-              <a:chOff x="740151" y="823053"/>
-              <a:chExt cx="1099497" cy="1027903"/>
-            </a:xfrm>
-          </p:grpSpPr>
-          <p:sp>
-            <p:nvSpPr>
-              <p:cNvPr id="10" name="Flowchart: Document 9"/>
-              <p:cNvSpPr/>
-              <p:nvPr/>
-            </p:nvSpPr>
-            <p:spPr>
-              <a:xfrm flipV="1">
-                <a:off x="740151" y="823053"/>
-                <a:ext cx="988437" cy="1018572"/>
-              </a:xfrm>
-              <a:prstGeom prst="flowChartDocument">
-                <a:avLst/>
-              </a:prstGeom>
-              <a:solidFill>
-                <a:schemeClr val="accent4">
-                  <a:lumMod val="75000"/>
-                </a:schemeClr>
-              </a:solidFill>
-              <a:ln w="76200">
-                <a:solidFill>
-                  <a:schemeClr val="tx1"/>
-                </a:solidFill>
-              </a:ln>
-            </p:spPr>
-            <p:style>
-              <a:lnRef idx="2">
-                <a:schemeClr val="accent1">
-                  <a:shade val="50000"/>
-                </a:schemeClr>
-              </a:lnRef>
-              <a:fillRef idx="1">
-                <a:schemeClr val="accent1"/>
-              </a:fillRef>
-              <a:effectRef idx="0">
-                <a:schemeClr val="accent1"/>
-              </a:effectRef>
-              <a:fontRef idx="minor">
-                <a:schemeClr val="lt1"/>
-              </a:fontRef>
-            </p:style>
-            <p:txBody>
-              <a:bodyPr rtlCol="0" anchor="ctr"/>
-              <a:lstStyle/>
-              <a:p>
-                <a:pPr algn="ctr"/>
-                <a:endParaRPr lang="en-GB"/>
-              </a:p>
-            </p:txBody>
-          </p:sp>
-          <p:sp>
-            <p:nvSpPr>
-              <p:cNvPr id="11" name="Parallelogram 59"/>
-              <p:cNvSpPr/>
-              <p:nvPr/>
-            </p:nvSpPr>
-            <p:spPr>
-              <a:xfrm>
-                <a:off x="740151" y="1464951"/>
-                <a:ext cx="1099497" cy="386005"/>
-              </a:xfrm>
-              <a:custGeom>
-                <a:avLst/>
-                <a:gdLst>
-                  <a:gd name="connsiteX0" fmla="*/ 0 w 1405392"/>
-                  <a:gd name="connsiteY0" fmla="*/ 565949 h 565949"/>
-                  <a:gd name="connsiteX1" fmla="*/ 141487 w 1405392"/>
-                  <a:gd name="connsiteY1" fmla="*/ 0 h 565949"/>
-                  <a:gd name="connsiteX2" fmla="*/ 1405392 w 1405392"/>
-                  <a:gd name="connsiteY2" fmla="*/ 0 h 565949"/>
-                  <a:gd name="connsiteX3" fmla="*/ 1263905 w 1405392"/>
-                  <a:gd name="connsiteY3" fmla="*/ 565949 h 565949"/>
-                  <a:gd name="connsiteX4" fmla="*/ 0 w 1405392"/>
-                  <a:gd name="connsiteY4" fmla="*/ 565949 h 565949"/>
-                  <a:gd name="connsiteX0" fmla="*/ 0 w 1405392"/>
-                  <a:gd name="connsiteY0" fmla="*/ 577524 h 577524"/>
-                  <a:gd name="connsiteX1" fmla="*/ 361406 w 1405392"/>
-                  <a:gd name="connsiteY1" fmla="*/ 0 h 577524"/>
-                  <a:gd name="connsiteX2" fmla="*/ 1405392 w 1405392"/>
-                  <a:gd name="connsiteY2" fmla="*/ 11575 h 577524"/>
-                  <a:gd name="connsiteX3" fmla="*/ 1263905 w 1405392"/>
-                  <a:gd name="connsiteY3" fmla="*/ 577524 h 577524"/>
-                  <a:gd name="connsiteX4" fmla="*/ 0 w 1405392"/>
-                  <a:gd name="connsiteY4" fmla="*/ 577524 h 577524"/>
-                  <a:gd name="connsiteX0" fmla="*/ 0 w 1660035"/>
-                  <a:gd name="connsiteY0" fmla="*/ 589099 h 589099"/>
-                  <a:gd name="connsiteX1" fmla="*/ 361406 w 1660035"/>
-                  <a:gd name="connsiteY1" fmla="*/ 11575 h 589099"/>
-                  <a:gd name="connsiteX2" fmla="*/ 1660035 w 1660035"/>
-                  <a:gd name="connsiteY2" fmla="*/ 0 h 589099"/>
-                  <a:gd name="connsiteX3" fmla="*/ 1263905 w 1660035"/>
-                  <a:gd name="connsiteY3" fmla="*/ 589099 h 589099"/>
-                  <a:gd name="connsiteX4" fmla="*/ 0 w 1660035"/>
-                  <a:gd name="connsiteY4" fmla="*/ 589099 h 589099"/>
-                  <a:gd name="connsiteX0" fmla="*/ 0 w 1660035"/>
-                  <a:gd name="connsiteY0" fmla="*/ 589099 h 589099"/>
-                  <a:gd name="connsiteX1" fmla="*/ 361406 w 1660035"/>
-                  <a:gd name="connsiteY1" fmla="*/ 11575 h 589099"/>
-                  <a:gd name="connsiteX2" fmla="*/ 1660035 w 1660035"/>
-                  <a:gd name="connsiteY2" fmla="*/ 0 h 589099"/>
-                  <a:gd name="connsiteX3" fmla="*/ 1171308 w 1660035"/>
-                  <a:gd name="connsiteY3" fmla="*/ 589099 h 589099"/>
-                  <a:gd name="connsiteX4" fmla="*/ 0 w 1660035"/>
-                  <a:gd name="connsiteY4" fmla="*/ 589099 h 589099"/>
-                  <a:gd name="connsiteX0" fmla="*/ 0 w 1660035"/>
-                  <a:gd name="connsiteY0" fmla="*/ 589099 h 589099"/>
-                  <a:gd name="connsiteX1" fmla="*/ 234084 w 1660035"/>
-                  <a:gd name="connsiteY1" fmla="*/ 0 h 589099"/>
-                  <a:gd name="connsiteX2" fmla="*/ 1660035 w 1660035"/>
-                  <a:gd name="connsiteY2" fmla="*/ 0 h 589099"/>
-                  <a:gd name="connsiteX3" fmla="*/ 1171308 w 1660035"/>
-                  <a:gd name="connsiteY3" fmla="*/ 589099 h 589099"/>
-                  <a:gd name="connsiteX4" fmla="*/ 0 w 1660035"/>
-                  <a:gd name="connsiteY4" fmla="*/ 589099 h 589099"/>
-                  <a:gd name="connsiteX0" fmla="*/ 0 w 1660035"/>
-                  <a:gd name="connsiteY0" fmla="*/ 589099 h 598430"/>
-                  <a:gd name="connsiteX1" fmla="*/ 234084 w 1660035"/>
-                  <a:gd name="connsiteY1" fmla="*/ 0 h 598430"/>
-                  <a:gd name="connsiteX2" fmla="*/ 1660035 w 1660035"/>
-                  <a:gd name="connsiteY2" fmla="*/ 0 h 598430"/>
-                  <a:gd name="connsiteX3" fmla="*/ 1495320 w 1660035"/>
-                  <a:gd name="connsiteY3" fmla="*/ 598430 h 598430"/>
-                  <a:gd name="connsiteX4" fmla="*/ 0 w 1660035"/>
-                  <a:gd name="connsiteY4" fmla="*/ 589099 h 598430"/>
-                  <a:gd name="connsiteX0" fmla="*/ 0 w 1660035"/>
-                  <a:gd name="connsiteY0" fmla="*/ 589099 h 598430"/>
-                  <a:gd name="connsiteX1" fmla="*/ 234084 w 1660035"/>
-                  <a:gd name="connsiteY1" fmla="*/ 0 h 598430"/>
-                  <a:gd name="connsiteX2" fmla="*/ 1660035 w 1660035"/>
-                  <a:gd name="connsiteY2" fmla="*/ 0 h 598430"/>
-                  <a:gd name="connsiteX3" fmla="*/ 1453058 w 1660035"/>
-                  <a:gd name="connsiteY3" fmla="*/ 598430 h 598430"/>
-                  <a:gd name="connsiteX4" fmla="*/ 0 w 1660035"/>
-                  <a:gd name="connsiteY4" fmla="*/ 589099 h 598430"/>
-                </a:gdLst>
-                <a:ahLst/>
-                <a:cxnLst>
-                  <a:cxn ang="0">
-                    <a:pos x="connsiteX0" y="connsiteY0"/>
-                  </a:cxn>
-                  <a:cxn ang="0">
-                    <a:pos x="connsiteX1" y="connsiteY1"/>
-                  </a:cxn>
-                  <a:cxn ang="0">
-                    <a:pos x="connsiteX2" y="connsiteY2"/>
-                  </a:cxn>
-                  <a:cxn ang="0">
-                    <a:pos x="connsiteX3" y="connsiteY3"/>
-                  </a:cxn>
-                  <a:cxn ang="0">
-                    <a:pos x="connsiteX4" y="connsiteY4"/>
-                  </a:cxn>
-                </a:cxnLst>
-                <a:rect l="l" t="t" r="r" b="b"/>
-                <a:pathLst>
-                  <a:path w="1660035" h="598430">
-                    <a:moveTo>
-                      <a:pt x="0" y="589099"/>
-                    </a:moveTo>
-                    <a:lnTo>
-                      <a:pt x="234084" y="0"/>
-                    </a:lnTo>
-                    <a:lnTo>
-                      <a:pt x="1660035" y="0"/>
-                    </a:lnTo>
-                    <a:lnTo>
-                      <a:pt x="1453058" y="598430"/>
-                    </a:lnTo>
-                    <a:lnTo>
-                      <a:pt x="0" y="589099"/>
-                    </a:lnTo>
-                    <a:close/>
-                  </a:path>
-                </a:pathLst>
-              </a:custGeom>
-              <a:solidFill>
-                <a:schemeClr val="accent4"/>
-              </a:solidFill>
-              <a:ln w="76200">
-                <a:solidFill>
-                  <a:schemeClr val="tx1"/>
-                </a:solidFill>
-              </a:ln>
-            </p:spPr>
-            <p:style>
-              <a:lnRef idx="2">
-                <a:schemeClr val="accent1">
-                  <a:shade val="50000"/>
-                </a:schemeClr>
-              </a:lnRef>
-              <a:fillRef idx="1">
-                <a:schemeClr val="accent1"/>
-              </a:fillRef>
-              <a:effectRef idx="0">
-                <a:schemeClr val="accent1"/>
-              </a:effectRef>
-              <a:fontRef idx="minor">
-                <a:schemeClr val="lt1"/>
-              </a:fontRef>
-            </p:style>
-            <p:txBody>
-              <a:bodyPr rtlCol="0" anchor="ctr"/>
-              <a:lstStyle/>
-              <a:p>
-                <a:pPr algn="ctr"/>
-                <a:endParaRPr lang="en-GB"/>
-              </a:p>
-            </p:txBody>
-          </p:sp>
-        </p:grpSp>
         <p:sp>
           <p:nvSpPr>
-            <p:cNvPr id="9" name="Curved Down Arrow 8"/>
+            <p:cNvPr id="11" name="Parallelogram 59"/>
             <p:cNvSpPr/>
             <p:nvPr/>
           </p:nvSpPr>
           <p:spPr>
-            <a:xfrm flipV="1">
-              <a:off x="874368" y="2280431"/>
-              <a:ext cx="360000" cy="360000"/>
+            <a:xfrm>
+              <a:off x="770863" y="1464951"/>
+              <a:ext cx="1099497" cy="386005"/>
             </a:xfrm>
-            <a:prstGeom prst="curvedDownArrow">
-              <a:avLst>
-                <a:gd name="adj1" fmla="val 37679"/>
-                <a:gd name="adj2" fmla="val 50000"/>
-                <a:gd name="adj3" fmla="val 25709"/>
-              </a:avLst>
-            </a:prstGeom>
+            <a:custGeom>
+              <a:avLst/>
+              <a:gdLst>
+                <a:gd name="connsiteX0" fmla="*/ 0 w 1405392"/>
+                <a:gd name="connsiteY0" fmla="*/ 565949 h 565949"/>
+                <a:gd name="connsiteX1" fmla="*/ 141487 w 1405392"/>
+                <a:gd name="connsiteY1" fmla="*/ 0 h 565949"/>
+                <a:gd name="connsiteX2" fmla="*/ 1405392 w 1405392"/>
+                <a:gd name="connsiteY2" fmla="*/ 0 h 565949"/>
+                <a:gd name="connsiteX3" fmla="*/ 1263905 w 1405392"/>
+                <a:gd name="connsiteY3" fmla="*/ 565949 h 565949"/>
+                <a:gd name="connsiteX4" fmla="*/ 0 w 1405392"/>
+                <a:gd name="connsiteY4" fmla="*/ 565949 h 565949"/>
+                <a:gd name="connsiteX0" fmla="*/ 0 w 1405392"/>
+                <a:gd name="connsiteY0" fmla="*/ 577524 h 577524"/>
+                <a:gd name="connsiteX1" fmla="*/ 361406 w 1405392"/>
+                <a:gd name="connsiteY1" fmla="*/ 0 h 577524"/>
+                <a:gd name="connsiteX2" fmla="*/ 1405392 w 1405392"/>
+                <a:gd name="connsiteY2" fmla="*/ 11575 h 577524"/>
+                <a:gd name="connsiteX3" fmla="*/ 1263905 w 1405392"/>
+                <a:gd name="connsiteY3" fmla="*/ 577524 h 577524"/>
+                <a:gd name="connsiteX4" fmla="*/ 0 w 1405392"/>
+                <a:gd name="connsiteY4" fmla="*/ 577524 h 577524"/>
+                <a:gd name="connsiteX0" fmla="*/ 0 w 1660035"/>
+                <a:gd name="connsiteY0" fmla="*/ 589099 h 589099"/>
+                <a:gd name="connsiteX1" fmla="*/ 361406 w 1660035"/>
+                <a:gd name="connsiteY1" fmla="*/ 11575 h 589099"/>
+                <a:gd name="connsiteX2" fmla="*/ 1660035 w 1660035"/>
+                <a:gd name="connsiteY2" fmla="*/ 0 h 589099"/>
+                <a:gd name="connsiteX3" fmla="*/ 1263905 w 1660035"/>
+                <a:gd name="connsiteY3" fmla="*/ 589099 h 589099"/>
+                <a:gd name="connsiteX4" fmla="*/ 0 w 1660035"/>
+                <a:gd name="connsiteY4" fmla="*/ 589099 h 589099"/>
+                <a:gd name="connsiteX0" fmla="*/ 0 w 1660035"/>
+                <a:gd name="connsiteY0" fmla="*/ 589099 h 589099"/>
+                <a:gd name="connsiteX1" fmla="*/ 361406 w 1660035"/>
+                <a:gd name="connsiteY1" fmla="*/ 11575 h 589099"/>
+                <a:gd name="connsiteX2" fmla="*/ 1660035 w 1660035"/>
+                <a:gd name="connsiteY2" fmla="*/ 0 h 589099"/>
+                <a:gd name="connsiteX3" fmla="*/ 1171308 w 1660035"/>
+                <a:gd name="connsiteY3" fmla="*/ 589099 h 589099"/>
+                <a:gd name="connsiteX4" fmla="*/ 0 w 1660035"/>
+                <a:gd name="connsiteY4" fmla="*/ 589099 h 589099"/>
+                <a:gd name="connsiteX0" fmla="*/ 0 w 1660035"/>
+                <a:gd name="connsiteY0" fmla="*/ 589099 h 589099"/>
+                <a:gd name="connsiteX1" fmla="*/ 234084 w 1660035"/>
+                <a:gd name="connsiteY1" fmla="*/ 0 h 589099"/>
+                <a:gd name="connsiteX2" fmla="*/ 1660035 w 1660035"/>
+                <a:gd name="connsiteY2" fmla="*/ 0 h 589099"/>
+                <a:gd name="connsiteX3" fmla="*/ 1171308 w 1660035"/>
+                <a:gd name="connsiteY3" fmla="*/ 589099 h 589099"/>
+                <a:gd name="connsiteX4" fmla="*/ 0 w 1660035"/>
+                <a:gd name="connsiteY4" fmla="*/ 589099 h 589099"/>
+                <a:gd name="connsiteX0" fmla="*/ 0 w 1660035"/>
+                <a:gd name="connsiteY0" fmla="*/ 589099 h 598430"/>
+                <a:gd name="connsiteX1" fmla="*/ 234084 w 1660035"/>
+                <a:gd name="connsiteY1" fmla="*/ 0 h 598430"/>
+                <a:gd name="connsiteX2" fmla="*/ 1660035 w 1660035"/>
+                <a:gd name="connsiteY2" fmla="*/ 0 h 598430"/>
+                <a:gd name="connsiteX3" fmla="*/ 1495320 w 1660035"/>
+                <a:gd name="connsiteY3" fmla="*/ 598430 h 598430"/>
+                <a:gd name="connsiteX4" fmla="*/ 0 w 1660035"/>
+                <a:gd name="connsiteY4" fmla="*/ 589099 h 598430"/>
+                <a:gd name="connsiteX0" fmla="*/ 0 w 1660035"/>
+                <a:gd name="connsiteY0" fmla="*/ 589099 h 598430"/>
+                <a:gd name="connsiteX1" fmla="*/ 234084 w 1660035"/>
+                <a:gd name="connsiteY1" fmla="*/ 0 h 598430"/>
+                <a:gd name="connsiteX2" fmla="*/ 1660035 w 1660035"/>
+                <a:gd name="connsiteY2" fmla="*/ 0 h 598430"/>
+                <a:gd name="connsiteX3" fmla="*/ 1453058 w 1660035"/>
+                <a:gd name="connsiteY3" fmla="*/ 598430 h 598430"/>
+                <a:gd name="connsiteX4" fmla="*/ 0 w 1660035"/>
+                <a:gd name="connsiteY4" fmla="*/ 589099 h 598430"/>
+              </a:gdLst>
+              <a:ahLst/>
+              <a:cxnLst>
+                <a:cxn ang="0">
+                  <a:pos x="connsiteX0" y="connsiteY0"/>
+                </a:cxn>
+                <a:cxn ang="0">
+                  <a:pos x="connsiteX1" y="connsiteY1"/>
+                </a:cxn>
+                <a:cxn ang="0">
+                  <a:pos x="connsiteX2" y="connsiteY2"/>
+                </a:cxn>
+                <a:cxn ang="0">
+                  <a:pos x="connsiteX3" y="connsiteY3"/>
+                </a:cxn>
+                <a:cxn ang="0">
+                  <a:pos x="connsiteX4" y="connsiteY4"/>
+                </a:cxn>
+              </a:cxnLst>
+              <a:rect l="l" t="t" r="r" b="b"/>
+              <a:pathLst>
+                <a:path w="1660035" h="598430">
+                  <a:moveTo>
+                    <a:pt x="0" y="589099"/>
+                  </a:moveTo>
+                  <a:lnTo>
+                    <a:pt x="234084" y="0"/>
+                  </a:lnTo>
+                  <a:lnTo>
+                    <a:pt x="1660035" y="0"/>
+                  </a:lnTo>
+                  <a:lnTo>
+                    <a:pt x="1453058" y="598430"/>
+                  </a:lnTo>
+                  <a:lnTo>
+                    <a:pt x="0" y="589099"/>
+                  </a:lnTo>
+                  <a:close/>
+                </a:path>
+              </a:pathLst>
+            </a:custGeom>
             <a:solidFill>
               <a:schemeClr val="accent4"/>
             </a:solidFill>
-            <a:ln>
+            <a:ln w="76200">
               <a:solidFill>
                 <a:schemeClr val="tx1"/>
               </a:solidFill>
@@ -9900,13 +10139,7 @@
             <a:lstStyle/>
             <a:p>
               <a:pPr algn="ctr"/>
-              <a:endParaRPr lang="en-GB">
-                <a:ln>
-                  <a:solidFill>
-                    <a:sysClr val="windowText" lastClr="000000"/>
-                  </a:solidFill>
-                </a:ln>
-              </a:endParaRPr>
+              <a:endParaRPr lang="en-GB"/>
             </a:p>
           </p:txBody>
         </p:sp>
@@ -10619,7 +10852,7 @@
         </p:nvGrpSpPr>
         <p:grpSpPr>
           <a:xfrm>
-            <a:off x="740770" y="3636081"/>
+            <a:off x="5033640" y="3605851"/>
             <a:ext cx="988437" cy="1027904"/>
             <a:chOff x="740770" y="3636081"/>
             <a:chExt cx="988437" cy="1027904"/>
@@ -10723,97 +10956,87 @@
             </a:p>
           </p:txBody>
         </p:sp>
+      </p:grpSp>
+      <p:sp>
+        <p:nvSpPr>
+          <p:cNvPr id="12" name="Flowchart: Card 11"/>
+          <p:cNvSpPr/>
+          <p:nvPr/>
+        </p:nvSpPr>
+        <p:spPr>
+          <a:xfrm flipH="1">
+            <a:off x="1934067" y="3636081"/>
+            <a:ext cx="989058" cy="1018572"/>
+          </a:xfrm>
+          <a:prstGeom prst="flowChartPunchedCard">
+            <a:avLst/>
+          </a:prstGeom>
+          <a:solidFill>
+            <a:schemeClr val="accent4"/>
+          </a:solidFill>
+          <a:ln w="76200">
+            <a:solidFill>
+              <a:schemeClr val="tx1"/>
+            </a:solidFill>
+          </a:ln>
+        </p:spPr>
+        <p:style>
+          <a:lnRef idx="2">
+            <a:schemeClr val="accent1">
+              <a:shade val="50000"/>
+            </a:schemeClr>
+          </a:lnRef>
+          <a:fillRef idx="1">
+            <a:schemeClr val="accent1"/>
+          </a:fillRef>
+          <a:effectRef idx="0">
+            <a:schemeClr val="accent1"/>
+          </a:effectRef>
+          <a:fontRef idx="minor">
+            <a:schemeClr val="lt1"/>
+          </a:fontRef>
+        </p:style>
+        <p:txBody>
+          <a:bodyPr rtlCol="0" anchor="ctr"/>
+          <a:lstStyle/>
+          <a:p>
+            <a:pPr algn="ctr"/>
+            <a:endParaRPr lang="en-GB"/>
+          </a:p>
+        </p:txBody>
+      </p:sp>
+      <p:grpSp>
+        <p:nvGrpSpPr>
+          <p:cNvPr id="72" name="Group 71"/>
+          <p:cNvGrpSpPr/>
+          <p:nvPr/>
+        </p:nvGrpSpPr>
+        <p:grpSpPr>
+          <a:xfrm>
+            <a:off x="7146518" y="4649851"/>
+            <a:ext cx="1368000" cy="1195840"/>
+            <a:chOff x="7040353" y="4624423"/>
+            <a:chExt cx="1368000" cy="1195840"/>
+          </a:xfrm>
+        </p:grpSpPr>
         <p:sp>
           <p:nvSpPr>
-            <p:cNvPr id="50" name="Curved Down Arrow 49"/>
+            <p:cNvPr id="40" name="Rectangle 39"/>
             <p:cNvSpPr/>
             <p:nvPr/>
           </p:nvSpPr>
           <p:spPr>
             <a:xfrm>
-              <a:off x="880360" y="4145367"/>
-              <a:ext cx="365403" cy="365638"/>
-            </a:xfrm>
-            <a:prstGeom prst="curvedDownArrow">
-              <a:avLst>
-                <a:gd name="adj1" fmla="val 37679"/>
-                <a:gd name="adj2" fmla="val 50000"/>
-                <a:gd name="adj3" fmla="val 25709"/>
-              </a:avLst>
-            </a:prstGeom>
-            <a:solidFill>
-              <a:schemeClr val="accent4"/>
-            </a:solidFill>
-            <a:ln>
-              <a:solidFill>
-                <a:schemeClr val="tx1"/>
-              </a:solidFill>
-            </a:ln>
-          </p:spPr>
-          <p:style>
-            <a:lnRef idx="2">
-              <a:schemeClr val="accent1">
-                <a:shade val="50000"/>
-              </a:schemeClr>
-            </a:lnRef>
-            <a:fillRef idx="1">
-              <a:schemeClr val="accent1"/>
-            </a:fillRef>
-            <a:effectRef idx="0">
-              <a:schemeClr val="accent1"/>
-            </a:effectRef>
-            <a:fontRef idx="minor">
-              <a:schemeClr val="lt1"/>
-            </a:fontRef>
-          </p:style>
-          <p:txBody>
-            <a:bodyPr rtlCol="0" anchor="ctr"/>
-            <a:lstStyle/>
-            <a:p>
-              <a:pPr algn="ctr"/>
-              <a:endParaRPr lang="en-GB">
-                <a:ln>
-                  <a:solidFill>
-                    <a:sysClr val="windowText" lastClr="000000"/>
-                  </a:solidFill>
-                </a:ln>
-              </a:endParaRPr>
-            </a:p>
-          </p:txBody>
-        </p:sp>
-      </p:grpSp>
-      <p:grpSp>
-        <p:nvGrpSpPr>
-          <p:cNvPr id="19" name="Group 18"/>
-          <p:cNvGrpSpPr/>
-          <p:nvPr/>
-        </p:nvGrpSpPr>
-        <p:grpSpPr>
-          <a:xfrm>
-            <a:off x="4879402" y="2115486"/>
-            <a:ext cx="1368000" cy="1163288"/>
-            <a:chOff x="4879402" y="2115486"/>
-            <a:chExt cx="1368000" cy="1163288"/>
-          </a:xfrm>
-        </p:grpSpPr>
-        <p:sp>
-          <p:nvSpPr>
-            <p:cNvPr id="55" name="Rectangle 54"/>
-            <p:cNvSpPr/>
-            <p:nvPr/>
-          </p:nvSpPr>
-          <p:spPr>
-            <a:xfrm>
-              <a:off x="5315546" y="2115486"/>
-              <a:ext cx="782030" cy="1150761"/>
+              <a:off x="7061325" y="4624423"/>
+              <a:ext cx="1326057" cy="1195840"/>
             </a:xfrm>
             <a:prstGeom prst="rect">
               <a:avLst/>
             </a:prstGeom>
             <a:solidFill>
               <a:schemeClr val="accent4">
-                <a:lumMod val="20000"/>
-                <a:lumOff val="80000"/>
+                <a:lumMod val="40000"/>
+                <a:lumOff val="60000"/>
               </a:schemeClr>
             </a:solidFill>
             <a:ln>
@@ -10845,543 +11068,561 @@
             </a:p>
           </p:txBody>
         </p:sp>
-        <p:sp>
-          <p:nvSpPr>
-            <p:cNvPr id="42" name="Half Frame 41"/>
-            <p:cNvSpPr/>
+        <p:grpSp>
+          <p:nvGrpSpPr>
+            <p:cNvPr id="39" name="Group 38"/>
+            <p:cNvGrpSpPr/>
             <p:nvPr/>
-          </p:nvSpPr>
-          <p:spPr>
-            <a:xfrm flipV="1">
-              <a:off x="4879402" y="2115486"/>
+          </p:nvGrpSpPr>
+          <p:grpSpPr>
+            <a:xfrm>
+              <a:off x="7040353" y="4640699"/>
               <a:ext cx="1368000" cy="1163288"/>
+              <a:chOff x="7040353" y="4656975"/>
+              <a:chExt cx="1368000" cy="1163288"/>
             </a:xfrm>
-            <a:prstGeom prst="halfFrame">
-              <a:avLst>
-                <a:gd name="adj1" fmla="val 2042"/>
-                <a:gd name="adj2" fmla="val 2418"/>
-              </a:avLst>
-            </a:prstGeom>
-            <a:solidFill>
-              <a:schemeClr val="accent4"/>
-            </a:solidFill>
-            <a:ln w="76200">
-              <a:solidFill>
-                <a:schemeClr val="tx1"/>
-              </a:solidFill>
-            </a:ln>
-          </p:spPr>
-          <p:style>
-            <a:lnRef idx="2">
-              <a:schemeClr val="accent1">
-                <a:shade val="50000"/>
-              </a:schemeClr>
-            </a:lnRef>
-            <a:fillRef idx="1">
-              <a:schemeClr val="accent1"/>
-            </a:fillRef>
-            <a:effectRef idx="0">
-              <a:schemeClr val="accent1"/>
-            </a:effectRef>
-            <a:fontRef idx="minor">
-              <a:schemeClr val="lt1"/>
-            </a:fontRef>
-          </p:style>
-          <p:txBody>
-            <a:bodyPr rtlCol="0" anchor="ctr"/>
-            <a:lstStyle/>
-            <a:p>
-              <a:pPr algn="ctr"/>
-              <a:endParaRPr lang="en-GB">
+          </p:grpSpPr>
+          <p:grpSp>
+            <p:nvGrpSpPr>
+              <p:cNvPr id="58" name="Group 57"/>
+              <p:cNvGrpSpPr/>
+              <p:nvPr/>
+            </p:nvGrpSpPr>
+            <p:grpSpPr>
+              <a:xfrm>
+                <a:off x="7040353" y="4656975"/>
+                <a:ext cx="1368000" cy="1163288"/>
+                <a:chOff x="4879402" y="2115486"/>
+                <a:chExt cx="1368000" cy="1163288"/>
+              </a:xfrm>
+            </p:grpSpPr>
+            <p:sp>
+              <p:nvSpPr>
+                <p:cNvPr id="69" name="Oval 68"/>
+                <p:cNvSpPr/>
+                <p:nvPr/>
+              </p:nvSpPr>
+              <p:spPr>
+                <a:xfrm>
+                  <a:off x="6124180" y="2259555"/>
+                  <a:ext cx="108000" cy="108000"/>
+                </a:xfrm>
+                <a:prstGeom prst="ellipse">
+                  <a:avLst/>
+                </a:prstGeom>
+                <a:solidFill>
+                  <a:schemeClr val="accent4">
+                    <a:lumMod val="75000"/>
+                  </a:schemeClr>
+                </a:solidFill>
+                <a:ln>
+                  <a:noFill/>
+                </a:ln>
+              </p:spPr>
+              <p:style>
+                <a:lnRef idx="2">
+                  <a:schemeClr val="accent1">
+                    <a:shade val="50000"/>
+                  </a:schemeClr>
+                </a:lnRef>
+                <a:fillRef idx="1">
+                  <a:schemeClr val="accent1"/>
+                </a:fillRef>
+                <a:effectRef idx="0">
+                  <a:schemeClr val="accent1"/>
+                </a:effectRef>
+                <a:fontRef idx="minor">
+                  <a:schemeClr val="lt1"/>
+                </a:fontRef>
+              </p:style>
+              <p:txBody>
+                <a:bodyPr rtlCol="0" anchor="ctr"/>
+                <a:lstStyle/>
+                <a:p>
+                  <a:pPr algn="ctr"/>
+                  <a:endParaRPr lang="en-GB"/>
+                </a:p>
+              </p:txBody>
+            </p:sp>
+            <p:sp>
+              <p:nvSpPr>
+                <p:cNvPr id="60" name="Half Frame 59"/>
+                <p:cNvSpPr/>
+                <p:nvPr/>
+              </p:nvSpPr>
+              <p:spPr>
+                <a:xfrm flipV="1">
+                  <a:off x="4879402" y="2115486"/>
+                  <a:ext cx="1368000" cy="1163288"/>
+                </a:xfrm>
+                <a:prstGeom prst="halfFrame">
+                  <a:avLst>
+                    <a:gd name="adj1" fmla="val 0"/>
+                    <a:gd name="adj2" fmla="val 0"/>
+                  </a:avLst>
+                </a:prstGeom>
+                <a:solidFill>
+                  <a:schemeClr val="accent4"/>
+                </a:solidFill>
+                <a:ln w="76200">
+                  <a:solidFill>
+                    <a:schemeClr val="tx1"/>
+                  </a:solidFill>
+                </a:ln>
+              </p:spPr>
+              <p:style>
+                <a:lnRef idx="2">
+                  <a:schemeClr val="accent1">
+                    <a:shade val="50000"/>
+                  </a:schemeClr>
+                </a:lnRef>
+                <a:fillRef idx="1">
+                  <a:schemeClr val="accent1"/>
+                </a:fillRef>
+                <a:effectRef idx="0">
+                  <a:schemeClr val="accent1"/>
+                </a:effectRef>
+                <a:fontRef idx="minor">
+                  <a:schemeClr val="lt1"/>
+                </a:fontRef>
+              </p:style>
+              <p:txBody>
+                <a:bodyPr rtlCol="0" anchor="ctr"/>
+                <a:lstStyle/>
+                <a:p>
+                  <a:pPr algn="ctr"/>
+                  <a:endParaRPr lang="en-GB">
+                    <a:solidFill>
+                      <a:schemeClr val="tx1"/>
+                    </a:solidFill>
+                  </a:endParaRPr>
+                </a:p>
+              </p:txBody>
+            </p:sp>
+            <p:sp>
+              <p:nvSpPr>
+                <p:cNvPr id="61" name="Oval 60"/>
+                <p:cNvSpPr/>
+                <p:nvPr/>
+              </p:nvSpPr>
+              <p:spPr>
+                <a:xfrm>
+                  <a:off x="5363685" y="3040603"/>
+                  <a:ext cx="108000" cy="108000"/>
+                </a:xfrm>
+                <a:prstGeom prst="ellipse">
+                  <a:avLst/>
+                </a:prstGeom>
+                <a:solidFill>
+                  <a:schemeClr val="accent4">
+                    <a:lumMod val="75000"/>
+                  </a:schemeClr>
+                </a:solidFill>
+                <a:ln>
+                  <a:noFill/>
+                </a:ln>
+              </p:spPr>
+              <p:style>
+                <a:lnRef idx="2">
+                  <a:schemeClr val="accent1">
+                    <a:shade val="50000"/>
+                  </a:schemeClr>
+                </a:lnRef>
+                <a:fillRef idx="1">
+                  <a:schemeClr val="accent1"/>
+                </a:fillRef>
+                <a:effectRef idx="0">
+                  <a:schemeClr val="accent1"/>
+                </a:effectRef>
+                <a:fontRef idx="minor">
+                  <a:schemeClr val="lt1"/>
+                </a:fontRef>
+              </p:style>
+              <p:txBody>
+                <a:bodyPr rtlCol="0" anchor="ctr"/>
+                <a:lstStyle/>
+                <a:p>
+                  <a:pPr algn="ctr"/>
+                  <a:endParaRPr lang="en-GB"/>
+                </a:p>
+              </p:txBody>
+            </p:sp>
+            <p:sp>
+              <p:nvSpPr>
+                <p:cNvPr id="62" name="Oval 61"/>
+                <p:cNvSpPr/>
+                <p:nvPr/>
+              </p:nvSpPr>
+              <p:spPr>
+                <a:xfrm>
+                  <a:off x="5516046" y="3107189"/>
+                  <a:ext cx="108000" cy="108000"/>
+                </a:xfrm>
+                <a:prstGeom prst="ellipse">
+                  <a:avLst/>
+                </a:prstGeom>
+                <a:solidFill>
+                  <a:schemeClr val="accent4">
+                    <a:lumMod val="75000"/>
+                  </a:schemeClr>
+                </a:solidFill>
+                <a:ln>
+                  <a:noFill/>
+                </a:ln>
+              </p:spPr>
+              <p:style>
+                <a:lnRef idx="2">
+                  <a:schemeClr val="accent1">
+                    <a:shade val="50000"/>
+                  </a:schemeClr>
+                </a:lnRef>
+                <a:fillRef idx="1">
+                  <a:schemeClr val="accent1"/>
+                </a:fillRef>
+                <a:effectRef idx="0">
+                  <a:schemeClr val="accent1"/>
+                </a:effectRef>
+                <a:fontRef idx="minor">
+                  <a:schemeClr val="lt1"/>
+                </a:fontRef>
+              </p:style>
+              <p:txBody>
+                <a:bodyPr rtlCol="0" anchor="ctr"/>
+                <a:lstStyle/>
+                <a:p>
+                  <a:pPr algn="ctr"/>
+                  <a:endParaRPr lang="en-GB"/>
+                </a:p>
+              </p:txBody>
+            </p:sp>
+            <p:sp>
+              <p:nvSpPr>
+                <p:cNvPr id="63" name="Oval 62"/>
+                <p:cNvSpPr/>
+                <p:nvPr/>
+              </p:nvSpPr>
+              <p:spPr>
+                <a:xfrm>
+                  <a:off x="5616789" y="2907878"/>
+                  <a:ext cx="108000" cy="108000"/>
+                </a:xfrm>
+                <a:prstGeom prst="ellipse">
+                  <a:avLst/>
+                </a:prstGeom>
+                <a:solidFill>
+                  <a:schemeClr val="accent4">
+                    <a:lumMod val="75000"/>
+                  </a:schemeClr>
+                </a:solidFill>
+                <a:ln>
+                  <a:noFill/>
+                </a:ln>
+              </p:spPr>
+              <p:style>
+                <a:lnRef idx="2">
+                  <a:schemeClr val="accent1">
+                    <a:shade val="50000"/>
+                  </a:schemeClr>
+                </a:lnRef>
+                <a:fillRef idx="1">
+                  <a:schemeClr val="accent1"/>
+                </a:fillRef>
+                <a:effectRef idx="0">
+                  <a:schemeClr val="accent1"/>
+                </a:effectRef>
+                <a:fontRef idx="minor">
+                  <a:schemeClr val="lt1"/>
+                </a:fontRef>
+              </p:style>
+              <p:txBody>
+                <a:bodyPr rtlCol="0" anchor="ctr"/>
+                <a:lstStyle/>
+                <a:p>
+                  <a:pPr algn="ctr"/>
+                  <a:endParaRPr lang="en-GB"/>
+                </a:p>
+              </p:txBody>
+            </p:sp>
+            <p:sp>
+              <p:nvSpPr>
+                <p:cNvPr id="64" name="Oval 63"/>
+                <p:cNvSpPr/>
+                <p:nvPr/>
+              </p:nvSpPr>
+              <p:spPr>
+                <a:xfrm>
+                  <a:off x="5698406" y="2609876"/>
+                  <a:ext cx="108000" cy="108000"/>
+                </a:xfrm>
+                <a:prstGeom prst="ellipse">
+                  <a:avLst/>
+                </a:prstGeom>
+                <a:solidFill>
+                  <a:schemeClr val="accent4">
+                    <a:lumMod val="75000"/>
+                  </a:schemeClr>
+                </a:solidFill>
+                <a:ln>
+                  <a:noFill/>
+                </a:ln>
+              </p:spPr>
+              <p:style>
+                <a:lnRef idx="2">
+                  <a:schemeClr val="accent1">
+                    <a:shade val="50000"/>
+                  </a:schemeClr>
+                </a:lnRef>
+                <a:fillRef idx="1">
+                  <a:schemeClr val="accent1"/>
+                </a:fillRef>
+                <a:effectRef idx="0">
+                  <a:schemeClr val="accent1"/>
+                </a:effectRef>
+                <a:fontRef idx="minor">
+                  <a:schemeClr val="lt1"/>
+                </a:fontRef>
+              </p:style>
+              <p:txBody>
+                <a:bodyPr rtlCol="0" anchor="ctr"/>
+                <a:lstStyle/>
+                <a:p>
+                  <a:pPr algn="ctr"/>
+                  <a:endParaRPr lang="en-GB"/>
+                </a:p>
+              </p:txBody>
+            </p:sp>
+            <p:sp>
+              <p:nvSpPr>
+                <p:cNvPr id="65" name="Oval 64"/>
+                <p:cNvSpPr/>
+                <p:nvPr/>
+              </p:nvSpPr>
+              <p:spPr>
+                <a:xfrm>
+                  <a:off x="5750901" y="2339974"/>
+                  <a:ext cx="108000" cy="108000"/>
+                </a:xfrm>
+                <a:prstGeom prst="ellipse">
+                  <a:avLst/>
+                </a:prstGeom>
+                <a:solidFill>
+                  <a:schemeClr val="accent4">
+                    <a:lumMod val="75000"/>
+                  </a:schemeClr>
+                </a:solidFill>
+                <a:ln>
+                  <a:noFill/>
+                </a:ln>
+              </p:spPr>
+              <p:style>
+                <a:lnRef idx="2">
+                  <a:schemeClr val="accent1">
+                    <a:shade val="50000"/>
+                  </a:schemeClr>
+                </a:lnRef>
+                <a:fillRef idx="1">
+                  <a:schemeClr val="accent1"/>
+                </a:fillRef>
+                <a:effectRef idx="0">
+                  <a:schemeClr val="accent1"/>
+                </a:effectRef>
+                <a:fontRef idx="minor">
+                  <a:schemeClr val="lt1"/>
+                </a:fontRef>
+              </p:style>
+              <p:txBody>
+                <a:bodyPr rtlCol="0" anchor="ctr"/>
+                <a:lstStyle/>
+                <a:p>
+                  <a:pPr algn="ctr"/>
+                  <a:endParaRPr lang="en-GB"/>
+                </a:p>
+              </p:txBody>
+            </p:sp>
+            <p:sp>
+              <p:nvSpPr>
+                <p:cNvPr id="66" name="Oval 65"/>
+                <p:cNvSpPr/>
+                <p:nvPr/>
+              </p:nvSpPr>
+              <p:spPr>
+                <a:xfrm>
+                  <a:off x="5973493" y="2337996"/>
+                  <a:ext cx="108000" cy="108000"/>
+                </a:xfrm>
+                <a:prstGeom prst="ellipse">
+                  <a:avLst/>
+                </a:prstGeom>
+                <a:solidFill>
+                  <a:schemeClr val="accent4">
+                    <a:lumMod val="75000"/>
+                  </a:schemeClr>
+                </a:solidFill>
+                <a:ln>
+                  <a:noFill/>
+                </a:ln>
+              </p:spPr>
+              <p:style>
+                <a:lnRef idx="2">
+                  <a:schemeClr val="accent1">
+                    <a:shade val="50000"/>
+                  </a:schemeClr>
+                </a:lnRef>
+                <a:fillRef idx="1">
+                  <a:schemeClr val="accent1"/>
+                </a:fillRef>
+                <a:effectRef idx="0">
+                  <a:schemeClr val="accent1"/>
+                </a:effectRef>
+                <a:fontRef idx="minor">
+                  <a:schemeClr val="lt1"/>
+                </a:fontRef>
+              </p:style>
+              <p:txBody>
+                <a:bodyPr rtlCol="0" anchor="ctr"/>
+                <a:lstStyle/>
+                <a:p>
+                  <a:pPr algn="ctr"/>
+                  <a:endParaRPr lang="en-GB"/>
+                </a:p>
+              </p:txBody>
+            </p:sp>
+            <p:sp>
+              <p:nvSpPr>
+                <p:cNvPr id="67" name="Oval 66"/>
+                <p:cNvSpPr/>
+                <p:nvPr/>
+              </p:nvSpPr>
+              <p:spPr>
+                <a:xfrm>
+                  <a:off x="5224711" y="3082795"/>
+                  <a:ext cx="108000" cy="108000"/>
+                </a:xfrm>
+                <a:prstGeom prst="ellipse">
+                  <a:avLst/>
+                </a:prstGeom>
+                <a:solidFill>
+                  <a:schemeClr val="accent4">
+                    <a:lumMod val="75000"/>
+                  </a:schemeClr>
+                </a:solidFill>
+                <a:ln>
+                  <a:noFill/>
+                </a:ln>
+              </p:spPr>
+              <p:style>
+                <a:lnRef idx="2">
+                  <a:schemeClr val="accent1">
+                    <a:shade val="50000"/>
+                  </a:schemeClr>
+                </a:lnRef>
+                <a:fillRef idx="1">
+                  <a:schemeClr val="accent1"/>
+                </a:fillRef>
+                <a:effectRef idx="0">
+                  <a:schemeClr val="accent1"/>
+                </a:effectRef>
+                <a:fontRef idx="minor">
+                  <a:schemeClr val="lt1"/>
+                </a:fontRef>
+              </p:style>
+              <p:txBody>
+                <a:bodyPr rtlCol="0" anchor="ctr"/>
+                <a:lstStyle/>
+                <a:p>
+                  <a:pPr algn="ctr"/>
+                  <a:endParaRPr lang="en-GB"/>
+                </a:p>
+              </p:txBody>
+            </p:sp>
+            <p:sp>
+              <p:nvSpPr>
+                <p:cNvPr id="68" name="Oval 67"/>
+                <p:cNvSpPr/>
+                <p:nvPr/>
+              </p:nvSpPr>
+              <p:spPr>
+                <a:xfrm>
+                  <a:off x="5066942" y="3046338"/>
+                  <a:ext cx="108000" cy="108000"/>
+                </a:xfrm>
+                <a:prstGeom prst="ellipse">
+                  <a:avLst/>
+                </a:prstGeom>
+                <a:solidFill>
+                  <a:schemeClr val="accent4">
+                    <a:lumMod val="75000"/>
+                  </a:schemeClr>
+                </a:solidFill>
+                <a:ln>
+                  <a:noFill/>
+                </a:ln>
+              </p:spPr>
+              <p:style>
+                <a:lnRef idx="2">
+                  <a:schemeClr val="accent1">
+                    <a:shade val="50000"/>
+                  </a:schemeClr>
+                </a:lnRef>
+                <a:fillRef idx="1">
+                  <a:schemeClr val="accent1"/>
+                </a:fillRef>
+                <a:effectRef idx="0">
+                  <a:schemeClr val="accent1"/>
+                </a:effectRef>
+                <a:fontRef idx="minor">
+                  <a:schemeClr val="lt1"/>
+                </a:fontRef>
+              </p:style>
+              <p:txBody>
+                <a:bodyPr rtlCol="0" anchor="ctr"/>
+                <a:lstStyle/>
+                <a:p>
+                  <a:pPr algn="ctr"/>
+                  <a:endParaRPr lang="en-GB"/>
+                </a:p>
+              </p:txBody>
+            </p:sp>
+          </p:grpSp>
+          <p:cxnSp>
+            <p:nvCxnSpPr>
+              <p:cNvPr id="71" name="Curved Connector 70"/>
+              <p:cNvCxnSpPr/>
+              <p:nvPr/>
+            </p:nvCxnSpPr>
+            <p:spPr>
+              <a:xfrm flipV="1">
+                <a:off x="7219740" y="4853200"/>
+                <a:ext cx="1116000" cy="812330"/>
+              </a:xfrm>
+              <a:prstGeom prst="curvedConnector3">
+                <a:avLst>
+                  <a:gd name="adj1" fmla="val 60242"/>
+                </a:avLst>
+              </a:prstGeom>
+              <a:ln w="76200">
                 <a:solidFill>
                   <a:schemeClr val="tx1"/>
                 </a:solidFill>
-              </a:endParaRPr>
-            </a:p>
-          </p:txBody>
-        </p:sp>
-        <p:sp>
-          <p:nvSpPr>
-            <p:cNvPr id="44" name="Oval 43"/>
-            <p:cNvSpPr/>
-            <p:nvPr/>
-          </p:nvSpPr>
-          <p:spPr>
-            <a:xfrm>
-              <a:off x="5363685" y="3040603"/>
-              <a:ext cx="61064" cy="83070"/>
-            </a:xfrm>
-            <a:prstGeom prst="ellipse">
-              <a:avLst/>
-            </a:prstGeom>
-            <a:solidFill>
-              <a:schemeClr val="tx1"/>
-            </a:solidFill>
-            <a:ln>
-              <a:solidFill>
+                <a:prstDash val="sysDash"/>
+              </a:ln>
+            </p:spPr>
+            <p:style>
+              <a:lnRef idx="1">
+                <a:schemeClr val="accent1"/>
+              </a:lnRef>
+              <a:fillRef idx="0">
+                <a:schemeClr val="accent1"/>
+              </a:fillRef>
+              <a:effectRef idx="0">
+                <a:schemeClr val="accent1"/>
+              </a:effectRef>
+              <a:fontRef idx="minor">
                 <a:schemeClr val="tx1"/>
-              </a:solidFill>
-            </a:ln>
-          </p:spPr>
-          <p:style>
-            <a:lnRef idx="2">
-              <a:schemeClr val="accent1">
-                <a:shade val="50000"/>
-              </a:schemeClr>
-            </a:lnRef>
-            <a:fillRef idx="1">
-              <a:schemeClr val="accent1"/>
-            </a:fillRef>
-            <a:effectRef idx="0">
-              <a:schemeClr val="accent1"/>
-            </a:effectRef>
-            <a:fontRef idx="minor">
-              <a:schemeClr val="lt1"/>
-            </a:fontRef>
-          </p:style>
-          <p:txBody>
-            <a:bodyPr rtlCol="0" anchor="ctr"/>
-            <a:lstStyle/>
-            <a:p>
-              <a:pPr algn="ctr"/>
-              <a:endParaRPr lang="en-GB"/>
-            </a:p>
-          </p:txBody>
-        </p:sp>
-        <p:sp>
-          <p:nvSpPr>
-            <p:cNvPr id="45" name="Oval 44"/>
-            <p:cNvSpPr/>
-            <p:nvPr/>
-          </p:nvSpPr>
-          <p:spPr>
-            <a:xfrm>
-              <a:off x="5516046" y="3107189"/>
-              <a:ext cx="61064" cy="83070"/>
-            </a:xfrm>
-            <a:prstGeom prst="ellipse">
-              <a:avLst/>
-            </a:prstGeom>
-            <a:solidFill>
-              <a:schemeClr val="tx1"/>
-            </a:solidFill>
-            <a:ln>
-              <a:solidFill>
-                <a:schemeClr val="tx1"/>
-              </a:solidFill>
-            </a:ln>
-          </p:spPr>
-          <p:style>
-            <a:lnRef idx="2">
-              <a:schemeClr val="accent1">
-                <a:shade val="50000"/>
-              </a:schemeClr>
-            </a:lnRef>
-            <a:fillRef idx="1">
-              <a:schemeClr val="accent1"/>
-            </a:fillRef>
-            <a:effectRef idx="0">
-              <a:schemeClr val="accent1"/>
-            </a:effectRef>
-            <a:fontRef idx="minor">
-              <a:schemeClr val="lt1"/>
-            </a:fontRef>
-          </p:style>
-          <p:txBody>
-            <a:bodyPr rtlCol="0" anchor="ctr"/>
-            <a:lstStyle/>
-            <a:p>
-              <a:pPr algn="ctr"/>
-              <a:endParaRPr lang="en-GB"/>
-            </a:p>
-          </p:txBody>
-        </p:sp>
-        <p:sp>
-          <p:nvSpPr>
-            <p:cNvPr id="46" name="Oval 45"/>
-            <p:cNvSpPr/>
-            <p:nvPr/>
-          </p:nvSpPr>
-          <p:spPr>
-            <a:xfrm>
-              <a:off x="5616789" y="2907878"/>
-              <a:ext cx="61064" cy="83070"/>
-            </a:xfrm>
-            <a:prstGeom prst="ellipse">
-              <a:avLst/>
-            </a:prstGeom>
-            <a:solidFill>
-              <a:schemeClr val="tx1"/>
-            </a:solidFill>
-            <a:ln>
-              <a:solidFill>
-                <a:schemeClr val="tx1"/>
-              </a:solidFill>
-            </a:ln>
-          </p:spPr>
-          <p:style>
-            <a:lnRef idx="2">
-              <a:schemeClr val="accent1">
-                <a:shade val="50000"/>
-              </a:schemeClr>
-            </a:lnRef>
-            <a:fillRef idx="1">
-              <a:schemeClr val="accent1"/>
-            </a:fillRef>
-            <a:effectRef idx="0">
-              <a:schemeClr val="accent1"/>
-            </a:effectRef>
-            <a:fontRef idx="minor">
-              <a:schemeClr val="lt1"/>
-            </a:fontRef>
-          </p:style>
-          <p:txBody>
-            <a:bodyPr rtlCol="0" anchor="ctr"/>
-            <a:lstStyle/>
-            <a:p>
-              <a:pPr algn="ctr"/>
-              <a:endParaRPr lang="en-GB"/>
-            </a:p>
-          </p:txBody>
-        </p:sp>
-        <p:sp>
-          <p:nvSpPr>
-            <p:cNvPr id="47" name="Oval 46"/>
-            <p:cNvSpPr/>
-            <p:nvPr/>
-          </p:nvSpPr>
-          <p:spPr>
-            <a:xfrm>
-              <a:off x="5698406" y="2609876"/>
-              <a:ext cx="61064" cy="83070"/>
-            </a:xfrm>
-            <a:prstGeom prst="ellipse">
-              <a:avLst/>
-            </a:prstGeom>
-            <a:solidFill>
-              <a:schemeClr val="tx1"/>
-            </a:solidFill>
-            <a:ln>
-              <a:solidFill>
-                <a:schemeClr val="tx1"/>
-              </a:solidFill>
-            </a:ln>
-          </p:spPr>
-          <p:style>
-            <a:lnRef idx="2">
-              <a:schemeClr val="accent1">
-                <a:shade val="50000"/>
-              </a:schemeClr>
-            </a:lnRef>
-            <a:fillRef idx="1">
-              <a:schemeClr val="accent1"/>
-            </a:fillRef>
-            <a:effectRef idx="0">
-              <a:schemeClr val="accent1"/>
-            </a:effectRef>
-            <a:fontRef idx="minor">
-              <a:schemeClr val="lt1"/>
-            </a:fontRef>
-          </p:style>
-          <p:txBody>
-            <a:bodyPr rtlCol="0" anchor="ctr"/>
-            <a:lstStyle/>
-            <a:p>
-              <a:pPr algn="ctr"/>
-              <a:endParaRPr lang="en-GB"/>
-            </a:p>
-          </p:txBody>
-        </p:sp>
-        <p:sp>
-          <p:nvSpPr>
-            <p:cNvPr id="48" name="Oval 47"/>
-            <p:cNvSpPr/>
-            <p:nvPr/>
-          </p:nvSpPr>
-          <p:spPr>
-            <a:xfrm>
-              <a:off x="5750901" y="2339974"/>
-              <a:ext cx="61064" cy="83070"/>
-            </a:xfrm>
-            <a:prstGeom prst="ellipse">
-              <a:avLst/>
-            </a:prstGeom>
-            <a:solidFill>
-              <a:schemeClr val="tx1"/>
-            </a:solidFill>
-            <a:ln>
-              <a:solidFill>
-                <a:schemeClr val="tx1"/>
-              </a:solidFill>
-            </a:ln>
-          </p:spPr>
-          <p:style>
-            <a:lnRef idx="2">
-              <a:schemeClr val="accent1">
-                <a:shade val="50000"/>
-              </a:schemeClr>
-            </a:lnRef>
-            <a:fillRef idx="1">
-              <a:schemeClr val="accent1"/>
-            </a:fillRef>
-            <a:effectRef idx="0">
-              <a:schemeClr val="accent1"/>
-            </a:effectRef>
-            <a:fontRef idx="minor">
-              <a:schemeClr val="lt1"/>
-            </a:fontRef>
-          </p:style>
-          <p:txBody>
-            <a:bodyPr rtlCol="0" anchor="ctr"/>
-            <a:lstStyle/>
-            <a:p>
-              <a:pPr algn="ctr"/>
-              <a:endParaRPr lang="en-GB"/>
-            </a:p>
-          </p:txBody>
-        </p:sp>
-        <p:sp>
-          <p:nvSpPr>
-            <p:cNvPr id="49" name="Oval 48"/>
-            <p:cNvSpPr/>
-            <p:nvPr/>
-          </p:nvSpPr>
-          <p:spPr>
-            <a:xfrm>
-              <a:off x="5973493" y="2337996"/>
-              <a:ext cx="61064" cy="83070"/>
-            </a:xfrm>
-            <a:prstGeom prst="ellipse">
-              <a:avLst/>
-            </a:prstGeom>
-            <a:solidFill>
-              <a:schemeClr val="tx1"/>
-            </a:solidFill>
-            <a:ln>
-              <a:solidFill>
-                <a:schemeClr val="tx1"/>
-              </a:solidFill>
-            </a:ln>
-          </p:spPr>
-          <p:style>
-            <a:lnRef idx="2">
-              <a:schemeClr val="accent1">
-                <a:shade val="50000"/>
-              </a:schemeClr>
-            </a:lnRef>
-            <a:fillRef idx="1">
-              <a:schemeClr val="accent1"/>
-            </a:fillRef>
-            <a:effectRef idx="0">
-              <a:schemeClr val="accent1"/>
-            </a:effectRef>
-            <a:fontRef idx="minor">
-              <a:schemeClr val="lt1"/>
-            </a:fontRef>
-          </p:style>
-          <p:txBody>
-            <a:bodyPr rtlCol="0" anchor="ctr"/>
-            <a:lstStyle/>
-            <a:p>
-              <a:pPr algn="ctr"/>
-              <a:endParaRPr lang="en-GB"/>
-            </a:p>
-          </p:txBody>
-        </p:sp>
-        <p:sp>
-          <p:nvSpPr>
-            <p:cNvPr id="52" name="Oval 51"/>
-            <p:cNvSpPr/>
-            <p:nvPr/>
-          </p:nvSpPr>
-          <p:spPr>
-            <a:xfrm>
-              <a:off x="5224711" y="3082795"/>
-              <a:ext cx="61064" cy="83070"/>
-            </a:xfrm>
-            <a:prstGeom prst="ellipse">
-              <a:avLst/>
-            </a:prstGeom>
-            <a:solidFill>
-              <a:schemeClr val="tx1"/>
-            </a:solidFill>
-            <a:ln>
-              <a:solidFill>
-                <a:schemeClr val="tx1"/>
-              </a:solidFill>
-            </a:ln>
-          </p:spPr>
-          <p:style>
-            <a:lnRef idx="2">
-              <a:schemeClr val="accent1">
-                <a:shade val="50000"/>
-              </a:schemeClr>
-            </a:lnRef>
-            <a:fillRef idx="1">
-              <a:schemeClr val="accent1"/>
-            </a:fillRef>
-            <a:effectRef idx="0">
-              <a:schemeClr val="accent1"/>
-            </a:effectRef>
-            <a:fontRef idx="minor">
-              <a:schemeClr val="lt1"/>
-            </a:fontRef>
-          </p:style>
-          <p:txBody>
-            <a:bodyPr rtlCol="0" anchor="ctr"/>
-            <a:lstStyle/>
-            <a:p>
-              <a:pPr algn="ctr"/>
-              <a:endParaRPr lang="en-GB"/>
-            </a:p>
-          </p:txBody>
-        </p:sp>
-        <p:sp>
-          <p:nvSpPr>
-            <p:cNvPr id="53" name="Oval 52"/>
-            <p:cNvSpPr/>
-            <p:nvPr/>
-          </p:nvSpPr>
-          <p:spPr>
-            <a:xfrm>
-              <a:off x="5066942" y="3046338"/>
-              <a:ext cx="61064" cy="83070"/>
-            </a:xfrm>
-            <a:prstGeom prst="ellipse">
-              <a:avLst/>
-            </a:prstGeom>
-            <a:solidFill>
-              <a:schemeClr val="tx1"/>
-            </a:solidFill>
-            <a:ln>
-              <a:solidFill>
-                <a:schemeClr val="tx1"/>
-              </a:solidFill>
-            </a:ln>
-          </p:spPr>
-          <p:style>
-            <a:lnRef idx="2">
-              <a:schemeClr val="accent1">
-                <a:shade val="50000"/>
-              </a:schemeClr>
-            </a:lnRef>
-            <a:fillRef idx="1">
-              <a:schemeClr val="accent1"/>
-            </a:fillRef>
-            <a:effectRef idx="0">
-              <a:schemeClr val="accent1"/>
-            </a:effectRef>
-            <a:fontRef idx="minor">
-              <a:schemeClr val="lt1"/>
-            </a:fontRef>
-          </p:style>
-          <p:txBody>
-            <a:bodyPr rtlCol="0" anchor="ctr"/>
-            <a:lstStyle/>
-            <a:p>
-              <a:pPr algn="ctr"/>
-              <a:endParaRPr lang="en-GB"/>
-            </a:p>
-          </p:txBody>
-        </p:sp>
-        <p:sp>
-          <p:nvSpPr>
-            <p:cNvPr id="54" name="Oval 53"/>
-            <p:cNvSpPr/>
-            <p:nvPr/>
-          </p:nvSpPr>
-          <p:spPr>
-            <a:xfrm>
-              <a:off x="6124180" y="2259555"/>
-              <a:ext cx="61064" cy="83070"/>
-            </a:xfrm>
-            <a:prstGeom prst="ellipse">
-              <a:avLst/>
-            </a:prstGeom>
-            <a:solidFill>
-              <a:schemeClr val="tx1"/>
-            </a:solidFill>
-            <a:ln>
-              <a:solidFill>
-                <a:schemeClr val="tx1"/>
-              </a:solidFill>
-            </a:ln>
-          </p:spPr>
-          <p:style>
-            <a:lnRef idx="2">
-              <a:schemeClr val="accent1">
-                <a:shade val="50000"/>
-              </a:schemeClr>
-            </a:lnRef>
-            <a:fillRef idx="1">
-              <a:schemeClr val="accent1"/>
-            </a:fillRef>
-            <a:effectRef idx="0">
-              <a:schemeClr val="accent1"/>
-            </a:effectRef>
-            <a:fontRef idx="minor">
-              <a:schemeClr val="lt1"/>
-            </a:fontRef>
-          </p:style>
-          <p:txBody>
-            <a:bodyPr rtlCol="0" anchor="ctr"/>
-            <a:lstStyle/>
-            <a:p>
-              <a:pPr algn="ctr"/>
-              <a:endParaRPr lang="en-GB"/>
-            </a:p>
-          </p:txBody>
-        </p:sp>
-        <p:sp>
-          <p:nvSpPr>
-            <p:cNvPr id="18" name="Left-Right Arrow 17"/>
-            <p:cNvSpPr/>
-            <p:nvPr/>
-          </p:nvSpPr>
-          <p:spPr>
-            <a:xfrm>
-              <a:off x="5326306" y="2734510"/>
-              <a:ext cx="760510" cy="137649"/>
-            </a:xfrm>
-            <a:prstGeom prst="leftRightArrow">
-              <a:avLst/>
-            </a:prstGeom>
-            <a:solidFill>
-              <a:schemeClr val="tx1"/>
-            </a:solidFill>
-            <a:ln>
-              <a:solidFill>
-                <a:schemeClr val="accent4">
-                  <a:lumMod val="75000"/>
-                </a:schemeClr>
-              </a:solidFill>
-            </a:ln>
-          </p:spPr>
-          <p:style>
-            <a:lnRef idx="2">
-              <a:schemeClr val="accent1">
-                <a:shade val="50000"/>
-              </a:schemeClr>
-            </a:lnRef>
-            <a:fillRef idx="1">
-              <a:schemeClr val="accent1"/>
-            </a:fillRef>
-            <a:effectRef idx="0">
-              <a:schemeClr val="accent1"/>
-            </a:effectRef>
-            <a:fontRef idx="minor">
-              <a:schemeClr val="lt1"/>
-            </a:fontRef>
-          </p:style>
-          <p:txBody>
-            <a:bodyPr rtlCol="0" anchor="ctr"/>
-            <a:lstStyle/>
-            <a:p>
-              <a:pPr algn="ctr"/>
-              <a:endParaRPr lang="en-GB"/>
-            </a:p>
-          </p:txBody>
-        </p:sp>
+              </a:fontRef>
+            </p:style>
+          </p:cxnSp>
+        </p:grpSp>
       </p:grpSp>
     </p:spTree>
     <p:extLst>

</xml_diff>

<commit_message>
Working on linkage dialog
should return linked parameter array
</commit_message>
<xml_diff>
--- a/Resources/Other/Icons.pptx
+++ b/Resources/Other/Icons.pptx
@@ -246,7 +246,7 @@
           <a:p>
             <a:fld id="{D8455722-239A-4E54-8AF4-0299CA751C05}" type="datetimeFigureOut">
               <a:rPr lang="en-GB" smtClean="0"/>
-              <a:t>10/01/2018</a:t>
+              <a:t>08/03/2018</a:t>
             </a:fld>
             <a:endParaRPr lang="en-GB"/>
           </a:p>
@@ -416,7 +416,7 @@
           <a:p>
             <a:fld id="{D8455722-239A-4E54-8AF4-0299CA751C05}" type="datetimeFigureOut">
               <a:rPr lang="en-GB" smtClean="0"/>
-              <a:t>10/01/2018</a:t>
+              <a:t>08/03/2018</a:t>
             </a:fld>
             <a:endParaRPr lang="en-GB"/>
           </a:p>
@@ -596,7 +596,7 @@
           <a:p>
             <a:fld id="{D8455722-239A-4E54-8AF4-0299CA751C05}" type="datetimeFigureOut">
               <a:rPr lang="en-GB" smtClean="0"/>
-              <a:t>10/01/2018</a:t>
+              <a:t>08/03/2018</a:t>
             </a:fld>
             <a:endParaRPr lang="en-GB"/>
           </a:p>
@@ -766,7 +766,7 @@
           <a:p>
             <a:fld id="{D8455722-239A-4E54-8AF4-0299CA751C05}" type="datetimeFigureOut">
               <a:rPr lang="en-GB" smtClean="0"/>
-              <a:t>10/01/2018</a:t>
+              <a:t>08/03/2018</a:t>
             </a:fld>
             <a:endParaRPr lang="en-GB"/>
           </a:p>
@@ -1012,7 +1012,7 @@
           <a:p>
             <a:fld id="{D8455722-239A-4E54-8AF4-0299CA751C05}" type="datetimeFigureOut">
               <a:rPr lang="en-GB" smtClean="0"/>
-              <a:t>10/01/2018</a:t>
+              <a:t>08/03/2018</a:t>
             </a:fld>
             <a:endParaRPr lang="en-GB"/>
           </a:p>
@@ -1244,7 +1244,7 @@
           <a:p>
             <a:fld id="{D8455722-239A-4E54-8AF4-0299CA751C05}" type="datetimeFigureOut">
               <a:rPr lang="en-GB" smtClean="0"/>
-              <a:t>10/01/2018</a:t>
+              <a:t>08/03/2018</a:t>
             </a:fld>
             <a:endParaRPr lang="en-GB"/>
           </a:p>
@@ -1611,7 +1611,7 @@
           <a:p>
             <a:fld id="{D8455722-239A-4E54-8AF4-0299CA751C05}" type="datetimeFigureOut">
               <a:rPr lang="en-GB" smtClean="0"/>
-              <a:t>10/01/2018</a:t>
+              <a:t>08/03/2018</a:t>
             </a:fld>
             <a:endParaRPr lang="en-GB"/>
           </a:p>
@@ -1729,7 +1729,7 @@
           <a:p>
             <a:fld id="{D8455722-239A-4E54-8AF4-0299CA751C05}" type="datetimeFigureOut">
               <a:rPr lang="en-GB" smtClean="0"/>
-              <a:t>10/01/2018</a:t>
+              <a:t>08/03/2018</a:t>
             </a:fld>
             <a:endParaRPr lang="en-GB"/>
           </a:p>
@@ -1824,7 +1824,7 @@
           <a:p>
             <a:fld id="{D8455722-239A-4E54-8AF4-0299CA751C05}" type="datetimeFigureOut">
               <a:rPr lang="en-GB" smtClean="0"/>
-              <a:t>10/01/2018</a:t>
+              <a:t>08/03/2018</a:t>
             </a:fld>
             <a:endParaRPr lang="en-GB"/>
           </a:p>
@@ -2101,7 +2101,7 @@
           <a:p>
             <a:fld id="{D8455722-239A-4E54-8AF4-0299CA751C05}" type="datetimeFigureOut">
               <a:rPr lang="en-GB" smtClean="0"/>
-              <a:t>10/01/2018</a:t>
+              <a:t>08/03/2018</a:t>
             </a:fld>
             <a:endParaRPr lang="en-GB"/>
           </a:p>
@@ -2354,7 +2354,7 @@
           <a:p>
             <a:fld id="{D8455722-239A-4E54-8AF4-0299CA751C05}" type="datetimeFigureOut">
               <a:rPr lang="en-GB" smtClean="0"/>
-              <a:t>10/01/2018</a:t>
+              <a:t>08/03/2018</a:t>
             </a:fld>
             <a:endParaRPr lang="en-GB"/>
           </a:p>
@@ -2567,7 +2567,7 @@
           <a:p>
             <a:fld id="{D8455722-239A-4E54-8AF4-0299CA751C05}" type="datetimeFigureOut">
               <a:rPr lang="en-GB" smtClean="0"/>
-              <a:t>10/01/2018</a:t>
+              <a:t>08/03/2018</a:t>
             </a:fld>
             <a:endParaRPr lang="en-GB"/>
           </a:p>
@@ -9890,6 +9890,663 @@
           </p:cxnSp>
         </p:grpSp>
       </p:grpSp>
+      <p:grpSp>
+        <p:nvGrpSpPr>
+          <p:cNvPr id="18" name="Group 17"/>
+          <p:cNvGrpSpPr/>
+          <p:nvPr/>
+        </p:nvGrpSpPr>
+        <p:grpSpPr>
+          <a:xfrm>
+            <a:off x="6816980" y="4579616"/>
+            <a:ext cx="583612" cy="300617"/>
+            <a:chOff x="6635522" y="4533362"/>
+            <a:chExt cx="921379" cy="300617"/>
+          </a:xfrm>
+        </p:grpSpPr>
+        <p:sp>
+          <p:nvSpPr>
+            <p:cNvPr id="9" name="Oval 8"/>
+            <p:cNvSpPr/>
+            <p:nvPr/>
+          </p:nvSpPr>
+          <p:spPr>
+            <a:xfrm rot="2862536">
+              <a:off x="7256256" y="4533335"/>
+              <a:ext cx="300617" cy="300672"/>
+            </a:xfrm>
+            <a:prstGeom prst="ellipse">
+              <a:avLst/>
+            </a:prstGeom>
+            <a:solidFill>
+              <a:schemeClr val="bg1">
+                <a:lumMod val="85000"/>
+              </a:schemeClr>
+            </a:solidFill>
+            <a:ln>
+              <a:noFill/>
+            </a:ln>
+            <a:effectLst/>
+            <a:scene3d>
+              <a:camera prst="orthographicFront">
+                <a:rot lat="0" lon="0" rev="0"/>
+              </a:camera>
+              <a:lightRig rig="contrasting" dir="t">
+                <a:rot lat="0" lon="0" rev="7800000"/>
+              </a:lightRig>
+            </a:scene3d>
+            <a:sp3d>
+              <a:bevelT w="139700" h="139700"/>
+            </a:sp3d>
+          </p:spPr>
+          <p:style>
+            <a:lnRef idx="2">
+              <a:schemeClr val="lt1">
+                <a:hueOff val="0"/>
+                <a:satOff val="0"/>
+                <a:lumOff val="0"/>
+                <a:alphaOff val="0"/>
+              </a:schemeClr>
+            </a:lnRef>
+            <a:fillRef idx="1">
+              <a:schemeClr val="accent1">
+                <a:hueOff val="0"/>
+                <a:satOff val="0"/>
+                <a:lumOff val="0"/>
+                <a:alphaOff val="0"/>
+              </a:schemeClr>
+            </a:fillRef>
+            <a:effectRef idx="0">
+              <a:schemeClr val="accent1">
+                <a:hueOff val="0"/>
+                <a:satOff val="0"/>
+                <a:lumOff val="0"/>
+                <a:alphaOff val="0"/>
+              </a:schemeClr>
+            </a:effectRef>
+            <a:fontRef idx="minor">
+              <a:schemeClr val="lt1"/>
+            </a:fontRef>
+          </p:style>
+        </p:sp>
+        <p:sp>
+          <p:nvSpPr>
+            <p:cNvPr id="13" name="Freeform 12"/>
+            <p:cNvSpPr/>
+            <p:nvPr/>
+          </p:nvSpPr>
+          <p:spPr>
+            <a:xfrm>
+              <a:off x="7266237" y="4543359"/>
+              <a:ext cx="280654" cy="280624"/>
+            </a:xfrm>
+            <a:custGeom>
+              <a:avLst/>
+              <a:gdLst>
+                <a:gd name="connsiteX0" fmla="*/ 0 w 280654"/>
+                <a:gd name="connsiteY0" fmla="*/ 140312 h 280624"/>
+                <a:gd name="connsiteX1" fmla="*/ 140327 w 280654"/>
+                <a:gd name="connsiteY1" fmla="*/ 0 h 280624"/>
+                <a:gd name="connsiteX2" fmla="*/ 280654 w 280654"/>
+                <a:gd name="connsiteY2" fmla="*/ 140312 h 280624"/>
+                <a:gd name="connsiteX3" fmla="*/ 140327 w 280654"/>
+                <a:gd name="connsiteY3" fmla="*/ 280624 h 280624"/>
+                <a:gd name="connsiteX4" fmla="*/ 0 w 280654"/>
+                <a:gd name="connsiteY4" fmla="*/ 140312 h 280624"/>
+              </a:gdLst>
+              <a:ahLst/>
+              <a:cxnLst>
+                <a:cxn ang="0">
+                  <a:pos x="connsiteX0" y="connsiteY0"/>
+                </a:cxn>
+                <a:cxn ang="0">
+                  <a:pos x="connsiteX1" y="connsiteY1"/>
+                </a:cxn>
+                <a:cxn ang="0">
+                  <a:pos x="connsiteX2" y="connsiteY2"/>
+                </a:cxn>
+                <a:cxn ang="0">
+                  <a:pos x="connsiteX3" y="connsiteY3"/>
+                </a:cxn>
+                <a:cxn ang="0">
+                  <a:pos x="connsiteX4" y="connsiteY4"/>
+                </a:cxn>
+              </a:cxnLst>
+              <a:rect l="l" t="t" r="r" b="b"/>
+              <a:pathLst>
+                <a:path w="280654" h="280624">
+                  <a:moveTo>
+                    <a:pt x="0" y="140312"/>
+                  </a:moveTo>
+                  <a:cubicBezTo>
+                    <a:pt x="0" y="62820"/>
+                    <a:pt x="62827" y="0"/>
+                    <a:pt x="140327" y="0"/>
+                  </a:cubicBezTo>
+                  <a:cubicBezTo>
+                    <a:pt x="217827" y="0"/>
+                    <a:pt x="280654" y="62820"/>
+                    <a:pt x="280654" y="140312"/>
+                  </a:cubicBezTo>
+                  <a:cubicBezTo>
+                    <a:pt x="280654" y="217804"/>
+                    <a:pt x="217827" y="280624"/>
+                    <a:pt x="140327" y="280624"/>
+                  </a:cubicBezTo>
+                  <a:cubicBezTo>
+                    <a:pt x="62827" y="280624"/>
+                    <a:pt x="0" y="217804"/>
+                    <a:pt x="0" y="140312"/>
+                  </a:cubicBezTo>
+                  <a:close/>
+                </a:path>
+              </a:pathLst>
+            </a:custGeom>
+            <a:noFill/>
+            <a:ln>
+              <a:solidFill>
+                <a:srgbClr val="F63D0A"/>
+              </a:solidFill>
+            </a:ln>
+          </p:spPr>
+          <p:style>
+            <a:lnRef idx="2">
+              <a:scrgbClr r="0" g="0" b="0"/>
+            </a:lnRef>
+            <a:fillRef idx="1">
+              <a:schemeClr val="lt1">
+                <a:alpha val="90000"/>
+                <a:hueOff val="0"/>
+                <a:satOff val="0"/>
+                <a:lumOff val="0"/>
+                <a:alphaOff val="0"/>
+              </a:schemeClr>
+            </a:fillRef>
+            <a:effectRef idx="0">
+              <a:schemeClr val="lt1">
+                <a:alpha val="90000"/>
+                <a:hueOff val="0"/>
+                <a:satOff val="0"/>
+                <a:lumOff val="0"/>
+                <a:alphaOff val="0"/>
+              </a:schemeClr>
+            </a:effectRef>
+            <a:fontRef idx="minor">
+              <a:schemeClr val="dk1">
+                <a:hueOff val="0"/>
+                <a:satOff val="0"/>
+                <a:lumOff val="0"/>
+                <a:alphaOff val="0"/>
+              </a:schemeClr>
+            </a:fontRef>
+          </p:style>
+          <p:txBody>
+            <a:bodyPr spcFirstLastPara="0" vert="horz" wrap="square" lIns="55361" tIns="55336" rIns="55362" bIns="55338" numCol="1" spcCol="1270" anchor="ctr" anchorCtr="0">
+              <a:noAutofit/>
+            </a:bodyPr>
+            <a:lstStyle/>
+            <a:p>
+              <a:pPr lvl="0" algn="ctr" defTabSz="533400">
+                <a:lnSpc>
+                  <a:spcPct val="90000"/>
+                </a:lnSpc>
+                <a:spcBef>
+                  <a:spcPct val="0"/>
+                </a:spcBef>
+                <a:spcAft>
+                  <a:spcPct val="35000"/>
+                </a:spcAft>
+              </a:pPr>
+              <a:r>
+                <a:rPr lang="en-GB" sz="1200" kern="1200" dirty="0" smtClean="0"/>
+                <a:t>  </a:t>
+              </a:r>
+              <a:endParaRPr lang="en-GB" sz="1200" kern="1200" dirty="0"/>
+            </a:p>
+          </p:txBody>
+        </p:sp>
+        <p:sp>
+          <p:nvSpPr>
+            <p:cNvPr id="14" name="Teardrop 13"/>
+            <p:cNvSpPr/>
+            <p:nvPr/>
+          </p:nvSpPr>
+          <p:spPr>
+            <a:xfrm rot="2700000">
+              <a:off x="6945875" y="4533725"/>
+              <a:ext cx="299893" cy="299893"/>
+            </a:xfrm>
+            <a:prstGeom prst="teardrop">
+              <a:avLst>
+                <a:gd name="adj" fmla="val 100000"/>
+              </a:avLst>
+            </a:prstGeom>
+            <a:solidFill>
+              <a:schemeClr val="bg1">
+                <a:lumMod val="85000"/>
+              </a:schemeClr>
+            </a:solidFill>
+            <a:ln>
+              <a:noFill/>
+            </a:ln>
+            <a:effectLst/>
+            <a:scene3d>
+              <a:camera prst="orthographicFront">
+                <a:rot lat="0" lon="0" rev="0"/>
+              </a:camera>
+              <a:lightRig rig="contrasting" dir="t">
+                <a:rot lat="0" lon="0" rev="7800000"/>
+              </a:lightRig>
+            </a:scene3d>
+            <a:sp3d>
+              <a:bevelT w="139700" h="139700"/>
+            </a:sp3d>
+          </p:spPr>
+          <p:style>
+            <a:lnRef idx="2">
+              <a:schemeClr val="lt1">
+                <a:hueOff val="0"/>
+                <a:satOff val="0"/>
+                <a:lumOff val="0"/>
+                <a:alphaOff val="0"/>
+              </a:schemeClr>
+            </a:lnRef>
+            <a:fillRef idx="1">
+              <a:schemeClr val="accent1">
+                <a:hueOff val="0"/>
+                <a:satOff val="0"/>
+                <a:lumOff val="0"/>
+                <a:alphaOff val="0"/>
+              </a:schemeClr>
+            </a:fillRef>
+            <a:effectRef idx="0">
+              <a:schemeClr val="accent1">
+                <a:hueOff val="0"/>
+                <a:satOff val="0"/>
+                <a:lumOff val="0"/>
+                <a:alphaOff val="0"/>
+              </a:schemeClr>
+            </a:effectRef>
+            <a:fontRef idx="minor">
+              <a:schemeClr val="lt1"/>
+            </a:fontRef>
+          </p:style>
+        </p:sp>
+        <p:sp>
+          <p:nvSpPr>
+            <p:cNvPr id="15" name="Freeform 14"/>
+            <p:cNvSpPr/>
+            <p:nvPr/>
+          </p:nvSpPr>
+          <p:spPr>
+            <a:xfrm>
+              <a:off x="6955494" y="4543359"/>
+              <a:ext cx="280654" cy="280624"/>
+            </a:xfrm>
+            <a:custGeom>
+              <a:avLst/>
+              <a:gdLst>
+                <a:gd name="connsiteX0" fmla="*/ 0 w 280654"/>
+                <a:gd name="connsiteY0" fmla="*/ 140312 h 280624"/>
+                <a:gd name="connsiteX1" fmla="*/ 140327 w 280654"/>
+                <a:gd name="connsiteY1" fmla="*/ 0 h 280624"/>
+                <a:gd name="connsiteX2" fmla="*/ 280654 w 280654"/>
+                <a:gd name="connsiteY2" fmla="*/ 140312 h 280624"/>
+                <a:gd name="connsiteX3" fmla="*/ 140327 w 280654"/>
+                <a:gd name="connsiteY3" fmla="*/ 280624 h 280624"/>
+                <a:gd name="connsiteX4" fmla="*/ 0 w 280654"/>
+                <a:gd name="connsiteY4" fmla="*/ 140312 h 280624"/>
+              </a:gdLst>
+              <a:ahLst/>
+              <a:cxnLst>
+                <a:cxn ang="0">
+                  <a:pos x="connsiteX0" y="connsiteY0"/>
+                </a:cxn>
+                <a:cxn ang="0">
+                  <a:pos x="connsiteX1" y="connsiteY1"/>
+                </a:cxn>
+                <a:cxn ang="0">
+                  <a:pos x="connsiteX2" y="connsiteY2"/>
+                </a:cxn>
+                <a:cxn ang="0">
+                  <a:pos x="connsiteX3" y="connsiteY3"/>
+                </a:cxn>
+                <a:cxn ang="0">
+                  <a:pos x="connsiteX4" y="connsiteY4"/>
+                </a:cxn>
+              </a:cxnLst>
+              <a:rect l="l" t="t" r="r" b="b"/>
+              <a:pathLst>
+                <a:path w="280654" h="280624">
+                  <a:moveTo>
+                    <a:pt x="0" y="140312"/>
+                  </a:moveTo>
+                  <a:cubicBezTo>
+                    <a:pt x="0" y="62820"/>
+                    <a:pt x="62827" y="0"/>
+                    <a:pt x="140327" y="0"/>
+                  </a:cubicBezTo>
+                  <a:cubicBezTo>
+                    <a:pt x="217827" y="0"/>
+                    <a:pt x="280654" y="62820"/>
+                    <a:pt x="280654" y="140312"/>
+                  </a:cubicBezTo>
+                  <a:cubicBezTo>
+                    <a:pt x="280654" y="217804"/>
+                    <a:pt x="217827" y="280624"/>
+                    <a:pt x="140327" y="280624"/>
+                  </a:cubicBezTo>
+                  <a:cubicBezTo>
+                    <a:pt x="62827" y="280624"/>
+                    <a:pt x="0" y="217804"/>
+                    <a:pt x="0" y="140312"/>
+                  </a:cubicBezTo>
+                  <a:close/>
+                </a:path>
+              </a:pathLst>
+            </a:custGeom>
+            <a:noFill/>
+            <a:ln>
+              <a:solidFill>
+                <a:srgbClr val="F63D0A"/>
+              </a:solidFill>
+            </a:ln>
+          </p:spPr>
+          <p:style>
+            <a:lnRef idx="2">
+              <a:scrgbClr r="0" g="0" b="0"/>
+            </a:lnRef>
+            <a:fillRef idx="1">
+              <a:schemeClr val="lt1">
+                <a:alpha val="90000"/>
+                <a:hueOff val="0"/>
+                <a:satOff val="0"/>
+                <a:lumOff val="0"/>
+                <a:alphaOff val="0"/>
+              </a:schemeClr>
+            </a:fillRef>
+            <a:effectRef idx="0">
+              <a:schemeClr val="lt1">
+                <a:alpha val="90000"/>
+                <a:hueOff val="0"/>
+                <a:satOff val="0"/>
+                <a:lumOff val="0"/>
+                <a:alphaOff val="0"/>
+              </a:schemeClr>
+            </a:effectRef>
+            <a:fontRef idx="minor">
+              <a:schemeClr val="dk1">
+                <a:hueOff val="0"/>
+                <a:satOff val="0"/>
+                <a:lumOff val="0"/>
+                <a:alphaOff val="0"/>
+              </a:schemeClr>
+            </a:fontRef>
+          </p:style>
+          <p:txBody>
+            <a:bodyPr spcFirstLastPara="0" vert="horz" wrap="square" lIns="55362" tIns="55336" rIns="55361" bIns="55338" numCol="1" spcCol="1270" anchor="ctr" anchorCtr="0">
+              <a:noAutofit/>
+            </a:bodyPr>
+            <a:lstStyle/>
+            <a:p>
+              <a:pPr lvl="0" algn="ctr" defTabSz="533400">
+                <a:lnSpc>
+                  <a:spcPct val="90000"/>
+                </a:lnSpc>
+                <a:spcBef>
+                  <a:spcPct val="0"/>
+                </a:spcBef>
+                <a:spcAft>
+                  <a:spcPct val="35000"/>
+                </a:spcAft>
+              </a:pPr>
+              <a:r>
+                <a:rPr lang="en-GB" sz="1200" kern="1200" dirty="0" smtClean="0"/>
+                <a:t>  </a:t>
+              </a:r>
+              <a:endParaRPr lang="en-GB" sz="1200" kern="1200" dirty="0"/>
+            </a:p>
+          </p:txBody>
+        </p:sp>
+        <p:sp>
+          <p:nvSpPr>
+            <p:cNvPr id="16" name="Teardrop 15"/>
+            <p:cNvSpPr/>
+            <p:nvPr/>
+          </p:nvSpPr>
+          <p:spPr>
+            <a:xfrm rot="2700000">
+              <a:off x="6635522" y="4533725"/>
+              <a:ext cx="299893" cy="299893"/>
+            </a:xfrm>
+            <a:prstGeom prst="teardrop">
+              <a:avLst>
+                <a:gd name="adj" fmla="val 100000"/>
+              </a:avLst>
+            </a:prstGeom>
+            <a:solidFill>
+              <a:schemeClr val="bg1">
+                <a:lumMod val="85000"/>
+              </a:schemeClr>
+            </a:solidFill>
+            <a:ln>
+              <a:noFill/>
+            </a:ln>
+            <a:effectLst/>
+            <a:scene3d>
+              <a:camera prst="orthographicFront">
+                <a:rot lat="0" lon="0" rev="0"/>
+              </a:camera>
+              <a:lightRig rig="contrasting" dir="t">
+                <a:rot lat="0" lon="0" rev="7800000"/>
+              </a:lightRig>
+            </a:scene3d>
+            <a:sp3d>
+              <a:bevelT w="139700" h="139700"/>
+            </a:sp3d>
+          </p:spPr>
+          <p:style>
+            <a:lnRef idx="2">
+              <a:schemeClr val="lt1">
+                <a:hueOff val="0"/>
+                <a:satOff val="0"/>
+                <a:lumOff val="0"/>
+                <a:alphaOff val="0"/>
+              </a:schemeClr>
+            </a:lnRef>
+            <a:fillRef idx="1">
+              <a:schemeClr val="accent1">
+                <a:hueOff val="0"/>
+                <a:satOff val="0"/>
+                <a:lumOff val="0"/>
+                <a:alphaOff val="0"/>
+              </a:schemeClr>
+            </a:fillRef>
+            <a:effectRef idx="0">
+              <a:schemeClr val="accent1">
+                <a:hueOff val="0"/>
+                <a:satOff val="0"/>
+                <a:lumOff val="0"/>
+                <a:alphaOff val="0"/>
+              </a:schemeClr>
+            </a:effectRef>
+            <a:fontRef idx="minor">
+              <a:schemeClr val="lt1"/>
+            </a:fontRef>
+          </p:style>
+        </p:sp>
+        <p:sp>
+          <p:nvSpPr>
+            <p:cNvPr id="17" name="Freeform 16"/>
+            <p:cNvSpPr/>
+            <p:nvPr/>
+          </p:nvSpPr>
+          <p:spPr>
+            <a:xfrm>
+              <a:off x="6645141" y="4543359"/>
+              <a:ext cx="280654" cy="280624"/>
+            </a:xfrm>
+            <a:custGeom>
+              <a:avLst/>
+              <a:gdLst>
+                <a:gd name="connsiteX0" fmla="*/ 0 w 280654"/>
+                <a:gd name="connsiteY0" fmla="*/ 140312 h 280624"/>
+                <a:gd name="connsiteX1" fmla="*/ 140327 w 280654"/>
+                <a:gd name="connsiteY1" fmla="*/ 0 h 280624"/>
+                <a:gd name="connsiteX2" fmla="*/ 280654 w 280654"/>
+                <a:gd name="connsiteY2" fmla="*/ 140312 h 280624"/>
+                <a:gd name="connsiteX3" fmla="*/ 140327 w 280654"/>
+                <a:gd name="connsiteY3" fmla="*/ 280624 h 280624"/>
+                <a:gd name="connsiteX4" fmla="*/ 0 w 280654"/>
+                <a:gd name="connsiteY4" fmla="*/ 140312 h 280624"/>
+              </a:gdLst>
+              <a:ahLst/>
+              <a:cxnLst>
+                <a:cxn ang="0">
+                  <a:pos x="connsiteX0" y="connsiteY0"/>
+                </a:cxn>
+                <a:cxn ang="0">
+                  <a:pos x="connsiteX1" y="connsiteY1"/>
+                </a:cxn>
+                <a:cxn ang="0">
+                  <a:pos x="connsiteX2" y="connsiteY2"/>
+                </a:cxn>
+                <a:cxn ang="0">
+                  <a:pos x="connsiteX3" y="connsiteY3"/>
+                </a:cxn>
+                <a:cxn ang="0">
+                  <a:pos x="connsiteX4" y="connsiteY4"/>
+                </a:cxn>
+              </a:cxnLst>
+              <a:rect l="l" t="t" r="r" b="b"/>
+              <a:pathLst>
+                <a:path w="280654" h="280624">
+                  <a:moveTo>
+                    <a:pt x="0" y="140312"/>
+                  </a:moveTo>
+                  <a:cubicBezTo>
+                    <a:pt x="0" y="62820"/>
+                    <a:pt x="62827" y="0"/>
+                    <a:pt x="140327" y="0"/>
+                  </a:cubicBezTo>
+                  <a:cubicBezTo>
+                    <a:pt x="217827" y="0"/>
+                    <a:pt x="280654" y="62820"/>
+                    <a:pt x="280654" y="140312"/>
+                  </a:cubicBezTo>
+                  <a:cubicBezTo>
+                    <a:pt x="280654" y="217804"/>
+                    <a:pt x="217827" y="280624"/>
+                    <a:pt x="140327" y="280624"/>
+                  </a:cubicBezTo>
+                  <a:cubicBezTo>
+                    <a:pt x="62827" y="280624"/>
+                    <a:pt x="0" y="217804"/>
+                    <a:pt x="0" y="140312"/>
+                  </a:cubicBezTo>
+                  <a:close/>
+                </a:path>
+              </a:pathLst>
+            </a:custGeom>
+            <a:noFill/>
+            <a:ln>
+              <a:solidFill>
+                <a:srgbClr val="F63D0A"/>
+              </a:solidFill>
+            </a:ln>
+          </p:spPr>
+          <p:style>
+            <a:lnRef idx="2">
+              <a:scrgbClr r="0" g="0" b="0"/>
+            </a:lnRef>
+            <a:fillRef idx="1">
+              <a:scrgbClr r="0" g="0" b="0"/>
+            </a:fillRef>
+            <a:effectRef idx="0">
+              <a:schemeClr val="lt1">
+                <a:alpha val="90000"/>
+                <a:hueOff val="0"/>
+                <a:satOff val="0"/>
+                <a:lumOff val="0"/>
+                <a:alphaOff val="0"/>
+              </a:schemeClr>
+            </a:effectRef>
+            <a:fontRef idx="minor">
+              <a:schemeClr val="dk1">
+                <a:hueOff val="0"/>
+                <a:satOff val="0"/>
+                <a:lumOff val="0"/>
+                <a:alphaOff val="0"/>
+              </a:schemeClr>
+            </a:fontRef>
+          </p:style>
+          <p:txBody>
+            <a:bodyPr spcFirstLastPara="0" vert="horz" wrap="square" lIns="55361" tIns="55336" rIns="55362" bIns="55338" numCol="1" spcCol="1270" anchor="ctr" anchorCtr="0">
+              <a:noAutofit/>
+            </a:bodyPr>
+            <a:lstStyle/>
+            <a:p>
+              <a:pPr lvl="0" algn="ctr" defTabSz="533400">
+                <a:lnSpc>
+                  <a:spcPct val="90000"/>
+                </a:lnSpc>
+                <a:spcBef>
+                  <a:spcPct val="0"/>
+                </a:spcBef>
+                <a:spcAft>
+                  <a:spcPct val="35000"/>
+                </a:spcAft>
+              </a:pPr>
+              <a:r>
+                <a:rPr lang="en-GB" sz="1200" kern="1200" dirty="0" smtClean="0"/>
+                <a:t>  </a:t>
+              </a:r>
+              <a:endParaRPr lang="en-GB" sz="1200" kern="1200" dirty="0"/>
+            </a:p>
+          </p:txBody>
+        </p:sp>
+      </p:grpSp>
+      <p:pic>
+        <p:nvPicPr>
+          <p:cNvPr id="1026" name="Picture 2" descr="Related image"/>
+          <p:cNvPicPr>
+            <a:picLocks noChangeAspect="1" noChangeArrowheads="1"/>
+          </p:cNvPicPr>
+          <p:nvPr/>
+        </p:nvPicPr>
+        <p:blipFill>
+          <a:blip r:embed="rId2">
+            <a:extLst>
+              <a:ext uri="{28A0092B-C50C-407E-A947-70E740481C1C}">
+                <a14:useLocalDpi xmlns:a14="http://schemas.microsoft.com/office/drawing/2010/main" val="0"/>
+              </a:ext>
+            </a:extLst>
+          </a:blip>
+          <a:srcRect/>
+          <a:stretch>
+            <a:fillRect/>
+          </a:stretch>
+        </p:blipFill>
+        <p:spPr bwMode="auto">
+          <a:xfrm>
+            <a:off x="4016400" y="5147544"/>
+            <a:ext cx="1079043" cy="1079043"/>
+          </a:xfrm>
+          <a:prstGeom prst="rect">
+            <a:avLst/>
+          </a:prstGeom>
+          <a:noFill/>
+          <a:extLst>
+            <a:ext uri="{909E8E84-426E-40DD-AFC4-6F175D3DCCD1}">
+              <a14:hiddenFill xmlns:a14="http://schemas.microsoft.com/office/drawing/2010/main">
+                <a:solidFill>
+                  <a:srgbClr val="FFFFFF"/>
+                </a:solidFill>
+              </a14:hiddenFill>
+            </a:ext>
+          </a:extLst>
+        </p:spPr>
+      </p:pic>
     </p:spTree>
     <p:extLst>
       <p:ext uri="{BB962C8B-B14F-4D97-AF65-F5344CB8AC3E}">

</xml_diff>